<commit_message>
Updates to decks and labs, cleaning up some data files
</commit_message>
<xml_diff>
--- a/Session 2.pptx
+++ b/Session 2.pptx
@@ -7,10 +7,10 @@
     <p:sldMasterId id="2147484327" r:id="rId6"/>
   </p:sldMasterIdLst>
   <p:notesMasterIdLst>
-    <p:notesMasterId r:id="rId40"/>
+    <p:notesMasterId r:id="rId45"/>
   </p:notesMasterIdLst>
   <p:handoutMasterIdLst>
-    <p:handoutMasterId r:id="rId41"/>
+    <p:handoutMasterId r:id="rId46"/>
   </p:handoutMasterIdLst>
   <p:sldIdLst>
     <p:sldId id="258" r:id="rId7"/>
@@ -20,7 +20,7 @@
     <p:sldId id="403" r:id="rId11"/>
     <p:sldId id="356" r:id="rId12"/>
     <p:sldId id="399" r:id="rId13"/>
-    <p:sldId id="400" r:id="rId14"/>
+    <p:sldId id="426" r:id="rId14"/>
     <p:sldId id="394" r:id="rId15"/>
     <p:sldId id="404" r:id="rId16"/>
     <p:sldId id="405" r:id="rId17"/>
@@ -33,19 +33,24 @@
     <p:sldId id="395" r:id="rId24"/>
     <p:sldId id="398" r:id="rId25"/>
     <p:sldId id="410" r:id="rId26"/>
-    <p:sldId id="411" r:id="rId27"/>
-    <p:sldId id="425" r:id="rId28"/>
-    <p:sldId id="417" r:id="rId29"/>
-    <p:sldId id="412" r:id="rId30"/>
-    <p:sldId id="414" r:id="rId31"/>
-    <p:sldId id="415" r:id="rId32"/>
-    <p:sldId id="421" r:id="rId33"/>
-    <p:sldId id="413" r:id="rId34"/>
-    <p:sldId id="396" r:id="rId35"/>
-    <p:sldId id="401" r:id="rId36"/>
-    <p:sldId id="418" r:id="rId37"/>
-    <p:sldId id="423" r:id="rId38"/>
-    <p:sldId id="424" r:id="rId39"/>
+    <p:sldId id="427" r:id="rId27"/>
+    <p:sldId id="428" r:id="rId28"/>
+    <p:sldId id="411" r:id="rId29"/>
+    <p:sldId id="434" r:id="rId30"/>
+    <p:sldId id="425" r:id="rId31"/>
+    <p:sldId id="417" r:id="rId32"/>
+    <p:sldId id="412" r:id="rId33"/>
+    <p:sldId id="414" r:id="rId34"/>
+    <p:sldId id="415" r:id="rId35"/>
+    <p:sldId id="421" r:id="rId36"/>
+    <p:sldId id="396" r:id="rId37"/>
+    <p:sldId id="430" r:id="rId38"/>
+    <p:sldId id="418" r:id="rId39"/>
+    <p:sldId id="429" r:id="rId40"/>
+    <p:sldId id="431" r:id="rId41"/>
+    <p:sldId id="423" r:id="rId42"/>
+    <p:sldId id="424" r:id="rId43"/>
+    <p:sldId id="432" r:id="rId44"/>
   </p:sldIdLst>
   <p:sldSz cx="12436475" cy="6994525"/>
   <p:notesSz cx="6858000" cy="9144000"/>
@@ -156,7 +161,7 @@
             <p14:sldId id="403"/>
             <p14:sldId id="356"/>
             <p14:sldId id="399"/>
-            <p14:sldId id="400"/>
+            <p14:sldId id="426"/>
             <p14:sldId id="394"/>
             <p14:sldId id="404"/>
             <p14:sldId id="405"/>
@@ -169,19 +174,24 @@
             <p14:sldId id="395"/>
             <p14:sldId id="398"/>
             <p14:sldId id="410"/>
+            <p14:sldId id="427"/>
+            <p14:sldId id="428"/>
             <p14:sldId id="411"/>
+            <p14:sldId id="434"/>
             <p14:sldId id="425"/>
             <p14:sldId id="417"/>
             <p14:sldId id="412"/>
             <p14:sldId id="414"/>
             <p14:sldId id="415"/>
             <p14:sldId id="421"/>
-            <p14:sldId id="413"/>
             <p14:sldId id="396"/>
-            <p14:sldId id="401"/>
+            <p14:sldId id="430"/>
             <p14:sldId id="418"/>
+            <p14:sldId id="429"/>
+            <p14:sldId id="431"/>
             <p14:sldId id="423"/>
             <p14:sldId id="424"/>
+            <p14:sldId id="432"/>
           </p14:sldIdLst>
         </p14:section>
       </p14:sectionLst>
@@ -299,7 +309,7 @@
               <a:rPr lang="en-US" smtClean="0">
                 <a:latin typeface="Segoe UI" pitchFamily="34" charset="0"/>
               </a:rPr>
-              <a:t>6/6/2015 2:34 PM</a:t>
+              <a:t>6/28/2015 11:51 AM</a:t>
             </a:fld>
             <a:endParaRPr lang="en-US" dirty="0">
               <a:latin typeface="Segoe UI" pitchFamily="34" charset="0"/>
@@ -601,7 +611,7 @@
           <a:p>
             <a:fld id="{38EEC551-8CDA-4EB6-89BB-2A86C9F091C8}" type="datetime8">
               <a:rPr lang="en-US" smtClean="0"/>
-              <a:t>6/6/2015 2:34 PM</a:t>
+              <a:t>6/28/2015 11:51 AM</a:t>
             </a:fld>
             <a:endParaRPr lang="en-US" dirty="0"/>
           </a:p>
@@ -966,7 +976,7 @@
           <a:p>
             <a:fld id="{C6996B83-60CF-42A8-BA06-F99D0BEC30B3}" type="datetime1">
               <a:rPr lang="en-US" smtClean="0"/>
-              <a:t>6/6/2015</a:t>
+              <a:t>6/28/2015</a:t>
             </a:fld>
             <a:endParaRPr lang="en-US" dirty="0"/>
           </a:p>
@@ -1187,7 +1197,7 @@
                 </a:solidFill>
               </a:rPr>
               <a:pPr/>
-              <a:t>6/6/2015</a:t>
+              <a:t>6/28/2015</a:t>
             </a:fld>
             <a:endParaRPr lang="en-US" dirty="0">
               <a:solidFill>
@@ -1397,7 +1407,7 @@
                 </a:solidFill>
               </a:rPr>
               <a:pPr/>
-              <a:t>6/6/2015</a:t>
+              <a:t>6/28/2015</a:t>
             </a:fld>
             <a:endParaRPr lang="en-US" dirty="0">
               <a:solidFill>
@@ -1607,7 +1617,7 @@
                 </a:solidFill>
               </a:rPr>
               <a:pPr/>
-              <a:t>6/6/2015</a:t>
+              <a:t>6/28/2015</a:t>
             </a:fld>
             <a:endParaRPr lang="en-US" dirty="0">
               <a:solidFill>
@@ -1817,7 +1827,7 @@
                 </a:solidFill>
               </a:rPr>
               <a:pPr/>
-              <a:t>6/6/2015</a:t>
+              <a:t>6/28/2015</a:t>
             </a:fld>
             <a:endParaRPr lang="en-US" dirty="0">
               <a:solidFill>
@@ -2027,7 +2037,7 @@
                 </a:solidFill>
               </a:rPr>
               <a:pPr/>
-              <a:t>6/6/2015</a:t>
+              <a:t>6/28/2015</a:t>
             </a:fld>
             <a:endParaRPr lang="en-US" dirty="0">
               <a:solidFill>
@@ -2237,7 +2247,7 @@
                 </a:solidFill>
               </a:rPr>
               <a:pPr/>
-              <a:t>6/6/2015</a:t>
+              <a:t>6/28/2015</a:t>
             </a:fld>
             <a:endParaRPr lang="en-US" dirty="0">
               <a:solidFill>
@@ -2269,7 +2279,7 @@
                 </a:solidFill>
               </a:rPr>
               <a:pPr/>
-              <a:t>29</a:t>
+              <a:t>31</a:t>
             </a:fld>
             <a:endParaRPr lang="en-US" dirty="0">
               <a:solidFill>
@@ -2283,6 +2293,216 @@
     <p:extLst>
       <p:ext uri="{BB962C8B-B14F-4D97-AF65-F5344CB8AC3E}">
         <p14:creationId xmlns:p14="http://schemas.microsoft.com/office/powerpoint/2010/main" val="2972198638"/>
+      </p:ext>
+    </p:extLst>
+  </p:cSld>
+  <p:clrMapOvr>
+    <a:masterClrMapping/>
+  </p:clrMapOvr>
+</p:notes>
+</file>
+
+<file path=ppt/notesSlides/notesSlide8.xml><?xml version="1.0" encoding="utf-8"?>
+<p:notes xmlns:a="http://schemas.openxmlformats.org/drawingml/2006/main" xmlns:r="http://schemas.openxmlformats.org/officeDocument/2006/relationships" xmlns:p="http://schemas.openxmlformats.org/presentationml/2006/main">
+  <p:cSld>
+    <p:spTree>
+      <p:nvGrpSpPr>
+        <p:cNvPr id="1" name=""/>
+        <p:cNvGrpSpPr/>
+        <p:nvPr/>
+      </p:nvGrpSpPr>
+      <p:grpSpPr>
+        <a:xfrm>
+          <a:off x="0" y="0"/>
+          <a:ext cx="0" cy="0"/>
+          <a:chOff x="0" y="0"/>
+          <a:chExt cx="0" cy="0"/>
+        </a:xfrm>
+      </p:grpSpPr>
+      <p:sp>
+        <p:nvSpPr>
+          <p:cNvPr id="2" name="Slide Image Placeholder 1"/>
+          <p:cNvSpPr>
+            <a:spLocks noGrp="1" noRot="1" noChangeAspect="1"/>
+          </p:cNvSpPr>
+          <p:nvPr>
+            <p:ph type="sldImg"/>
+          </p:nvPr>
+        </p:nvSpPr>
+        <p:spPr/>
+      </p:sp>
+      <p:sp>
+        <p:nvSpPr>
+          <p:cNvPr id="3" name="Notes Placeholder 2"/>
+          <p:cNvSpPr>
+            <a:spLocks noGrp="1"/>
+          </p:cNvSpPr>
+          <p:nvPr>
+            <p:ph type="body" idx="1"/>
+          </p:nvPr>
+        </p:nvSpPr>
+        <p:spPr/>
+        <p:txBody>
+          <a:bodyPr/>
+          <a:lstStyle/>
+          <a:p>
+            <a:endParaRPr lang="en-US"/>
+          </a:p>
+        </p:txBody>
+      </p:sp>
+      <p:sp>
+        <p:nvSpPr>
+          <p:cNvPr id="4" name="Header Placeholder 3"/>
+          <p:cNvSpPr>
+            <a:spLocks noGrp="1"/>
+          </p:cNvSpPr>
+          <p:nvPr>
+            <p:ph type="hdr" sz="quarter" idx="10"/>
+          </p:nvPr>
+        </p:nvSpPr>
+        <p:spPr/>
+        <p:txBody>
+          <a:bodyPr/>
+          <a:lstStyle/>
+          <a:p>
+            <a:r>
+              <a:rPr lang="en-US" smtClean="0">
+                <a:solidFill>
+                  <a:prstClr val="black"/>
+                </a:solidFill>
+              </a:rPr>
+              <a:t>Build 2014</a:t>
+            </a:r>
+            <a:endParaRPr lang="en-US" dirty="0">
+              <a:solidFill>
+                <a:prstClr val="black"/>
+              </a:solidFill>
+            </a:endParaRPr>
+          </a:p>
+        </p:txBody>
+      </p:sp>
+      <p:sp>
+        <p:nvSpPr>
+          <p:cNvPr id="5" name="Footer Placeholder 4"/>
+          <p:cNvSpPr>
+            <a:spLocks noGrp="1"/>
+          </p:cNvSpPr>
+          <p:nvPr>
+            <p:ph type="ftr" sz="quarter" idx="11"/>
+          </p:nvPr>
+        </p:nvSpPr>
+        <p:spPr/>
+        <p:txBody>
+          <a:bodyPr/>
+          <a:lstStyle/>
+          <a:p>
+            <a:pPr defTabSz="914099" eaLnBrk="0" hangingPunct="0"/>
+            <a:r>
+              <a:rPr lang="en-US" sz="400" smtClean="0">
+                <a:gradFill>
+                  <a:gsLst>
+                    <a:gs pos="0">
+                      <a:prstClr val="black"/>
+                    </a:gs>
+                    <a:gs pos="100000">
+                      <a:prstClr val="black"/>
+                    </a:gs>
+                  </a:gsLst>
+                  <a:lin ang="5400000" scaled="0"/>
+                </a:gradFill>
+                <a:latin typeface="Segoe UI" pitchFamily="34" charset="0"/>
+                <a:ea typeface="Segoe UI" pitchFamily="34" charset="0"/>
+                <a:cs typeface="Segoe UI" pitchFamily="34" charset="0"/>
+              </a:rPr>
+              <a:t>© 2014 Microsoft Corporation. All rights reserved. Microsoft, Windows, and other product names are or may be registered trademarks and/or trademarks in the U.S. and/or other countries. The information herein is for informational purposes only and represents the current view of Microsoft Corporation as of the date of this presentation.  Because Microsoft must respond to changing market conditions, it should not be interpreted to be a commitment on the part of Microsoft, and Microsoft cannot guarantee the accuracy of any information provided after the date of this presentation.  MICROSOFT MAKES NO WARRANTIES, EXPRESS, IMPLIED OR STATUTORY, AS TO THE INFORMATION IN THIS PRESENTATION.</a:t>
+            </a:r>
+            <a:endParaRPr lang="en-US" sz="400" dirty="0" smtClean="0">
+              <a:gradFill>
+                <a:gsLst>
+                  <a:gs pos="0">
+                    <a:prstClr val="black"/>
+                  </a:gs>
+                  <a:gs pos="100000">
+                    <a:prstClr val="black"/>
+                  </a:gs>
+                </a:gsLst>
+                <a:lin ang="5400000" scaled="0"/>
+              </a:gradFill>
+              <a:latin typeface="Segoe UI" pitchFamily="34" charset="0"/>
+              <a:ea typeface="Segoe UI" pitchFamily="34" charset="0"/>
+              <a:cs typeface="Segoe UI" pitchFamily="34" charset="0"/>
+            </a:endParaRPr>
+          </a:p>
+        </p:txBody>
+      </p:sp>
+      <p:sp>
+        <p:nvSpPr>
+          <p:cNvPr id="6" name="Date Placeholder 5"/>
+          <p:cNvSpPr>
+            <a:spLocks noGrp="1"/>
+          </p:cNvSpPr>
+          <p:nvPr>
+            <p:ph type="dt" idx="12"/>
+          </p:nvPr>
+        </p:nvSpPr>
+        <p:spPr/>
+        <p:txBody>
+          <a:bodyPr/>
+          <a:lstStyle/>
+          <a:p>
+            <a:fld id="{9F00D60D-1703-4D24-8308-FEE06A50A69C}" type="datetime1">
+              <a:rPr lang="en-US" smtClean="0">
+                <a:solidFill>
+                  <a:prstClr val="black"/>
+                </a:solidFill>
+              </a:rPr>
+              <a:pPr/>
+              <a:t>6/28/2015</a:t>
+            </a:fld>
+            <a:endParaRPr lang="en-US" dirty="0">
+              <a:solidFill>
+                <a:prstClr val="black"/>
+              </a:solidFill>
+            </a:endParaRPr>
+          </a:p>
+        </p:txBody>
+      </p:sp>
+      <p:sp>
+        <p:nvSpPr>
+          <p:cNvPr id="7" name="Slide Number Placeholder 6"/>
+          <p:cNvSpPr>
+            <a:spLocks noGrp="1"/>
+          </p:cNvSpPr>
+          <p:nvPr>
+            <p:ph type="sldNum" sz="quarter" idx="13"/>
+          </p:nvPr>
+        </p:nvSpPr>
+        <p:spPr/>
+        <p:txBody>
+          <a:bodyPr/>
+          <a:lstStyle/>
+          <a:p>
+            <a:fld id="{B4008EB6-D09E-4580-8CD6-DDB14511944F}" type="slidenum">
+              <a:rPr lang="en-US" smtClean="0">
+                <a:solidFill>
+                  <a:prstClr val="black"/>
+                </a:solidFill>
+              </a:rPr>
+              <a:pPr/>
+              <a:t>38</a:t>
+            </a:fld>
+            <a:endParaRPr lang="en-US" dirty="0">
+              <a:solidFill>
+                <a:prstClr val="black"/>
+              </a:solidFill>
+            </a:endParaRPr>
+          </a:p>
+        </p:txBody>
+      </p:sp>
+    </p:spTree>
+    <p:extLst>
+      <p:ext uri="{BB962C8B-B14F-4D97-AF65-F5344CB8AC3E}">
+        <p14:creationId xmlns:p14="http://schemas.microsoft.com/office/powerpoint/2010/main" val="86818076"/>
       </p:ext>
     </p:extLst>
   </p:cSld>
@@ -2309,77 +2529,6 @@
           <a:chExt cx="0" cy="0"/>
         </a:xfrm>
       </p:grpSpPr>
-      <p:sp>
-        <p:nvSpPr>
-          <p:cNvPr id="5" name="Text Placeholder 4"/>
-          <p:cNvSpPr>
-            <a:spLocks noGrp="1"/>
-          </p:cNvSpPr>
-          <p:nvPr>
-            <p:ph type="body" sz="quarter" idx="12" hasCustomPrompt="1"/>
-          </p:nvPr>
-        </p:nvSpPr>
-        <p:spPr>
-          <a:xfrm>
-            <a:off x="276540" y="5630862"/>
-            <a:ext cx="9142098" cy="1055009"/>
-          </a:xfrm>
-          <a:noFill/>
-        </p:spPr>
-        <p:txBody>
-          <a:bodyPr lIns="146304" tIns="109728" rIns="146304" bIns="109728" anchor="b">
-            <a:noAutofit/>
-          </a:bodyPr>
-          <a:lstStyle>
-            <a:lvl1pPr marL="0" indent="0">
-              <a:spcBef>
-                <a:spcPts val="0"/>
-              </a:spcBef>
-              <a:buNone/>
-              <a:defRPr sz="2000" spc="0" baseline="0">
-                <a:gradFill>
-                  <a:gsLst>
-                    <a:gs pos="0">
-                      <a:schemeClr val="tx1"/>
-                    </a:gs>
-                    <a:gs pos="100000">
-                      <a:schemeClr val="tx1"/>
-                    </a:gs>
-                  </a:gsLst>
-                  <a:lin ang="5400000" scaled="0"/>
-                </a:gradFill>
-                <a:latin typeface="+mn-lt"/>
-              </a:defRPr>
-            </a:lvl1pPr>
-          </a:lstStyle>
-          <a:p>
-            <a:pPr lvl="0"/>
-            <a:r>
-              <a:rPr lang="en-US" dirty="0" smtClean="0"/>
-              <a:t>Matthias Shapiro</a:t>
-            </a:r>
-          </a:p>
-          <a:p>
-            <a:pPr lvl="0"/>
-            <a:r>
-              <a:rPr lang="en-US" dirty="0" smtClean="0"/>
-              <a:t>@</a:t>
-            </a:r>
-            <a:r>
-              <a:rPr lang="en-US" dirty="0" err="1" smtClean="0"/>
-              <a:t>politicalmath</a:t>
-            </a:r>
-            <a:endParaRPr lang="en-US" dirty="0" smtClean="0"/>
-          </a:p>
-          <a:p>
-            <a:pPr lvl="0"/>
-            <a:r>
-              <a:rPr lang="en-US" dirty="0" smtClean="0"/>
-              <a:t>matthias.shapiro@outlook.com</a:t>
-            </a:r>
-          </a:p>
-        </p:txBody>
-      </p:sp>
       <p:sp>
         <p:nvSpPr>
           <p:cNvPr id="9" name="Title 1"/>
@@ -17121,6 +17270,110 @@
           </a:prstGeom>
         </p:spPr>
       </p:pic>
+      <p:sp>
+        <p:nvSpPr>
+          <p:cNvPr id="5" name="TextBox 4"/>
+          <p:cNvSpPr txBox="1"/>
+          <p:nvPr userDrawn="1"/>
+        </p:nvSpPr>
+        <p:spPr>
+          <a:xfrm>
+            <a:off x="0" y="6316662"/>
+            <a:ext cx="5334000" cy="760208"/>
+          </a:xfrm>
+          <a:prstGeom prst="rect">
+            <a:avLst/>
+          </a:prstGeom>
+          <a:noFill/>
+        </p:spPr>
+        <p:txBody>
+          <a:bodyPr wrap="square" lIns="182880" tIns="146304" rIns="182880" bIns="146304" rtlCol="0">
+            <a:spAutoFit/>
+          </a:bodyPr>
+          <a:lstStyle/>
+          <a:p>
+            <a:pPr>
+              <a:lnSpc>
+                <a:spcPct val="90000"/>
+              </a:lnSpc>
+              <a:spcAft>
+                <a:spcPts val="600"/>
+              </a:spcAft>
+            </a:pPr>
+            <a:r>
+              <a:rPr lang="en-US" sz="1400" dirty="0" smtClean="0">
+                <a:gradFill>
+                  <a:gsLst>
+                    <a:gs pos="2917">
+                      <a:schemeClr val="tx1"/>
+                    </a:gs>
+                    <a:gs pos="30000">
+                      <a:schemeClr val="tx1"/>
+                    </a:gs>
+                  </a:gsLst>
+                  <a:lin ang="5400000" scaled="0"/>
+                </a:gradFill>
+              </a:rPr>
+              <a:t>matthias.shapiro@outlook.com</a:t>
+            </a:r>
+          </a:p>
+          <a:p>
+            <a:pPr>
+              <a:lnSpc>
+                <a:spcPct val="90000"/>
+              </a:lnSpc>
+              <a:spcAft>
+                <a:spcPts val="600"/>
+              </a:spcAft>
+            </a:pPr>
+            <a:r>
+              <a:rPr lang="en-US" sz="1400" dirty="0" smtClean="0">
+                <a:gradFill>
+                  <a:gsLst>
+                    <a:gs pos="2917">
+                      <a:schemeClr val="tx1"/>
+                    </a:gs>
+                    <a:gs pos="30000">
+                      <a:schemeClr val="tx1"/>
+                    </a:gs>
+                  </a:gsLst>
+                  <a:lin ang="5400000" scaled="0"/>
+                </a:gradFill>
+              </a:rPr>
+              <a:t>@</a:t>
+            </a:r>
+            <a:r>
+              <a:rPr lang="en-US" sz="1400" dirty="0" err="1" smtClean="0">
+                <a:gradFill>
+                  <a:gsLst>
+                    <a:gs pos="2917">
+                      <a:schemeClr val="tx1"/>
+                    </a:gs>
+                    <a:gs pos="30000">
+                      <a:schemeClr val="tx1"/>
+                    </a:gs>
+                  </a:gsLst>
+                  <a:lin ang="5400000" scaled="0"/>
+                </a:gradFill>
+              </a:rPr>
+              <a:t>politicalmath</a:t>
+            </a:r>
+            <a:endParaRPr lang="en-US" sz="1400" dirty="0" smtClean="0">
+              <a:gradFill>
+                <a:gsLst>
+                  <a:gs pos="2917">
+                    <a:schemeClr val="tx1"/>
+                  </a:gs>
+                  <a:gs pos="30000">
+                    <a:schemeClr val="tx1"/>
+                  </a:gs>
+                </a:gsLst>
+                <a:lin ang="5400000" scaled="0"/>
+              </a:gradFill>
+            </a:endParaRPr>
+          </a:p>
+        </p:txBody>
+      </p:sp>
     </p:spTree>
     <p:extLst>
       <p:ext uri="{BB962C8B-B14F-4D97-AF65-F5344CB8AC3E}">
@@ -18994,45 +19247,6 @@
       </p:grpSpPr>
       <p:sp>
         <p:nvSpPr>
-          <p:cNvPr id="3" name="Subtitle 2"/>
-          <p:cNvSpPr>
-            <a:spLocks noGrp="1"/>
-          </p:cNvSpPr>
-          <p:nvPr>
-            <p:ph type="subTitle" idx="12"/>
-          </p:nvPr>
-        </p:nvSpPr>
-        <p:spPr/>
-        <p:txBody>
-          <a:bodyPr/>
-          <a:lstStyle/>
-          <a:p>
-            <a:r>
-              <a:rPr lang="en-US" dirty="0" smtClean="0"/>
-              <a:t>Matthias Shapiro</a:t>
-            </a:r>
-          </a:p>
-          <a:p>
-            <a:r>
-              <a:rPr lang="en-US" dirty="0" smtClean="0"/>
-              <a:t>@</a:t>
-            </a:r>
-            <a:r>
-              <a:rPr lang="en-US" dirty="0" err="1" smtClean="0"/>
-              <a:t>politicalmath</a:t>
-            </a:r>
-            <a:endParaRPr lang="en-US" dirty="0" smtClean="0"/>
-          </a:p>
-          <a:p>
-            <a:r>
-              <a:rPr lang="en-US" dirty="0" smtClean="0"/>
-              <a:t>matthias.shapiro@outlook.com</a:t>
-            </a:r>
-          </a:p>
-        </p:txBody>
-      </p:sp>
-      <p:sp>
-        <p:nvSpPr>
           <p:cNvPr id="2" name="Title 1"/>
           <p:cNvSpPr>
             <a:spLocks noGrp="1"/>
@@ -19278,8 +19492,8 @@
         </p:blipFill>
         <p:spPr bwMode="auto">
           <a:xfrm>
-            <a:off x="503238" y="1287463"/>
-            <a:ext cx="6096000" cy="5251010"/>
+            <a:off x="503238" y="1287464"/>
+            <a:ext cx="5486399" cy="4725908"/>
           </a:xfrm>
           <a:prstGeom prst="rect">
             <a:avLst/>
@@ -19296,6 +19510,34 @@
           </a:extLst>
         </p:spPr>
       </p:pic>
+      <p:sp>
+        <p:nvSpPr>
+          <p:cNvPr id="2" name="Rectangle 1"/>
+          <p:cNvSpPr/>
+          <p:nvPr/>
+        </p:nvSpPr>
+        <p:spPr>
+          <a:xfrm>
+            <a:off x="503238" y="6014884"/>
+            <a:ext cx="4102405" cy="369332"/>
+          </a:xfrm>
+          <a:prstGeom prst="rect">
+            <a:avLst/>
+          </a:prstGeom>
+        </p:spPr>
+        <p:txBody>
+          <a:bodyPr wrap="none">
+            <a:spAutoFit/>
+          </a:bodyPr>
+          <a:lstStyle/>
+          <a:p>
+            <a:r>
+              <a:rPr lang="en-US" dirty="0"/>
+              <a:t>http://politicalmathblog.com/?p=1735</a:t>
+            </a:r>
+          </a:p>
+        </p:txBody>
+      </p:sp>
     </p:spTree>
     <p:extLst>
       <p:ext uri="{BB962C8B-B14F-4D97-AF65-F5344CB8AC3E}">
@@ -19576,9 +19818,6 @@
             </a:r>
           </a:p>
           <a:p>
-            <a:endParaRPr lang="en-US" dirty="0"/>
-          </a:p>
-          <a:p>
             <a:r>
               <a:rPr lang="en-US" sz="2800" dirty="0" smtClean="0">
                 <a:hlinkClick r:id="rId2"/>
@@ -19647,7 +19886,7 @@
         <p:spPr>
           <a:xfrm>
             <a:off x="427038" y="1185861"/>
-            <a:ext cx="6934200" cy="5238023"/>
+            <a:ext cx="5985257" cy="4521201"/>
           </a:xfrm>
           <a:prstGeom prst="rect">
             <a:avLst/>
@@ -19664,7 +19903,7 @@
         </p:nvSpPr>
         <p:spPr>
           <a:xfrm>
-            <a:off x="254001" y="6392862"/>
+            <a:off x="273051" y="5708649"/>
             <a:ext cx="10515600" cy="1325563"/>
           </a:xfrm>
           <a:prstGeom prst="rect">
@@ -19708,10 +19947,10 @@
           </a:lstStyle>
           <a:p>
             <a:r>
-              <a:rPr lang="en-US" sz="3200" dirty="0" smtClean="0"/>
+              <a:rPr lang="en-US" sz="2400" dirty="0" smtClean="0"/>
               <a:t>http://politicalmathblog.com/BLS/2012/08/</a:t>
             </a:r>
-            <a:endParaRPr lang="en-US" sz="3200" dirty="0"/>
+            <a:endParaRPr lang="en-US" sz="2400" dirty="0"/>
           </a:p>
         </p:txBody>
       </p:sp>
@@ -19928,7 +20167,7 @@
         </p:nvSpPr>
         <p:spPr>
           <a:xfrm>
-            <a:off x="350837" y="5935662"/>
+            <a:off x="415347" y="5557837"/>
             <a:ext cx="7315203" cy="914400"/>
           </a:xfrm>
         </p:spPr>
@@ -20013,8 +20252,8 @@
         </p:blipFill>
         <p:spPr>
           <a:xfrm>
-            <a:off x="427037" y="1212848"/>
-            <a:ext cx="7696200" cy="4836711"/>
+            <a:off x="427037" y="1212849"/>
+            <a:ext cx="6908715" cy="4341813"/>
           </a:xfrm>
           <a:prstGeom prst="rect">
             <a:avLst/>
@@ -20071,11 +20310,7 @@
           <a:p>
             <a:r>
               <a:rPr lang="en-US" dirty="0" smtClean="0"/>
-              <a:t>FRED </a:t>
-            </a:r>
-            <a:r>
-              <a:rPr lang="en-US" dirty="0" smtClean="0"/>
-              <a:t>Data – Excel Add-In</a:t>
+              <a:t>FRED Data – Excel Add-In</a:t>
             </a:r>
             <a:endParaRPr lang="en-US" dirty="0"/>
           </a:p>
@@ -20124,7 +20359,7 @@
         </p:blipFill>
         <p:spPr>
           <a:xfrm>
-            <a:off x="463694" y="4411662"/>
+            <a:off x="463694" y="3725862"/>
             <a:ext cx="11511453" cy="1979613"/>
           </a:xfrm>
           <a:prstGeom prst="rect">
@@ -20868,7 +21103,7 @@
         <p:spPr>
           <a:xfrm>
             <a:off x="274638" y="1212850"/>
-            <a:ext cx="11887200" cy="738664"/>
+            <a:ext cx="11887200" cy="2769989"/>
           </a:xfrm>
         </p:spPr>
         <p:txBody>
@@ -20882,6 +21117,28 @@
               <a:rPr lang="en-US" dirty="0" smtClean="0"/>
               <a:t>=AVERAGE(A1:A12)</a:t>
             </a:r>
+          </a:p>
+          <a:p>
+            <a:pPr marL="0" indent="0">
+              <a:buNone/>
+            </a:pPr>
+            <a:endParaRPr lang="en-US" dirty="0"/>
+          </a:p>
+          <a:p>
+            <a:pPr marL="0" indent="0">
+              <a:buNone/>
+            </a:pPr>
+            <a:r>
+              <a:rPr lang="en-US" dirty="0" smtClean="0"/>
+              <a:t>Demo</a:t>
+            </a:r>
+            <a:endParaRPr lang="en-US" dirty="0" smtClean="0"/>
+          </a:p>
+          <a:p>
+            <a:pPr marL="0" indent="0">
+              <a:buNone/>
+            </a:pPr>
+            <a:endParaRPr lang="en-US" dirty="0" smtClean="0"/>
           </a:p>
         </p:txBody>
       </p:sp>
@@ -20954,7 +21211,7 @@
         <p:spPr>
           <a:xfrm>
             <a:off x="274638" y="1212850"/>
-            <a:ext cx="11887200" cy="2092881"/>
+            <a:ext cx="11887200" cy="5478423"/>
           </a:xfrm>
         </p:spPr>
         <p:txBody>
@@ -20966,9 +21223,8 @@
             </a:pPr>
             <a:r>
               <a:rPr lang="en-US" dirty="0" smtClean="0"/>
-              <a:t>=SUM(A1:A12)</a:t>
-            </a:r>
-            <a:endParaRPr lang="en-US" dirty="0"/>
+              <a:t>[very large number] / [unit]</a:t>
+            </a:r>
           </a:p>
           <a:p>
             <a:pPr marL="0" indent="0">
@@ -20982,8 +21238,80 @@
             </a:pPr>
             <a:r>
               <a:rPr lang="en-US" dirty="0" smtClean="0"/>
-              <a:t>drag the formula down</a:t>
-            </a:r>
+              <a:t>Example:</a:t>
+            </a:r>
+          </a:p>
+          <a:p>
+            <a:pPr marL="0" indent="0">
+              <a:buNone/>
+            </a:pPr>
+            <a:endParaRPr lang="en-US" sz="2400" dirty="0" smtClean="0"/>
+          </a:p>
+          <a:p>
+            <a:pPr marL="0" indent="0">
+              <a:buNone/>
+            </a:pPr>
+            <a:r>
+              <a:rPr lang="en-US" sz="2400" dirty="0" smtClean="0"/>
+              <a:t>        Federal spending                                   =</a:t>
+            </a:r>
+            <a:r>
+              <a:rPr lang="en-US" sz="2400" dirty="0" err="1" smtClean="0"/>
+              <a:t>per_day</a:t>
+            </a:r>
+            <a:r>
+              <a:rPr lang="en-US" sz="2400" dirty="0" smtClean="0"/>
+              <a:t>/24                      =</a:t>
+            </a:r>
+            <a:r>
+              <a:rPr lang="en-US" sz="2400" dirty="0" err="1" smtClean="0"/>
+              <a:t>per_minute</a:t>
+            </a:r>
+            <a:r>
+              <a:rPr lang="en-US" sz="2400" dirty="0" smtClean="0"/>
+              <a:t>/60 </a:t>
+            </a:r>
+          </a:p>
+          <a:p>
+            <a:pPr marL="0" indent="0">
+              <a:buNone/>
+            </a:pPr>
+            <a:endParaRPr lang="en-US" sz="2400" dirty="0"/>
+          </a:p>
+          <a:p>
+            <a:pPr marL="0" indent="0">
+              <a:buNone/>
+            </a:pPr>
+            <a:endParaRPr lang="en-US" sz="2400" dirty="0" smtClean="0"/>
+          </a:p>
+          <a:p>
+            <a:pPr marL="0" indent="0">
+              <a:buNone/>
+            </a:pPr>
+            <a:r>
+              <a:rPr lang="en-US" sz="2400" dirty="0" smtClean="0"/>
+              <a:t>                                           =spending/365                        =</a:t>
+            </a:r>
+            <a:r>
+              <a:rPr lang="en-US" sz="2400" dirty="0" err="1" smtClean="0"/>
+              <a:t>per_hour</a:t>
+            </a:r>
+            <a:r>
+              <a:rPr lang="en-US" sz="2400" dirty="0" smtClean="0"/>
+              <a:t>/60</a:t>
+            </a:r>
+          </a:p>
+          <a:p>
+            <a:pPr marL="0" indent="0">
+              <a:buNone/>
+            </a:pPr>
+            <a:endParaRPr lang="en-US" dirty="0" smtClean="0"/>
+          </a:p>
+          <a:p>
+            <a:pPr marL="0" indent="0">
+              <a:buNone/>
+            </a:pPr>
+            <a:endParaRPr lang="en-US" dirty="0" smtClean="0"/>
           </a:p>
         </p:txBody>
       </p:sp>
@@ -21004,20 +21332,40 @@
           <a:p>
             <a:r>
               <a:rPr lang="en-US" dirty="0" smtClean="0"/>
-              <a:t>Rolling </a:t>
-            </a:r>
-            <a:r>
-              <a:rPr lang="en-US" dirty="0" smtClean="0"/>
-              <a:t>Sums / Averages</a:t>
+              <a:t>Calculate “per unit” values</a:t>
             </a:r>
             <a:endParaRPr lang="en-US" dirty="0"/>
           </a:p>
         </p:txBody>
       </p:sp>
+      <p:pic>
+        <p:nvPicPr>
+          <p:cNvPr id="2" name="Picture 1"/>
+          <p:cNvPicPr>
+            <a:picLocks noChangeAspect="1"/>
+          </p:cNvPicPr>
+          <p:nvPr/>
+        </p:nvPicPr>
+        <p:blipFill>
+          <a:blip r:embed="rId2"/>
+          <a:stretch>
+            <a:fillRect/>
+          </a:stretch>
+        </p:blipFill>
+        <p:spPr>
+          <a:xfrm>
+            <a:off x="427037" y="4030662"/>
+            <a:ext cx="11050258" cy="838200"/>
+          </a:xfrm>
+          <a:prstGeom prst="rect">
+            <a:avLst/>
+          </a:prstGeom>
+        </p:spPr>
+      </p:pic>
     </p:spTree>
     <p:extLst>
       <p:ext uri="{BB962C8B-B14F-4D97-AF65-F5344CB8AC3E}">
-        <p14:creationId xmlns:p14="http://schemas.microsoft.com/office/powerpoint/2010/main" val="2831453934"/>
+        <p14:creationId xmlns:p14="http://schemas.microsoft.com/office/powerpoint/2010/main" val="3871636605"/>
       </p:ext>
     </p:extLst>
   </p:cSld>
@@ -21049,58 +21397,6 @@
       </p:grpSpPr>
       <p:sp>
         <p:nvSpPr>
-          <p:cNvPr id="5" name="Text Placeholder 4"/>
-          <p:cNvSpPr>
-            <a:spLocks noGrp="1"/>
-          </p:cNvSpPr>
-          <p:nvPr>
-            <p:ph type="body" sz="quarter" idx="10"/>
-          </p:nvPr>
-        </p:nvSpPr>
-        <p:spPr>
-          <a:xfrm>
-            <a:off x="274638" y="1212850"/>
-            <a:ext cx="11887200" cy="2769989"/>
-          </a:xfrm>
-        </p:spPr>
-        <p:txBody>
-          <a:bodyPr/>
-          <a:lstStyle/>
-          <a:p>
-            <a:pPr marL="0" indent="0">
-              <a:buNone/>
-            </a:pPr>
-            <a:r>
-              <a:rPr lang="en-US" dirty="0" smtClean="0"/>
-              <a:t>Using the ‘$’ operand.</a:t>
-            </a:r>
-          </a:p>
-          <a:p>
-            <a:pPr marL="0" indent="0">
-              <a:buNone/>
-            </a:pPr>
-            <a:endParaRPr lang="en-US" dirty="0"/>
-          </a:p>
-          <a:p>
-            <a:pPr marL="0" indent="0">
-              <a:buNone/>
-            </a:pPr>
-            <a:r>
-              <a:rPr lang="en-US" dirty="0" smtClean="0"/>
-              <a:t>‘$’ means “stop moving”</a:t>
-            </a:r>
-            <a:endParaRPr lang="en-US" dirty="0"/>
-          </a:p>
-          <a:p>
-            <a:pPr marL="0" indent="0">
-              <a:buNone/>
-            </a:pPr>
-            <a:endParaRPr lang="en-US" dirty="0" smtClean="0"/>
-          </a:p>
-        </p:txBody>
-      </p:sp>
-      <p:sp>
-        <p:nvSpPr>
           <p:cNvPr id="4" name="Title 3"/>
           <p:cNvSpPr>
             <a:spLocks noGrp="1"/>
@@ -21116,16 +21412,133 @@
           <a:p>
             <a:r>
               <a:rPr lang="en-US" dirty="0" smtClean="0"/>
-              <a:t>Excel Syntax</a:t>
+              <a:t>Calculate “per unit” values</a:t>
             </a:r>
             <a:endParaRPr lang="en-US" dirty="0"/>
+          </a:p>
+        </p:txBody>
+      </p:sp>
+      <p:pic>
+        <p:nvPicPr>
+          <p:cNvPr id="3" name="Picture 2"/>
+          <p:cNvPicPr>
+            <a:picLocks noChangeAspect="1"/>
+          </p:cNvPicPr>
+          <p:nvPr/>
+        </p:nvPicPr>
+        <p:blipFill>
+          <a:blip r:embed="rId2"/>
+          <a:stretch>
+            <a:fillRect/>
+          </a:stretch>
+        </p:blipFill>
+        <p:spPr>
+          <a:xfrm>
+            <a:off x="655637" y="3954462"/>
+            <a:ext cx="10926312" cy="914400"/>
+          </a:xfrm>
+          <a:prstGeom prst="rect">
+            <a:avLst/>
+          </a:prstGeom>
+        </p:spPr>
+      </p:pic>
+      <p:sp>
+        <p:nvSpPr>
+          <p:cNvPr id="5" name="Text Placeholder 4"/>
+          <p:cNvSpPr>
+            <a:spLocks noGrp="1"/>
+          </p:cNvSpPr>
+          <p:nvPr>
+            <p:ph type="body" sz="quarter" idx="10"/>
+          </p:nvPr>
+        </p:nvSpPr>
+        <p:spPr>
+          <a:xfrm>
+            <a:off x="274638" y="1212850"/>
+            <a:ext cx="11887200" cy="5478423"/>
+          </a:xfrm>
+        </p:spPr>
+        <p:txBody>
+          <a:bodyPr/>
+          <a:lstStyle/>
+          <a:p>
+            <a:pPr marL="0" indent="0">
+              <a:buNone/>
+            </a:pPr>
+            <a:r>
+              <a:rPr lang="en-US" dirty="0" smtClean="0"/>
+              <a:t>[very large number] / [unit]</a:t>
+            </a:r>
+          </a:p>
+          <a:p>
+            <a:pPr marL="0" indent="0">
+              <a:buNone/>
+            </a:pPr>
+            <a:endParaRPr lang="en-US" dirty="0"/>
+          </a:p>
+          <a:p>
+            <a:pPr marL="0" indent="0">
+              <a:buNone/>
+            </a:pPr>
+            <a:r>
+              <a:rPr lang="en-US" dirty="0" smtClean="0"/>
+              <a:t>Example:</a:t>
+            </a:r>
+          </a:p>
+          <a:p>
+            <a:pPr marL="0" indent="0">
+              <a:buNone/>
+            </a:pPr>
+            <a:endParaRPr lang="en-US" sz="2400" dirty="0" smtClean="0"/>
+          </a:p>
+          <a:p>
+            <a:pPr marL="0" indent="0">
+              <a:buNone/>
+            </a:pPr>
+            <a:r>
+              <a:rPr lang="en-US" sz="2400" dirty="0" smtClean="0"/>
+              <a:t>        Federal spending                                         =spending/households</a:t>
+            </a:r>
+          </a:p>
+          <a:p>
+            <a:pPr marL="0" indent="0">
+              <a:buNone/>
+            </a:pPr>
+            <a:endParaRPr lang="en-US" sz="2400" dirty="0"/>
+          </a:p>
+          <a:p>
+            <a:pPr marL="0" indent="0">
+              <a:buNone/>
+            </a:pPr>
+            <a:endParaRPr lang="en-US" sz="2400" dirty="0" smtClean="0"/>
+          </a:p>
+          <a:p>
+            <a:pPr marL="0" indent="0">
+              <a:buNone/>
+            </a:pPr>
+            <a:r>
+              <a:rPr lang="en-US" sz="2400" dirty="0" smtClean="0"/>
+              <a:t>                                              =spending/population                      =spending/employed</a:t>
+            </a:r>
+          </a:p>
+          <a:p>
+            <a:pPr marL="0" indent="0">
+              <a:buNone/>
+            </a:pPr>
+            <a:endParaRPr lang="en-US" dirty="0" smtClean="0"/>
+          </a:p>
+          <a:p>
+            <a:pPr marL="0" indent="0">
+              <a:buNone/>
+            </a:pPr>
+            <a:endParaRPr lang="en-US" dirty="0" smtClean="0"/>
           </a:p>
         </p:txBody>
       </p:sp>
     </p:spTree>
     <p:extLst>
       <p:ext uri="{BB962C8B-B14F-4D97-AF65-F5344CB8AC3E}">
-        <p14:creationId xmlns:p14="http://schemas.microsoft.com/office/powerpoint/2010/main" val="2481230084"/>
+        <p14:creationId xmlns:p14="http://schemas.microsoft.com/office/powerpoint/2010/main" val="4273889391"/>
       </p:ext>
     </p:extLst>
   </p:cSld>
@@ -21168,6 +21581,509 @@
         <p:spPr>
           <a:xfrm>
             <a:off x="274638" y="1212850"/>
+            <a:ext cx="6095999" cy="4555093"/>
+          </a:xfrm>
+        </p:spPr>
+        <p:txBody>
+          <a:bodyPr/>
+          <a:lstStyle/>
+          <a:p>
+            <a:pPr marL="0" indent="0">
+              <a:buNone/>
+            </a:pPr>
+            <a:r>
+              <a:rPr lang="en-US" dirty="0" smtClean="0"/>
+              <a:t>On sequential data (daily, weekly, monthly)</a:t>
+            </a:r>
+          </a:p>
+          <a:p>
+            <a:pPr marL="0" indent="0">
+              <a:buNone/>
+            </a:pPr>
+            <a:endParaRPr lang="en-US" dirty="0" smtClean="0"/>
+          </a:p>
+          <a:p>
+            <a:pPr marL="0" indent="0">
+              <a:buNone/>
+            </a:pPr>
+            <a:r>
+              <a:rPr lang="en-US" dirty="0" smtClean="0"/>
+              <a:t>=SUM(A1:A12)</a:t>
+            </a:r>
+            <a:endParaRPr lang="en-US" dirty="0"/>
+          </a:p>
+          <a:p>
+            <a:pPr marL="0" indent="0">
+              <a:buNone/>
+            </a:pPr>
+            <a:endParaRPr lang="en-US" dirty="0"/>
+          </a:p>
+          <a:p>
+            <a:pPr marL="0" indent="0">
+              <a:buNone/>
+            </a:pPr>
+            <a:r>
+              <a:rPr lang="en-US" dirty="0" smtClean="0"/>
+              <a:t>drag the formula down using handles</a:t>
+            </a:r>
+          </a:p>
+        </p:txBody>
+      </p:sp>
+      <p:sp>
+        <p:nvSpPr>
+          <p:cNvPr id="4" name="Title 3"/>
+          <p:cNvSpPr>
+            <a:spLocks noGrp="1"/>
+          </p:cNvSpPr>
+          <p:nvPr>
+            <p:ph type="title"/>
+          </p:nvPr>
+        </p:nvSpPr>
+        <p:spPr/>
+        <p:txBody>
+          <a:bodyPr/>
+          <a:lstStyle/>
+          <a:p>
+            <a:r>
+              <a:rPr lang="en-US" dirty="0" smtClean="0"/>
+              <a:t>Rolling Sums / Averages</a:t>
+            </a:r>
+            <a:endParaRPr lang="en-US" dirty="0"/>
+          </a:p>
+        </p:txBody>
+      </p:sp>
+    </p:spTree>
+    <p:extLst>
+      <p:ext uri="{BB962C8B-B14F-4D97-AF65-F5344CB8AC3E}">
+        <p14:creationId xmlns:p14="http://schemas.microsoft.com/office/powerpoint/2010/main" val="2831453934"/>
+      </p:ext>
+    </p:extLst>
+  </p:cSld>
+  <p:clrMapOvr>
+    <a:masterClrMapping/>
+  </p:clrMapOvr>
+  <p:transition>
+    <p:fade/>
+  </p:transition>
+</p:sld>
+</file>
+
+<file path=ppt/slides/slide24.xml><?xml version="1.0" encoding="utf-8"?>
+<p:sld xmlns:a="http://schemas.openxmlformats.org/drawingml/2006/main" xmlns:r="http://schemas.openxmlformats.org/officeDocument/2006/relationships" xmlns:p="http://schemas.openxmlformats.org/presentationml/2006/main">
+  <p:cSld>
+    <p:spTree>
+      <p:nvGrpSpPr>
+        <p:cNvPr id="1" name=""/>
+        <p:cNvGrpSpPr/>
+        <p:nvPr/>
+      </p:nvGrpSpPr>
+      <p:grpSpPr>
+        <a:xfrm>
+          <a:off x="0" y="0"/>
+          <a:ext cx="0" cy="0"/>
+          <a:chOff x="0" y="0"/>
+          <a:chExt cx="0" cy="0"/>
+        </a:xfrm>
+      </p:grpSpPr>
+      <p:sp>
+        <p:nvSpPr>
+          <p:cNvPr id="5" name="Text Placeholder 4"/>
+          <p:cNvSpPr>
+            <a:spLocks noGrp="1"/>
+          </p:cNvSpPr>
+          <p:nvPr>
+            <p:ph type="body" sz="quarter" idx="10"/>
+          </p:nvPr>
+        </p:nvSpPr>
+        <p:spPr>
+          <a:xfrm>
+            <a:off x="274638" y="1212850"/>
+            <a:ext cx="6095999" cy="5336846"/>
+          </a:xfrm>
+        </p:spPr>
+        <p:txBody>
+          <a:bodyPr/>
+          <a:lstStyle/>
+          <a:p>
+            <a:pPr marL="0" indent="0">
+              <a:buNone/>
+            </a:pPr>
+            <a:r>
+              <a:rPr lang="en-US" sz="3600" dirty="0" smtClean="0"/>
+              <a:t>Relative changes often more meaningful than absolute changes</a:t>
+            </a:r>
+            <a:endParaRPr lang="en-US" sz="3600" dirty="0" smtClean="0"/>
+          </a:p>
+          <a:p>
+            <a:pPr marL="0" indent="0">
+              <a:buNone/>
+            </a:pPr>
+            <a:endParaRPr lang="en-US" sz="3600" dirty="0" smtClean="0"/>
+          </a:p>
+          <a:p>
+            <a:pPr marL="0" indent="0">
+              <a:buNone/>
+            </a:pPr>
+            <a:r>
+              <a:rPr lang="en-US" sz="3600" dirty="0" smtClean="0"/>
+              <a:t>=(A2/A3)-1</a:t>
+            </a:r>
+            <a:endParaRPr lang="en-US" sz="3600" dirty="0"/>
+          </a:p>
+          <a:p>
+            <a:pPr marL="0" indent="0">
+              <a:buNone/>
+            </a:pPr>
+            <a:endParaRPr lang="en-US" sz="3600" dirty="0" smtClean="0"/>
+          </a:p>
+          <a:p>
+            <a:pPr marL="0" indent="0">
+              <a:buNone/>
+            </a:pPr>
+            <a:r>
+              <a:rPr lang="en-US" sz="3600" dirty="0" smtClean="0"/>
+              <a:t>“%” formatting </a:t>
+            </a:r>
+            <a:endParaRPr lang="en-US" sz="3600" dirty="0" smtClean="0"/>
+          </a:p>
+          <a:p>
+            <a:pPr marL="0" indent="0">
+              <a:buNone/>
+            </a:pPr>
+            <a:r>
+              <a:rPr lang="en-US" sz="3600" dirty="0" smtClean="0"/>
+              <a:t>Increase / decrease </a:t>
+            </a:r>
+          </a:p>
+          <a:p>
+            <a:pPr marL="0" indent="0">
+              <a:buNone/>
+            </a:pPr>
+            <a:r>
+              <a:rPr lang="en-US" sz="3600" dirty="0" smtClean="0"/>
+              <a:t>significant digits</a:t>
+            </a:r>
+            <a:endParaRPr lang="en-US" sz="3600" dirty="0"/>
+          </a:p>
+        </p:txBody>
+      </p:sp>
+      <p:sp>
+        <p:nvSpPr>
+          <p:cNvPr id="4" name="Title 3"/>
+          <p:cNvSpPr>
+            <a:spLocks noGrp="1"/>
+          </p:cNvSpPr>
+          <p:nvPr>
+            <p:ph type="title"/>
+          </p:nvPr>
+        </p:nvSpPr>
+        <p:spPr/>
+        <p:txBody>
+          <a:bodyPr/>
+          <a:lstStyle/>
+          <a:p>
+            <a:r>
+              <a:rPr lang="en-US" dirty="0" smtClean="0"/>
+              <a:t>Calculating Percentages</a:t>
+            </a:r>
+            <a:endParaRPr lang="en-US" dirty="0"/>
+          </a:p>
+        </p:txBody>
+      </p:sp>
+      <p:pic>
+        <p:nvPicPr>
+          <p:cNvPr id="2" name="Picture 1"/>
+          <p:cNvPicPr>
+            <a:picLocks noChangeAspect="1"/>
+          </p:cNvPicPr>
+          <p:nvPr/>
+        </p:nvPicPr>
+        <p:blipFill>
+          <a:blip r:embed="rId2"/>
+          <a:stretch>
+            <a:fillRect/>
+          </a:stretch>
+        </p:blipFill>
+        <p:spPr>
+          <a:xfrm>
+            <a:off x="8961437" y="3878262"/>
+            <a:ext cx="2017363" cy="1676400"/>
+          </a:xfrm>
+          <a:prstGeom prst="rect">
+            <a:avLst/>
+          </a:prstGeom>
+        </p:spPr>
+      </p:pic>
+      <p:pic>
+        <p:nvPicPr>
+          <p:cNvPr id="3" name="Picture 2"/>
+          <p:cNvPicPr>
+            <a:picLocks noChangeAspect="1"/>
+          </p:cNvPicPr>
+          <p:nvPr/>
+        </p:nvPicPr>
+        <p:blipFill>
+          <a:blip r:embed="rId3"/>
+          <a:stretch>
+            <a:fillRect/>
+          </a:stretch>
+        </p:blipFill>
+        <p:spPr>
+          <a:xfrm>
+            <a:off x="7742237" y="906462"/>
+            <a:ext cx="4040373" cy="1905000"/>
+          </a:xfrm>
+          <a:prstGeom prst="rect">
+            <a:avLst/>
+          </a:prstGeom>
+        </p:spPr>
+      </p:pic>
+      <p:cxnSp>
+        <p:nvCxnSpPr>
+          <p:cNvPr id="7" name="Straight Arrow Connector 6"/>
+          <p:cNvCxnSpPr/>
+          <p:nvPr/>
+        </p:nvCxnSpPr>
+        <p:spPr>
+          <a:xfrm flipV="1">
+            <a:off x="3322637" y="4640262"/>
+            <a:ext cx="6096000" cy="381000"/>
+          </a:xfrm>
+          <a:prstGeom prst="straightConnector1">
+            <a:avLst/>
+          </a:prstGeom>
+          <a:ln w="57150">
+            <a:headEnd type="none"/>
+            <a:tailEnd type="triangle"/>
+          </a:ln>
+        </p:spPr>
+        <p:style>
+          <a:lnRef idx="1">
+            <a:schemeClr val="accent1"/>
+          </a:lnRef>
+          <a:fillRef idx="0">
+            <a:schemeClr val="accent1"/>
+          </a:fillRef>
+          <a:effectRef idx="0">
+            <a:schemeClr val="accent1"/>
+          </a:effectRef>
+          <a:fontRef idx="minor">
+            <a:schemeClr val="tx1"/>
+          </a:fontRef>
+        </p:style>
+      </p:cxnSp>
+      <p:cxnSp>
+        <p:nvCxnSpPr>
+          <p:cNvPr id="8" name="Straight Arrow Connector 7"/>
+          <p:cNvCxnSpPr/>
+          <p:nvPr/>
+        </p:nvCxnSpPr>
+        <p:spPr>
+          <a:xfrm flipV="1">
+            <a:off x="4237037" y="4716462"/>
+            <a:ext cx="5943600" cy="838200"/>
+          </a:xfrm>
+          <a:prstGeom prst="straightConnector1">
+            <a:avLst/>
+          </a:prstGeom>
+          <a:ln w="57150">
+            <a:headEnd type="none"/>
+            <a:tailEnd type="triangle"/>
+          </a:ln>
+        </p:spPr>
+        <p:style>
+          <a:lnRef idx="1">
+            <a:schemeClr val="accent1"/>
+          </a:lnRef>
+          <a:fillRef idx="0">
+            <a:schemeClr val="accent1"/>
+          </a:fillRef>
+          <a:effectRef idx="0">
+            <a:schemeClr val="accent1"/>
+          </a:effectRef>
+          <a:fontRef idx="minor">
+            <a:schemeClr val="tx1"/>
+          </a:fontRef>
+        </p:style>
+      </p:cxnSp>
+    </p:spTree>
+    <p:extLst>
+      <p:ext uri="{BB962C8B-B14F-4D97-AF65-F5344CB8AC3E}">
+        <p14:creationId xmlns:p14="http://schemas.microsoft.com/office/powerpoint/2010/main" val="1218743508"/>
+      </p:ext>
+    </p:extLst>
+  </p:cSld>
+  <p:clrMapOvr>
+    <a:masterClrMapping/>
+  </p:clrMapOvr>
+  <p:transition>
+    <p:fade/>
+  </p:transition>
+</p:sld>
+</file>
+
+<file path=ppt/slides/slide25.xml><?xml version="1.0" encoding="utf-8"?>
+<p:sld xmlns:a="http://schemas.openxmlformats.org/drawingml/2006/main" xmlns:r="http://schemas.openxmlformats.org/officeDocument/2006/relationships" xmlns:p="http://schemas.openxmlformats.org/presentationml/2006/main">
+  <p:cSld>
+    <p:spTree>
+      <p:nvGrpSpPr>
+        <p:cNvPr id="1" name=""/>
+        <p:cNvGrpSpPr/>
+        <p:nvPr/>
+      </p:nvGrpSpPr>
+      <p:grpSpPr>
+        <a:xfrm>
+          <a:off x="0" y="0"/>
+          <a:ext cx="0" cy="0"/>
+          <a:chOff x="0" y="0"/>
+          <a:chExt cx="0" cy="0"/>
+        </a:xfrm>
+      </p:grpSpPr>
+      <p:sp>
+        <p:nvSpPr>
+          <p:cNvPr id="5" name="Text Placeholder 4"/>
+          <p:cNvSpPr>
+            <a:spLocks noGrp="1"/>
+          </p:cNvSpPr>
+          <p:nvPr>
+            <p:ph type="body" sz="quarter" idx="10"/>
+          </p:nvPr>
+        </p:nvSpPr>
+        <p:spPr>
+          <a:xfrm>
+            <a:off x="274638" y="1212850"/>
+            <a:ext cx="11887200" cy="2769989"/>
+          </a:xfrm>
+        </p:spPr>
+        <p:txBody>
+          <a:bodyPr/>
+          <a:lstStyle/>
+          <a:p>
+            <a:pPr marL="0" indent="0">
+              <a:buNone/>
+            </a:pPr>
+            <a:r>
+              <a:rPr lang="en-US" dirty="0" smtClean="0"/>
+              <a:t>Using the ‘$’ operand.</a:t>
+            </a:r>
+          </a:p>
+          <a:p>
+            <a:pPr marL="0" indent="0">
+              <a:buNone/>
+            </a:pPr>
+            <a:endParaRPr lang="en-US" dirty="0"/>
+          </a:p>
+          <a:p>
+            <a:pPr marL="0" indent="0">
+              <a:buNone/>
+            </a:pPr>
+            <a:r>
+              <a:rPr lang="en-US" dirty="0" smtClean="0"/>
+              <a:t>‘$’ means “stop moving”</a:t>
+            </a:r>
+            <a:endParaRPr lang="en-US" dirty="0"/>
+          </a:p>
+          <a:p>
+            <a:pPr marL="0" indent="0">
+              <a:buNone/>
+            </a:pPr>
+            <a:endParaRPr lang="en-US" dirty="0" smtClean="0"/>
+          </a:p>
+        </p:txBody>
+      </p:sp>
+      <p:sp>
+        <p:nvSpPr>
+          <p:cNvPr id="4" name="Title 3"/>
+          <p:cNvSpPr>
+            <a:spLocks noGrp="1"/>
+          </p:cNvSpPr>
+          <p:nvPr>
+            <p:ph type="title"/>
+          </p:nvPr>
+        </p:nvSpPr>
+        <p:spPr/>
+        <p:txBody>
+          <a:bodyPr/>
+          <a:lstStyle/>
+          <a:p>
+            <a:r>
+              <a:rPr lang="en-US" dirty="0" smtClean="0"/>
+              <a:t>Excel Syntax</a:t>
+            </a:r>
+            <a:endParaRPr lang="en-US" dirty="0"/>
+          </a:p>
+        </p:txBody>
+      </p:sp>
+      <p:pic>
+        <p:nvPicPr>
+          <p:cNvPr id="2" name="Picture 1"/>
+          <p:cNvPicPr>
+            <a:picLocks noChangeAspect="1"/>
+          </p:cNvPicPr>
+          <p:nvPr/>
+        </p:nvPicPr>
+        <p:blipFill>
+          <a:blip r:embed="rId2"/>
+          <a:stretch>
+            <a:fillRect/>
+          </a:stretch>
+        </p:blipFill>
+        <p:spPr>
+          <a:xfrm>
+            <a:off x="5761037" y="3954119"/>
+            <a:ext cx="5959580" cy="2589213"/>
+          </a:xfrm>
+          <a:prstGeom prst="rect">
+            <a:avLst/>
+          </a:prstGeom>
+        </p:spPr>
+      </p:pic>
+    </p:spTree>
+    <p:extLst>
+      <p:ext uri="{BB962C8B-B14F-4D97-AF65-F5344CB8AC3E}">
+        <p14:creationId xmlns:p14="http://schemas.microsoft.com/office/powerpoint/2010/main" val="2481230084"/>
+      </p:ext>
+    </p:extLst>
+  </p:cSld>
+  <p:clrMapOvr>
+    <a:masterClrMapping/>
+  </p:clrMapOvr>
+  <p:transition>
+    <p:fade/>
+  </p:transition>
+</p:sld>
+</file>
+
+<file path=ppt/slides/slide26.xml><?xml version="1.0" encoding="utf-8"?>
+<p:sld xmlns:a="http://schemas.openxmlformats.org/drawingml/2006/main" xmlns:r="http://schemas.openxmlformats.org/officeDocument/2006/relationships" xmlns:p="http://schemas.openxmlformats.org/presentationml/2006/main">
+  <p:cSld>
+    <p:spTree>
+      <p:nvGrpSpPr>
+        <p:cNvPr id="1" name=""/>
+        <p:cNvGrpSpPr/>
+        <p:nvPr/>
+      </p:nvGrpSpPr>
+      <p:grpSpPr>
+        <a:xfrm>
+          <a:off x="0" y="0"/>
+          <a:ext cx="0" cy="0"/>
+          <a:chOff x="0" y="0"/>
+          <a:chExt cx="0" cy="0"/>
+        </a:xfrm>
+      </p:grpSpPr>
+      <p:sp>
+        <p:nvSpPr>
+          <p:cNvPr id="5" name="Text Placeholder 4"/>
+          <p:cNvSpPr>
+            <a:spLocks noGrp="1"/>
+          </p:cNvSpPr>
+          <p:nvPr>
+            <p:ph type="body" sz="quarter" idx="10"/>
+          </p:nvPr>
+        </p:nvSpPr>
+        <p:spPr>
+          <a:xfrm>
+            <a:off x="274638" y="1212850"/>
             <a:ext cx="7005410" cy="1292662"/>
           </a:xfrm>
         </p:spPr>
@@ -21249,7 +22165,7 @@
 </p:sld>
 </file>
 
-<file path=ppt/slides/slide24.xml><?xml version="1.0" encoding="utf-8"?>
+<file path=ppt/slides/slide27.xml><?xml version="1.0" encoding="utf-8"?>
 <p:sld xmlns:a="http://schemas.openxmlformats.org/drawingml/2006/main" xmlns:r="http://schemas.openxmlformats.org/officeDocument/2006/relationships" xmlns:p="http://schemas.openxmlformats.org/presentationml/2006/main">
   <p:cSld>
     <p:spTree>
@@ -21279,7 +22195,7 @@
         <p:spPr>
           <a:xfrm>
             <a:off x="274638" y="1212850"/>
-            <a:ext cx="6934199" cy="2769989"/>
+            <a:ext cx="6934199" cy="5232202"/>
           </a:xfrm>
         </p:spPr>
         <p:txBody>
@@ -21306,7 +22222,26 @@
             </a:pPr>
             <a:r>
               <a:rPr lang="en-US" dirty="0" smtClean="0"/>
-              <a:t>Retain only the calculated values</a:t>
+              <a:t>Retain only the calculated </a:t>
+            </a:r>
+            <a:r>
+              <a:rPr lang="en-US" dirty="0" smtClean="0"/>
+              <a:t>values</a:t>
+            </a:r>
+          </a:p>
+          <a:p>
+            <a:pPr marL="0" indent="0">
+              <a:buNone/>
+            </a:pPr>
+            <a:endParaRPr lang="en-US" dirty="0"/>
+          </a:p>
+          <a:p>
+            <a:pPr marL="0" indent="0">
+              <a:buNone/>
+            </a:pPr>
+            <a:r>
+              <a:rPr lang="en-US" dirty="0" smtClean="0"/>
+              <a:t>Valuable for moving data from sheet to sheet</a:t>
             </a:r>
             <a:endParaRPr lang="en-US" dirty="0" smtClean="0"/>
           </a:p>
@@ -21381,7 +22316,7 @@
 </p:sld>
 </file>
 
-<file path=ppt/slides/slide25.xml><?xml version="1.0" encoding="utf-8"?>
+<file path=ppt/slides/slide28.xml><?xml version="1.0" encoding="utf-8"?>
 <p:sld xmlns:a="http://schemas.openxmlformats.org/drawingml/2006/main" xmlns:r="http://schemas.openxmlformats.org/officeDocument/2006/relationships" xmlns:p="http://schemas.openxmlformats.org/presentationml/2006/main">
   <p:cSld>
     <p:spTree>
@@ -21411,7 +22346,7 @@
         <p:spPr>
           <a:xfrm>
             <a:off x="274638" y="1212850"/>
-            <a:ext cx="11887200" cy="2092881"/>
+            <a:ext cx="11887200" cy="3447098"/>
           </a:xfrm>
         </p:spPr>
         <p:txBody>
@@ -21423,17 +22358,18 @@
             </a:pPr>
             <a:r>
               <a:rPr lang="en-US" dirty="0" smtClean="0"/>
-              <a:t>Select a column</a:t>
+              <a:t>Select a </a:t>
+            </a:r>
+            <a:r>
+              <a:rPr lang="en-US" dirty="0" smtClean="0"/>
+              <a:t>column</a:t>
             </a:r>
           </a:p>
           <a:p>
             <a:pPr marL="0" indent="0">
               <a:buNone/>
             </a:pPr>
-            <a:r>
-              <a:rPr lang="en-US" dirty="0" smtClean="0"/>
-              <a:t>“Sort &amp; Filter”</a:t>
-            </a:r>
+            <a:endParaRPr lang="en-US" dirty="0" smtClean="0"/>
           </a:p>
           <a:p>
             <a:pPr marL="0" indent="0">
@@ -21441,9 +22377,27 @@
             </a:pPr>
             <a:r>
               <a:rPr lang="en-US" dirty="0" smtClean="0"/>
+              <a:t>“Sort &amp; Filter</a:t>
+            </a:r>
+            <a:r>
+              <a:rPr lang="en-US" dirty="0" smtClean="0"/>
+              <a:t>”</a:t>
+            </a:r>
+          </a:p>
+          <a:p>
+            <a:pPr marL="0" indent="0">
+              <a:buNone/>
+            </a:pPr>
+            <a:endParaRPr lang="en-US" dirty="0" smtClean="0"/>
+          </a:p>
+          <a:p>
+            <a:pPr marL="0" indent="0">
+              <a:buNone/>
+            </a:pPr>
+            <a:r>
+              <a:rPr lang="en-US" dirty="0" smtClean="0"/>
               <a:t>Always “expand selection”</a:t>
             </a:r>
-            <a:endParaRPr lang="en-US" dirty="0" smtClean="0"/>
           </a:p>
         </p:txBody>
       </p:sp>
@@ -21513,7 +22467,7 @@
 </p:sld>
 </file>
 
-<file path=ppt/slides/slide26.xml><?xml version="1.0" encoding="utf-8"?>
+<file path=ppt/slides/slide29.xml><?xml version="1.0" encoding="utf-8"?>
 <p:sld xmlns:a="http://schemas.openxmlformats.org/drawingml/2006/main" xmlns:r="http://schemas.openxmlformats.org/officeDocument/2006/relationships" xmlns:p="http://schemas.openxmlformats.org/presentationml/2006/main">
   <p:cSld>
     <p:spTree>
@@ -21623,326 +22577,6 @@
   <p:transition>
     <p:fade/>
   </p:transition>
-</p:sld>
-</file>
-
-<file path=ppt/slides/slide27.xml><?xml version="1.0" encoding="utf-8"?>
-<p:sld xmlns:a="http://schemas.openxmlformats.org/drawingml/2006/main" xmlns:r="http://schemas.openxmlformats.org/officeDocument/2006/relationships" xmlns:p="http://schemas.openxmlformats.org/presentationml/2006/main">
-  <p:cSld>
-    <p:spTree>
-      <p:nvGrpSpPr>
-        <p:cNvPr id="1" name=""/>
-        <p:cNvGrpSpPr/>
-        <p:nvPr/>
-      </p:nvGrpSpPr>
-      <p:grpSpPr>
-        <a:xfrm>
-          <a:off x="0" y="0"/>
-          <a:ext cx="0" cy="0"/>
-          <a:chOff x="0" y="0"/>
-          <a:chExt cx="0" cy="0"/>
-        </a:xfrm>
-      </p:grpSpPr>
-      <p:sp>
-        <p:nvSpPr>
-          <p:cNvPr id="5" name="Text Placeholder 4"/>
-          <p:cNvSpPr>
-            <a:spLocks noGrp="1"/>
-          </p:cNvSpPr>
-          <p:nvPr>
-            <p:ph type="body" sz="quarter" idx="10"/>
-          </p:nvPr>
-        </p:nvSpPr>
-        <p:spPr>
-          <a:xfrm>
-            <a:off x="274638" y="1212850"/>
-            <a:ext cx="6855634" cy="738664"/>
-          </a:xfrm>
-        </p:spPr>
-        <p:txBody>
-          <a:bodyPr/>
-          <a:lstStyle/>
-          <a:p>
-            <a:pPr marL="0" indent="0">
-              <a:buNone/>
-            </a:pPr>
-            <a:r>
-              <a:rPr lang="en-US" dirty="0" smtClean="0"/>
-              <a:t>Using Color Scales</a:t>
-            </a:r>
-          </a:p>
-        </p:txBody>
-      </p:sp>
-      <p:sp>
-        <p:nvSpPr>
-          <p:cNvPr id="4" name="Title 3"/>
-          <p:cNvSpPr>
-            <a:spLocks noGrp="1"/>
-          </p:cNvSpPr>
-          <p:nvPr>
-            <p:ph type="title"/>
-          </p:nvPr>
-        </p:nvSpPr>
-        <p:spPr/>
-        <p:txBody>
-          <a:bodyPr/>
-          <a:lstStyle/>
-          <a:p>
-            <a:r>
-              <a:rPr lang="en-US" dirty="0" smtClean="0"/>
-              <a:t>Conditional Investigation</a:t>
-            </a:r>
-            <a:br>
-              <a:rPr lang="en-US" dirty="0" smtClean="0"/>
-            </a:br>
-            <a:endParaRPr lang="en-US" dirty="0"/>
-          </a:p>
-        </p:txBody>
-      </p:sp>
-      <p:pic>
-        <p:nvPicPr>
-          <p:cNvPr id="2" name="Picture 1"/>
-          <p:cNvPicPr>
-            <a:picLocks noChangeAspect="1"/>
-          </p:cNvPicPr>
-          <p:nvPr/>
-        </p:nvPicPr>
-        <p:blipFill>
-          <a:blip r:embed="rId2"/>
-          <a:stretch>
-            <a:fillRect/>
-          </a:stretch>
-        </p:blipFill>
-        <p:spPr>
-          <a:xfrm>
-            <a:off x="7132637" y="1212849"/>
-            <a:ext cx="5029201" cy="5301541"/>
-          </a:xfrm>
-          <a:prstGeom prst="rect">
-            <a:avLst/>
-          </a:prstGeom>
-        </p:spPr>
-      </p:pic>
-    </p:spTree>
-    <p:extLst>
-      <p:ext uri="{BB962C8B-B14F-4D97-AF65-F5344CB8AC3E}">
-        <p14:creationId xmlns:p14="http://schemas.microsoft.com/office/powerpoint/2010/main" val="1834799112"/>
-      </p:ext>
-    </p:extLst>
-  </p:cSld>
-  <p:clrMapOvr>
-    <a:masterClrMapping/>
-  </p:clrMapOvr>
-  <p:transition>
-    <p:fade/>
-  </p:transition>
-</p:sld>
-</file>
-
-<file path=ppt/slides/slide28.xml><?xml version="1.0" encoding="utf-8"?>
-<p:sld xmlns:a="http://schemas.openxmlformats.org/drawingml/2006/main" xmlns:r="http://schemas.openxmlformats.org/officeDocument/2006/relationships" xmlns:p="http://schemas.openxmlformats.org/presentationml/2006/main">
-  <p:cSld>
-    <p:spTree>
-      <p:nvGrpSpPr>
-        <p:cNvPr id="1" name=""/>
-        <p:cNvGrpSpPr/>
-        <p:nvPr/>
-      </p:nvGrpSpPr>
-      <p:grpSpPr>
-        <a:xfrm>
-          <a:off x="0" y="0"/>
-          <a:ext cx="0" cy="0"/>
-          <a:chOff x="0" y="0"/>
-          <a:chExt cx="0" cy="0"/>
-        </a:xfrm>
-      </p:grpSpPr>
-      <p:sp>
-        <p:nvSpPr>
-          <p:cNvPr id="5" name="Text Placeholder 4"/>
-          <p:cNvSpPr>
-            <a:spLocks noGrp="1"/>
-          </p:cNvSpPr>
-          <p:nvPr>
-            <p:ph type="body" sz="quarter" idx="10"/>
-          </p:nvPr>
-        </p:nvSpPr>
-        <p:spPr>
-          <a:xfrm>
-            <a:off x="274638" y="1363662"/>
-            <a:ext cx="11887200" cy="1415772"/>
-          </a:xfrm>
-        </p:spPr>
-        <p:txBody>
-          <a:bodyPr/>
-          <a:lstStyle/>
-          <a:p>
-            <a:pPr marL="0" indent="0">
-              <a:buNone/>
-            </a:pPr>
-            <a:r>
-              <a:rPr lang="en-US" dirty="0" smtClean="0"/>
-              <a:t>Using the </a:t>
-            </a:r>
-            <a:r>
-              <a:rPr lang="en-US" dirty="0" smtClean="0"/>
-              <a:t>helper </a:t>
-            </a:r>
-            <a:r>
-              <a:rPr lang="en-US" dirty="0" smtClean="0"/>
-              <a:t>Excel files</a:t>
-            </a:r>
-            <a:endParaRPr lang="en-US" dirty="0" smtClean="0"/>
-          </a:p>
-          <a:p>
-            <a:endParaRPr lang="en-US" dirty="0"/>
-          </a:p>
-        </p:txBody>
-      </p:sp>
-      <p:sp>
-        <p:nvSpPr>
-          <p:cNvPr id="4" name="Title 3"/>
-          <p:cNvSpPr>
-            <a:spLocks noGrp="1"/>
-          </p:cNvSpPr>
-          <p:nvPr>
-            <p:ph type="title"/>
-          </p:nvPr>
-        </p:nvSpPr>
-        <p:spPr/>
-        <p:txBody>
-          <a:bodyPr/>
-          <a:lstStyle/>
-          <a:p>
-            <a:r>
-              <a:rPr lang="en-US" dirty="0" smtClean="0"/>
-              <a:t>Exporting </a:t>
-            </a:r>
-            <a:r>
-              <a:rPr lang="en-US" dirty="0" smtClean="0"/>
-              <a:t>Data</a:t>
-            </a:r>
-            <a:endParaRPr lang="en-US" dirty="0"/>
-          </a:p>
-        </p:txBody>
-      </p:sp>
-    </p:spTree>
-    <p:extLst>
-      <p:ext uri="{BB962C8B-B14F-4D97-AF65-F5344CB8AC3E}">
-        <p14:creationId xmlns:p14="http://schemas.microsoft.com/office/powerpoint/2010/main" val="2587104196"/>
-      </p:ext>
-    </p:extLst>
-  </p:cSld>
-  <p:clrMapOvr>
-    <a:masterClrMapping/>
-  </p:clrMapOvr>
-  <p:transition>
-    <p:fade/>
-  </p:transition>
-</p:sld>
-</file>
-
-<file path=ppt/slides/slide29.xml><?xml version="1.0" encoding="utf-8"?>
-<p:sld xmlns:a="http://schemas.openxmlformats.org/drawingml/2006/main" xmlns:r="http://schemas.openxmlformats.org/officeDocument/2006/relationships" xmlns:p="http://schemas.openxmlformats.org/presentationml/2006/main">
-  <p:cSld>
-    <p:spTree>
-      <p:nvGrpSpPr>
-        <p:cNvPr id="1" name=""/>
-        <p:cNvGrpSpPr/>
-        <p:nvPr/>
-      </p:nvGrpSpPr>
-      <p:grpSpPr>
-        <a:xfrm>
-          <a:off x="0" y="0"/>
-          <a:ext cx="0" cy="0"/>
-          <a:chOff x="0" y="0"/>
-          <a:chExt cx="0" cy="0"/>
-        </a:xfrm>
-      </p:grpSpPr>
-      <p:sp>
-        <p:nvSpPr>
-          <p:cNvPr id="2" name="Text Placeholder 1"/>
-          <p:cNvSpPr>
-            <a:spLocks noGrp="1"/>
-          </p:cNvSpPr>
-          <p:nvPr>
-            <p:ph type="body" sz="quarter" idx="15"/>
-          </p:nvPr>
-        </p:nvSpPr>
-        <p:spPr/>
-        <p:txBody>
-          <a:bodyPr/>
-          <a:lstStyle/>
-          <a:p>
-            <a:endParaRPr lang="en-US" dirty="0">
-              <a:solidFill>
-                <a:schemeClr val="tx1">
-                  <a:lumMod val="75000"/>
-                </a:schemeClr>
-              </a:solidFill>
-            </a:endParaRPr>
-          </a:p>
-        </p:txBody>
-      </p:sp>
-      <p:sp>
-        <p:nvSpPr>
-          <p:cNvPr id="5" name="Title 4"/>
-          <p:cNvSpPr>
-            <a:spLocks noGrp="1"/>
-          </p:cNvSpPr>
-          <p:nvPr>
-            <p:ph type="ctrTitle"/>
-          </p:nvPr>
-        </p:nvSpPr>
-        <p:spPr/>
-        <p:txBody>
-          <a:bodyPr/>
-          <a:lstStyle/>
-          <a:p>
-            <a:r>
-              <a:rPr lang="en-US" dirty="0" smtClean="0">
-                <a:latin typeface="+mn-lt"/>
-                <a:ea typeface="Segoe UI Black" panose="020B0A02040204020203" pitchFamily="34" charset="0"/>
-                <a:cs typeface="Segoe UI Black" panose="020B0A02040204020203" pitchFamily="34" charset="0"/>
-              </a:rPr>
-              <a:t>basic charting</a:t>
-            </a:r>
-            <a:endParaRPr lang="en-US" dirty="0">
-              <a:latin typeface="+mn-lt"/>
-              <a:ea typeface="Segoe UI Black" panose="020B0A02040204020203" pitchFamily="34" charset="0"/>
-              <a:cs typeface="Segoe UI Black" panose="020B0A02040204020203" pitchFamily="34" charset="0"/>
-            </a:endParaRPr>
-          </a:p>
-        </p:txBody>
-      </p:sp>
-    </p:spTree>
-    <p:extLst>
-      <p:ext uri="{BB962C8B-B14F-4D97-AF65-F5344CB8AC3E}">
-        <p14:creationId xmlns:p14="http://schemas.microsoft.com/office/powerpoint/2010/main" val="4219199459"/>
-      </p:ext>
-    </p:extLst>
-  </p:cSld>
-  <p:clrMapOvr>
-    <a:masterClrMapping/>
-  </p:clrMapOvr>
-  <mc:AlternateContent xmlns:mc="http://schemas.openxmlformats.org/markup-compatibility/2006" xmlns:p14="http://schemas.microsoft.com/office/powerpoint/2010/main">
-    <mc:Choice Requires="p14">
-      <p:transition spd="med" p14:dur="700">
-        <p:fade/>
-      </p:transition>
-    </mc:Choice>
-    <mc:Fallback xmlns="">
-      <p:transition spd="med">
-        <p:fade/>
-      </p:transition>
-    </mc:Fallback>
-  </mc:AlternateContent>
-  <p:timing>
-    <p:tnLst>
-      <p:par>
-        <p:cTn id="1" dur="indefinite" restart="never" nodeType="tmRoot"/>
-      </p:par>
-    </p:tnLst>
-  </p:timing>
 </p:sld>
 </file>
 
@@ -22093,12 +22727,23 @@
             <p:ph type="body" sz="quarter" idx="10"/>
           </p:nvPr>
         </p:nvSpPr>
-        <p:spPr/>
+        <p:spPr>
+          <a:xfrm>
+            <a:off x="274638" y="1212850"/>
+            <a:ext cx="6855634" cy="738664"/>
+          </a:xfrm>
+        </p:spPr>
         <p:txBody>
           <a:bodyPr/>
           <a:lstStyle/>
           <a:p>
-            <a:endParaRPr lang="en-US" dirty="0"/>
+            <a:pPr marL="0" indent="0">
+              <a:buNone/>
+            </a:pPr>
+            <a:r>
+              <a:rPr lang="en-US" dirty="0" smtClean="0"/>
+              <a:t>Using Color Scales</a:t>
+            </a:r>
           </a:p>
         </p:txBody>
       </p:sp>
@@ -22119,16 +22764,43 @@
           <a:p>
             <a:r>
               <a:rPr lang="en-US" dirty="0" smtClean="0"/>
-              <a:t>Simple Excel charting </a:t>
-            </a:r>
+              <a:t>Conditional Investigation</a:t>
+            </a:r>
+            <a:br>
+              <a:rPr lang="en-US" dirty="0" smtClean="0"/>
+            </a:br>
             <a:endParaRPr lang="en-US" dirty="0"/>
           </a:p>
         </p:txBody>
       </p:sp>
+      <p:pic>
+        <p:nvPicPr>
+          <p:cNvPr id="6" name="Picture 5"/>
+          <p:cNvPicPr>
+            <a:picLocks noChangeAspect="1"/>
+          </p:cNvPicPr>
+          <p:nvPr/>
+        </p:nvPicPr>
+        <p:blipFill>
+          <a:blip r:embed="rId2"/>
+          <a:stretch>
+            <a:fillRect/>
+          </a:stretch>
+        </p:blipFill>
+        <p:spPr>
+          <a:xfrm>
+            <a:off x="6370637" y="1212849"/>
+            <a:ext cx="5512126" cy="4876800"/>
+          </a:xfrm>
+          <a:prstGeom prst="rect">
+            <a:avLst/>
+          </a:prstGeom>
+        </p:spPr>
+      </p:pic>
     </p:spTree>
     <p:extLst>
       <p:ext uri="{BB962C8B-B14F-4D97-AF65-F5344CB8AC3E}">
-        <p14:creationId xmlns:p14="http://schemas.microsoft.com/office/powerpoint/2010/main" val="398701381"/>
+        <p14:creationId xmlns:p14="http://schemas.microsoft.com/office/powerpoint/2010/main" val="1834799112"/>
       </p:ext>
     </p:extLst>
   </p:cSld>
@@ -22160,12 +22832,12 @@
       </p:grpSpPr>
       <p:sp>
         <p:nvSpPr>
-          <p:cNvPr id="5" name="Text Placeholder 4"/>
+          <p:cNvPr id="2" name="Text Placeholder 1"/>
           <p:cNvSpPr>
             <a:spLocks noGrp="1"/>
           </p:cNvSpPr>
           <p:nvPr>
-            <p:ph type="body" sz="quarter" idx="10"/>
+            <p:ph type="body" sz="quarter" idx="15"/>
           </p:nvPr>
         </p:nvSpPr>
         <p:spPr/>
@@ -22173,18 +22845,24 @@
           <a:bodyPr/>
           <a:lstStyle/>
           <a:p>
-            <a:endParaRPr lang="en-US" dirty="0"/>
+            <a:endParaRPr lang="en-US" dirty="0">
+              <a:solidFill>
+                <a:schemeClr val="tx1">
+                  <a:lumMod val="75000"/>
+                </a:schemeClr>
+              </a:solidFill>
+            </a:endParaRPr>
           </a:p>
         </p:txBody>
       </p:sp>
       <p:sp>
         <p:nvSpPr>
-          <p:cNvPr id="4" name="Title 3"/>
+          <p:cNvPr id="5" name="Title 4"/>
           <p:cNvSpPr>
             <a:spLocks noGrp="1"/>
           </p:cNvSpPr>
           <p:nvPr>
-            <p:ph type="title"/>
+            <p:ph type="ctrTitle"/>
           </p:nvPr>
         </p:nvSpPr>
         <p:spPr/>
@@ -22193,26 +22871,50 @@
           <a:lstStyle/>
           <a:p>
             <a:r>
-              <a:rPr lang="en-US" dirty="0" smtClean="0"/>
-              <a:t>Additive charts</a:t>
-            </a:r>
-            <a:endParaRPr lang="en-US" dirty="0"/>
+              <a:rPr lang="en-US" dirty="0" smtClean="0">
+                <a:latin typeface="+mn-lt"/>
+                <a:ea typeface="Segoe UI Black" panose="020B0A02040204020203" pitchFamily="34" charset="0"/>
+                <a:cs typeface="Segoe UI Black" panose="020B0A02040204020203" pitchFamily="34" charset="0"/>
+              </a:rPr>
+              <a:t>basic charting</a:t>
+            </a:r>
+            <a:endParaRPr lang="en-US" dirty="0">
+              <a:latin typeface="+mn-lt"/>
+              <a:ea typeface="Segoe UI Black" panose="020B0A02040204020203" pitchFamily="34" charset="0"/>
+              <a:cs typeface="Segoe UI Black" panose="020B0A02040204020203" pitchFamily="34" charset="0"/>
+            </a:endParaRPr>
           </a:p>
         </p:txBody>
       </p:sp>
     </p:spTree>
     <p:extLst>
       <p:ext uri="{BB962C8B-B14F-4D97-AF65-F5344CB8AC3E}">
-        <p14:creationId xmlns:p14="http://schemas.microsoft.com/office/powerpoint/2010/main" val="1591469076"/>
+        <p14:creationId xmlns:p14="http://schemas.microsoft.com/office/powerpoint/2010/main" val="4219199459"/>
       </p:ext>
     </p:extLst>
   </p:cSld>
   <p:clrMapOvr>
     <a:masterClrMapping/>
   </p:clrMapOvr>
-  <p:transition>
-    <p:fade/>
-  </p:transition>
+  <mc:AlternateContent xmlns:mc="http://schemas.openxmlformats.org/markup-compatibility/2006" xmlns:p14="http://schemas.microsoft.com/office/powerpoint/2010/main">
+    <mc:Choice Requires="p14">
+      <p:transition spd="med" p14:dur="700">
+        <p:fade/>
+      </p:transition>
+    </mc:Choice>
+    <mc:Fallback xmlns="">
+      <p:transition spd="med">
+        <p:fade/>
+      </p:transition>
+    </mc:Fallback>
+  </mc:AlternateContent>
+  <p:timing>
+    <p:tnLst>
+      <p:par>
+        <p:cTn id="1" dur="indefinite" restart="never" nodeType="tmRoot"/>
+      </p:par>
+    </p:tnLst>
+  </p:timing>
 </p:sld>
 </file>
 
@@ -22243,11 +22945,53 @@
             <p:ph type="body" sz="quarter" idx="10"/>
           </p:nvPr>
         </p:nvSpPr>
-        <p:spPr/>
+        <p:spPr>
+          <a:xfrm>
+            <a:off x="274638" y="1212850"/>
+            <a:ext cx="5994809" cy="4555093"/>
+          </a:xfrm>
+        </p:spPr>
         <p:txBody>
           <a:bodyPr/>
           <a:lstStyle/>
           <a:p>
+            <a:pPr marL="0" indent="0">
+              <a:buNone/>
+            </a:pPr>
+            <a:r>
+              <a:rPr lang="en-US" dirty="0" smtClean="0"/>
+              <a:t>Frequent starting point for a data visualization</a:t>
+            </a:r>
+          </a:p>
+          <a:p>
+            <a:pPr marL="0" indent="0">
+              <a:buNone/>
+            </a:pPr>
+            <a:endParaRPr lang="en-US" dirty="0"/>
+          </a:p>
+          <a:p>
+            <a:pPr marL="0" indent="0">
+              <a:buNone/>
+            </a:pPr>
+            <a:r>
+              <a:rPr lang="en-US" dirty="0" smtClean="0"/>
+              <a:t>Good for data exploration</a:t>
+            </a:r>
+          </a:p>
+          <a:p>
+            <a:pPr marL="0" indent="0">
+              <a:buNone/>
+            </a:pPr>
+            <a:endParaRPr lang="en-US" dirty="0" smtClean="0"/>
+          </a:p>
+          <a:p>
+            <a:pPr marL="0" indent="0">
+              <a:buNone/>
+            </a:pPr>
+            <a:r>
+              <a:rPr lang="en-US" dirty="0" smtClean="0"/>
+              <a:t>Different styles reveal different stories</a:t>
+            </a:r>
             <a:endParaRPr lang="en-US" dirty="0"/>
           </a:p>
         </p:txBody>
@@ -22269,16 +23013,40 @@
           <a:p>
             <a:r>
               <a:rPr lang="en-US" dirty="0" smtClean="0"/>
-              <a:t>Pie Charts</a:t>
+              <a:t>Simple Excel charting </a:t>
             </a:r>
             <a:endParaRPr lang="en-US" dirty="0"/>
           </a:p>
         </p:txBody>
       </p:sp>
+      <p:pic>
+        <p:nvPicPr>
+          <p:cNvPr id="2" name="Picture 1"/>
+          <p:cNvPicPr>
+            <a:picLocks noChangeAspect="1"/>
+          </p:cNvPicPr>
+          <p:nvPr/>
+        </p:nvPicPr>
+        <p:blipFill>
+          <a:blip r:embed="rId2"/>
+          <a:stretch>
+            <a:fillRect/>
+          </a:stretch>
+        </p:blipFill>
+        <p:spPr>
+          <a:xfrm>
+            <a:off x="6269447" y="1212849"/>
+            <a:ext cx="5909673" cy="2360613"/>
+          </a:xfrm>
+          <a:prstGeom prst="rect">
+            <a:avLst/>
+          </a:prstGeom>
+        </p:spPr>
+      </p:pic>
     </p:spTree>
     <p:extLst>
       <p:ext uri="{BB962C8B-B14F-4D97-AF65-F5344CB8AC3E}">
-        <p14:creationId xmlns:p14="http://schemas.microsoft.com/office/powerpoint/2010/main" val="3156633140"/>
+        <p14:creationId xmlns:p14="http://schemas.microsoft.com/office/powerpoint/2010/main" val="4265798170"/>
       </p:ext>
     </p:extLst>
   </p:cSld>
@@ -22318,12 +23086,47 @@
             <p:ph type="body" sz="quarter" idx="10"/>
           </p:nvPr>
         </p:nvSpPr>
-        <p:spPr/>
+        <p:spPr>
+          <a:xfrm>
+            <a:off x="274638" y="1212850"/>
+            <a:ext cx="4642419" cy="3323987"/>
+          </a:xfrm>
+        </p:spPr>
         <p:txBody>
           <a:bodyPr/>
           <a:lstStyle/>
           <a:p>
+            <a:pPr marL="0" indent="0">
+              <a:buNone/>
+            </a:pPr>
+            <a:r>
+              <a:rPr lang="en-US" dirty="0" smtClean="0"/>
+              <a:t>Values stack on</a:t>
+            </a:r>
+          </a:p>
+          <a:p>
+            <a:pPr marL="0" indent="0">
+              <a:buNone/>
+            </a:pPr>
+            <a:r>
+              <a:rPr lang="en-US" dirty="0" smtClean="0"/>
+              <a:t>each other</a:t>
+            </a:r>
+          </a:p>
+          <a:p>
+            <a:pPr marL="0" indent="0">
+              <a:buNone/>
+            </a:pPr>
             <a:endParaRPr lang="en-US" dirty="0"/>
+          </a:p>
+          <a:p>
+            <a:pPr marL="0" indent="0">
+              <a:buNone/>
+            </a:pPr>
+            <a:r>
+              <a:rPr lang="en-US" dirty="0" smtClean="0"/>
+              <a:t>Used to show all parts of a sum</a:t>
+            </a:r>
           </a:p>
         </p:txBody>
       </p:sp>
@@ -22344,12 +23147,651 @@
           <a:p>
             <a:r>
               <a:rPr lang="en-US" dirty="0" smtClean="0"/>
-              <a:t>Network Charts</a:t>
+              <a:t>Simple bar chart</a:t>
             </a:r>
             <a:endParaRPr lang="en-US" dirty="0"/>
           </a:p>
         </p:txBody>
       </p:sp>
+      <p:pic>
+        <p:nvPicPr>
+          <p:cNvPr id="3" name="Picture 2"/>
+          <p:cNvPicPr>
+            <a:picLocks noChangeAspect="1"/>
+          </p:cNvPicPr>
+          <p:nvPr/>
+        </p:nvPicPr>
+        <p:blipFill>
+          <a:blip r:embed="rId2"/>
+          <a:stretch>
+            <a:fillRect/>
+          </a:stretch>
+        </p:blipFill>
+        <p:spPr>
+          <a:xfrm>
+            <a:off x="4770437" y="2278062"/>
+            <a:ext cx="7029723" cy="3960813"/>
+          </a:xfrm>
+          <a:prstGeom prst="rect">
+            <a:avLst/>
+          </a:prstGeom>
+        </p:spPr>
+      </p:pic>
+    </p:spTree>
+    <p:extLst>
+      <p:ext uri="{BB962C8B-B14F-4D97-AF65-F5344CB8AC3E}">
+        <p14:creationId xmlns:p14="http://schemas.microsoft.com/office/powerpoint/2010/main" val="1591469076"/>
+      </p:ext>
+    </p:extLst>
+  </p:cSld>
+  <p:clrMapOvr>
+    <a:masterClrMapping/>
+  </p:clrMapOvr>
+  <p:transition>
+    <p:fade/>
+  </p:transition>
+</p:sld>
+</file>
+
+<file path=ppt/slides/slide34.xml><?xml version="1.0" encoding="utf-8"?>
+<p:sld xmlns:a="http://schemas.openxmlformats.org/drawingml/2006/main" xmlns:r="http://schemas.openxmlformats.org/officeDocument/2006/relationships" xmlns:p="http://schemas.openxmlformats.org/presentationml/2006/main">
+  <p:cSld>
+    <p:spTree>
+      <p:nvGrpSpPr>
+        <p:cNvPr id="1" name=""/>
+        <p:cNvGrpSpPr/>
+        <p:nvPr/>
+      </p:nvGrpSpPr>
+      <p:grpSpPr>
+        <a:xfrm>
+          <a:off x="0" y="0"/>
+          <a:ext cx="0" cy="0"/>
+          <a:chOff x="0" y="0"/>
+          <a:chExt cx="0" cy="0"/>
+        </a:xfrm>
+      </p:grpSpPr>
+      <p:sp>
+        <p:nvSpPr>
+          <p:cNvPr id="5" name="Text Placeholder 4"/>
+          <p:cNvSpPr>
+            <a:spLocks noGrp="1"/>
+          </p:cNvSpPr>
+          <p:nvPr>
+            <p:ph type="body" sz="quarter" idx="10"/>
+          </p:nvPr>
+        </p:nvSpPr>
+        <p:spPr>
+          <a:xfrm>
+            <a:off x="274638" y="1212850"/>
+            <a:ext cx="4642419" cy="3323987"/>
+          </a:xfrm>
+        </p:spPr>
+        <p:txBody>
+          <a:bodyPr/>
+          <a:lstStyle/>
+          <a:p>
+            <a:pPr marL="0" indent="0">
+              <a:buNone/>
+            </a:pPr>
+            <a:r>
+              <a:rPr lang="en-US" dirty="0" smtClean="0"/>
+              <a:t>Values stack on</a:t>
+            </a:r>
+          </a:p>
+          <a:p>
+            <a:pPr marL="0" indent="0">
+              <a:buNone/>
+            </a:pPr>
+            <a:r>
+              <a:rPr lang="en-US" dirty="0" smtClean="0"/>
+              <a:t>each other</a:t>
+            </a:r>
+          </a:p>
+          <a:p>
+            <a:pPr marL="0" indent="0">
+              <a:buNone/>
+            </a:pPr>
+            <a:endParaRPr lang="en-US" dirty="0"/>
+          </a:p>
+          <a:p>
+            <a:pPr marL="0" indent="0">
+              <a:buNone/>
+            </a:pPr>
+            <a:r>
+              <a:rPr lang="en-US" dirty="0" smtClean="0"/>
+              <a:t>Used to show all parts of a sum</a:t>
+            </a:r>
+          </a:p>
+        </p:txBody>
+      </p:sp>
+      <p:sp>
+        <p:nvSpPr>
+          <p:cNvPr id="4" name="Title 3"/>
+          <p:cNvSpPr>
+            <a:spLocks noGrp="1"/>
+          </p:cNvSpPr>
+          <p:nvPr>
+            <p:ph type="title"/>
+          </p:nvPr>
+        </p:nvSpPr>
+        <p:spPr/>
+        <p:txBody>
+          <a:bodyPr/>
+          <a:lstStyle/>
+          <a:p>
+            <a:r>
+              <a:rPr lang="en-US" dirty="0" smtClean="0"/>
+              <a:t>Additive charts</a:t>
+            </a:r>
+            <a:endParaRPr lang="en-US" dirty="0"/>
+          </a:p>
+        </p:txBody>
+      </p:sp>
+      <p:pic>
+        <p:nvPicPr>
+          <p:cNvPr id="2" name="Picture 1"/>
+          <p:cNvPicPr>
+            <a:picLocks noChangeAspect="1"/>
+          </p:cNvPicPr>
+          <p:nvPr/>
+        </p:nvPicPr>
+        <p:blipFill>
+          <a:blip r:embed="rId2"/>
+          <a:stretch>
+            <a:fillRect/>
+          </a:stretch>
+        </p:blipFill>
+        <p:spPr>
+          <a:xfrm>
+            <a:off x="4615624" y="1439862"/>
+            <a:ext cx="7820851" cy="4305227"/>
+          </a:xfrm>
+          <a:prstGeom prst="rect">
+            <a:avLst/>
+          </a:prstGeom>
+        </p:spPr>
+      </p:pic>
+    </p:spTree>
+    <p:extLst>
+      <p:ext uri="{BB962C8B-B14F-4D97-AF65-F5344CB8AC3E}">
+        <p14:creationId xmlns:p14="http://schemas.microsoft.com/office/powerpoint/2010/main" val="1609492639"/>
+      </p:ext>
+    </p:extLst>
+  </p:cSld>
+  <p:clrMapOvr>
+    <a:masterClrMapping/>
+  </p:clrMapOvr>
+  <p:transition>
+    <p:fade/>
+  </p:transition>
+</p:sld>
+</file>
+
+<file path=ppt/slides/slide35.xml><?xml version="1.0" encoding="utf-8"?>
+<p:sld xmlns:a="http://schemas.openxmlformats.org/drawingml/2006/main" xmlns:r="http://schemas.openxmlformats.org/officeDocument/2006/relationships" xmlns:p="http://schemas.openxmlformats.org/presentationml/2006/main">
+  <p:cSld>
+    <p:spTree>
+      <p:nvGrpSpPr>
+        <p:cNvPr id="1" name=""/>
+        <p:cNvGrpSpPr/>
+        <p:nvPr/>
+      </p:nvGrpSpPr>
+      <p:grpSpPr>
+        <a:xfrm>
+          <a:off x="0" y="0"/>
+          <a:ext cx="0" cy="0"/>
+          <a:chOff x="0" y="0"/>
+          <a:chExt cx="0" cy="0"/>
+        </a:xfrm>
+      </p:grpSpPr>
+      <p:sp>
+        <p:nvSpPr>
+          <p:cNvPr id="5" name="Text Placeholder 4"/>
+          <p:cNvSpPr>
+            <a:spLocks noGrp="1"/>
+          </p:cNvSpPr>
+          <p:nvPr>
+            <p:ph type="body" sz="quarter" idx="10"/>
+          </p:nvPr>
+        </p:nvSpPr>
+        <p:spPr>
+          <a:xfrm>
+            <a:off x="274638" y="1212850"/>
+            <a:ext cx="4642419" cy="3200876"/>
+          </a:xfrm>
+        </p:spPr>
+        <p:txBody>
+          <a:bodyPr/>
+          <a:lstStyle/>
+          <a:p>
+            <a:pPr marL="0" indent="0">
+              <a:buNone/>
+            </a:pPr>
+            <a:r>
+              <a:rPr lang="en-US" dirty="0" smtClean="0"/>
+              <a:t>Simple and clean</a:t>
+            </a:r>
+          </a:p>
+          <a:p>
+            <a:pPr marL="0" indent="0">
+              <a:buNone/>
+            </a:pPr>
+            <a:endParaRPr lang="en-US" dirty="0"/>
+          </a:p>
+          <a:p>
+            <a:pPr marL="0" indent="0">
+              <a:buNone/>
+            </a:pPr>
+            <a:r>
+              <a:rPr lang="en-US" dirty="0" smtClean="0"/>
+              <a:t>Excellent for indicating trend lines in data</a:t>
+            </a:r>
+          </a:p>
+        </p:txBody>
+      </p:sp>
+      <p:sp>
+        <p:nvSpPr>
+          <p:cNvPr id="4" name="Title 3"/>
+          <p:cNvSpPr>
+            <a:spLocks noGrp="1"/>
+          </p:cNvSpPr>
+          <p:nvPr>
+            <p:ph type="title"/>
+          </p:nvPr>
+        </p:nvSpPr>
+        <p:spPr/>
+        <p:txBody>
+          <a:bodyPr/>
+          <a:lstStyle/>
+          <a:p>
+            <a:r>
+              <a:rPr lang="en-US" dirty="0" smtClean="0"/>
+              <a:t>Line Charts</a:t>
+            </a:r>
+            <a:endParaRPr lang="en-US" dirty="0"/>
+          </a:p>
+        </p:txBody>
+      </p:sp>
+      <p:pic>
+        <p:nvPicPr>
+          <p:cNvPr id="2" name="Picture 1"/>
+          <p:cNvPicPr>
+            <a:picLocks noChangeAspect="1"/>
+          </p:cNvPicPr>
+          <p:nvPr/>
+        </p:nvPicPr>
+        <p:blipFill>
+          <a:blip r:embed="rId2"/>
+          <a:stretch>
+            <a:fillRect/>
+          </a:stretch>
+        </p:blipFill>
+        <p:spPr>
+          <a:xfrm>
+            <a:off x="4618037" y="1439862"/>
+            <a:ext cx="7387104" cy="4191000"/>
+          </a:xfrm>
+          <a:prstGeom prst="rect">
+            <a:avLst/>
+          </a:prstGeom>
+        </p:spPr>
+      </p:pic>
+    </p:spTree>
+    <p:extLst>
+      <p:ext uri="{BB962C8B-B14F-4D97-AF65-F5344CB8AC3E}">
+        <p14:creationId xmlns:p14="http://schemas.microsoft.com/office/powerpoint/2010/main" val="877753373"/>
+      </p:ext>
+    </p:extLst>
+  </p:cSld>
+  <p:clrMapOvr>
+    <a:masterClrMapping/>
+  </p:clrMapOvr>
+  <p:transition>
+    <p:fade/>
+  </p:transition>
+</p:sld>
+</file>
+
+<file path=ppt/slides/slide36.xml><?xml version="1.0" encoding="utf-8"?>
+<p:sld xmlns:a="http://schemas.openxmlformats.org/drawingml/2006/main" xmlns:r="http://schemas.openxmlformats.org/officeDocument/2006/relationships" xmlns:p="http://schemas.openxmlformats.org/presentationml/2006/main">
+  <p:cSld>
+    <p:spTree>
+      <p:nvGrpSpPr>
+        <p:cNvPr id="1" name=""/>
+        <p:cNvGrpSpPr/>
+        <p:nvPr/>
+      </p:nvGrpSpPr>
+      <p:grpSpPr>
+        <a:xfrm>
+          <a:off x="0" y="0"/>
+          <a:ext cx="0" cy="0"/>
+          <a:chOff x="0" y="0"/>
+          <a:chExt cx="0" cy="0"/>
+        </a:xfrm>
+      </p:grpSpPr>
+      <p:sp>
+        <p:nvSpPr>
+          <p:cNvPr id="5" name="Text Placeholder 4"/>
+          <p:cNvSpPr>
+            <a:spLocks noGrp="1"/>
+          </p:cNvSpPr>
+          <p:nvPr>
+            <p:ph type="body" sz="quarter" idx="10"/>
+          </p:nvPr>
+        </p:nvSpPr>
+        <p:spPr>
+          <a:xfrm>
+            <a:off x="274638" y="1212850"/>
+            <a:ext cx="4597631" cy="4555093"/>
+          </a:xfrm>
+        </p:spPr>
+        <p:txBody>
+          <a:bodyPr/>
+          <a:lstStyle/>
+          <a:p>
+            <a:pPr marL="0" indent="0">
+              <a:buNone/>
+            </a:pPr>
+            <a:r>
+              <a:rPr lang="en-US" dirty="0" smtClean="0"/>
+              <a:t>Show parts of a whole</a:t>
+            </a:r>
+          </a:p>
+          <a:p>
+            <a:pPr marL="0" indent="0">
+              <a:buNone/>
+            </a:pPr>
+            <a:endParaRPr lang="en-US" dirty="0"/>
+          </a:p>
+          <a:p>
+            <a:pPr marL="0" indent="0">
+              <a:buNone/>
+            </a:pPr>
+            <a:r>
+              <a:rPr lang="en-US" dirty="0" smtClean="0"/>
+              <a:t>Keep it to very few parts</a:t>
+            </a:r>
+          </a:p>
+          <a:p>
+            <a:pPr marL="0" indent="0">
+              <a:buNone/>
+            </a:pPr>
+            <a:endParaRPr lang="en-US" dirty="0"/>
+          </a:p>
+          <a:p>
+            <a:pPr marL="0" indent="0">
+              <a:buNone/>
+            </a:pPr>
+            <a:r>
+              <a:rPr lang="en-US" dirty="0" smtClean="0"/>
+              <a:t>Often despised</a:t>
+            </a:r>
+            <a:endParaRPr lang="en-US" dirty="0"/>
+          </a:p>
+        </p:txBody>
+      </p:sp>
+      <p:sp>
+        <p:nvSpPr>
+          <p:cNvPr id="4" name="Title 3"/>
+          <p:cNvSpPr>
+            <a:spLocks noGrp="1"/>
+          </p:cNvSpPr>
+          <p:nvPr>
+            <p:ph type="title"/>
+          </p:nvPr>
+        </p:nvSpPr>
+        <p:spPr/>
+        <p:txBody>
+          <a:bodyPr/>
+          <a:lstStyle/>
+          <a:p>
+            <a:r>
+              <a:rPr lang="en-US" dirty="0" smtClean="0"/>
+              <a:t>Pie Charts</a:t>
+            </a:r>
+            <a:endParaRPr lang="en-US" dirty="0"/>
+          </a:p>
+        </p:txBody>
+      </p:sp>
+      <p:pic>
+        <p:nvPicPr>
+          <p:cNvPr id="2" name="Picture 1"/>
+          <p:cNvPicPr>
+            <a:picLocks noChangeAspect="1"/>
+          </p:cNvPicPr>
+          <p:nvPr/>
+        </p:nvPicPr>
+        <p:blipFill>
+          <a:blip r:embed="rId2"/>
+          <a:stretch>
+            <a:fillRect/>
+          </a:stretch>
+        </p:blipFill>
+        <p:spPr>
+          <a:xfrm>
+            <a:off x="4875115" y="1212848"/>
+            <a:ext cx="7286242" cy="4799013"/>
+          </a:xfrm>
+          <a:prstGeom prst="rect">
+            <a:avLst/>
+          </a:prstGeom>
+        </p:spPr>
+      </p:pic>
+    </p:spTree>
+    <p:extLst>
+      <p:ext uri="{BB962C8B-B14F-4D97-AF65-F5344CB8AC3E}">
+        <p14:creationId xmlns:p14="http://schemas.microsoft.com/office/powerpoint/2010/main" val="3156633140"/>
+      </p:ext>
+    </p:extLst>
+  </p:cSld>
+  <p:clrMapOvr>
+    <a:masterClrMapping/>
+  </p:clrMapOvr>
+  <p:transition>
+    <p:fade/>
+  </p:transition>
+</p:sld>
+</file>
+
+<file path=ppt/slides/slide37.xml><?xml version="1.0" encoding="utf-8"?>
+<p:sld xmlns:a="http://schemas.openxmlformats.org/drawingml/2006/main" xmlns:r="http://schemas.openxmlformats.org/officeDocument/2006/relationships" xmlns:p="http://schemas.openxmlformats.org/presentationml/2006/main">
+  <p:cSld>
+    <p:spTree>
+      <p:nvGrpSpPr>
+        <p:cNvPr id="1" name=""/>
+        <p:cNvGrpSpPr/>
+        <p:nvPr/>
+      </p:nvGrpSpPr>
+      <p:grpSpPr>
+        <a:xfrm>
+          <a:off x="0" y="0"/>
+          <a:ext cx="0" cy="0"/>
+          <a:chOff x="0" y="0"/>
+          <a:chExt cx="0" cy="0"/>
+        </a:xfrm>
+      </p:grpSpPr>
+      <mc:AlternateContent xmlns:mc="http://schemas.openxmlformats.org/markup-compatibility/2006">
+        <mc:Choice xmlns:a14="http://schemas.microsoft.com/office/drawing/2010/main" Requires="a14">
+          <p:sp>
+            <p:nvSpPr>
+              <p:cNvPr id="5" name="Text Placeholder 4"/>
+              <p:cNvSpPr>
+                <a:spLocks noGrp="1"/>
+              </p:cNvSpPr>
+              <p:nvPr>
+                <p:ph type="body" sz="quarter" idx="10"/>
+              </p:nvPr>
+            </p:nvSpPr>
+            <p:spPr>
+              <a:xfrm>
+                <a:off x="274638" y="1212850"/>
+                <a:ext cx="5562599" cy="5109091"/>
+              </a:xfrm>
+            </p:spPr>
+            <p:txBody>
+              <a:bodyPr/>
+              <a:lstStyle/>
+              <a:p>
+                <a:pPr marL="0" indent="0">
+                  <a:buNone/>
+                </a:pPr>
+                <a:r>
+                  <a:rPr lang="en-US" dirty="0" smtClean="0"/>
+                  <a:t>Looking for correlation in corresponding values</a:t>
+                </a:r>
+              </a:p>
+              <a:p>
+                <a:pPr marL="0" indent="0">
+                  <a:buNone/>
+                </a:pPr>
+                <a:endParaRPr lang="en-US" dirty="0"/>
+              </a:p>
+              <a:p>
+                <a:pPr marL="0" indent="0">
+                  <a:buNone/>
+                </a:pPr>
+                <a:r>
+                  <a:rPr lang="en-US" dirty="0" smtClean="0"/>
+                  <a:t>Right-click to add a “trend line”</a:t>
+                </a:r>
+              </a:p>
+              <a:p>
+                <a:pPr marL="0" indent="0">
+                  <a:buNone/>
+                </a:pPr>
+                <a:endParaRPr lang="en-US" dirty="0"/>
+              </a:p>
+              <a:p>
+                <a:pPr marL="0" indent="0">
+                  <a:buNone/>
+                </a:pPr>
+                <a14:m>
+                  <m:oMath xmlns:m="http://schemas.openxmlformats.org/officeDocument/2006/math">
+                    <m:sSup>
+                      <m:sSupPr>
+                        <m:ctrlPr>
+                          <a:rPr lang="en-US" i="1" smtClean="0">
+                            <a:latin typeface="Cambria Math" panose="02040503050406030204" pitchFamily="18" charset="0"/>
+                          </a:rPr>
+                        </m:ctrlPr>
+                      </m:sSupPr>
+                      <m:e>
+                        <m:r>
+                          <a:rPr lang="en-US" b="0" i="1" smtClean="0">
+                            <a:latin typeface="Cambria Math" panose="02040503050406030204" pitchFamily="18" charset="0"/>
+                          </a:rPr>
+                          <m:t>𝑅</m:t>
+                        </m:r>
+                      </m:e>
+                      <m:sup>
+                        <m:r>
+                          <a:rPr lang="en-US" i="1" smtClean="0">
+                            <a:latin typeface="Cambria Math" panose="02040503050406030204" pitchFamily="18" charset="0"/>
+                          </a:rPr>
+                          <m:t>2</m:t>
+                        </m:r>
+                      </m:sup>
+                    </m:sSup>
+                  </m:oMath>
+                </a14:m>
+                <a:r>
+                  <a:rPr lang="en-US" dirty="0" smtClean="0"/>
+                  <a:t> is the coefficient of </a:t>
+                </a:r>
+                <a:r>
+                  <a:rPr lang="en-US" dirty="0" err="1" smtClean="0"/>
+                  <a:t>detemination</a:t>
+                </a:r>
+                <a:endParaRPr lang="en-US" dirty="0"/>
+              </a:p>
+            </p:txBody>
+          </p:sp>
+        </mc:Choice>
+        <mc:Fallback>
+          <p:sp>
+            <p:nvSpPr>
+              <p:cNvPr id="5" name="Text Placeholder 4"/>
+              <p:cNvSpPr>
+                <a:spLocks noGrp="1" noRot="1" noChangeAspect="1" noMove="1" noResize="1" noEditPoints="1" noAdjustHandles="1" noChangeArrowheads="1" noChangeShapeType="1" noTextEdit="1"/>
+              </p:cNvSpPr>
+              <p:nvPr>
+                <p:ph type="body" sz="quarter" idx="10"/>
+              </p:nvPr>
+            </p:nvSpPr>
+            <p:spPr>
+              <a:xfrm>
+                <a:off x="274638" y="1212850"/>
+                <a:ext cx="5562599" cy="5109091"/>
+              </a:xfrm>
+              <a:blipFill rotWithShape="0">
+                <a:blip r:embed="rId2"/>
+                <a:stretch>
+                  <a:fillRect/>
+                </a:stretch>
+              </a:blipFill>
+            </p:spPr>
+            <p:txBody>
+              <a:bodyPr/>
+              <a:lstStyle/>
+              <a:p>
+                <a:r>
+                  <a:rPr lang="en-US">
+                    <a:noFill/>
+                  </a:rPr>
+                  <a:t> </a:t>
+                </a:r>
+              </a:p>
+            </p:txBody>
+          </p:sp>
+        </mc:Fallback>
+      </mc:AlternateContent>
+      <p:sp>
+        <p:nvSpPr>
+          <p:cNvPr id="4" name="Title 3"/>
+          <p:cNvSpPr>
+            <a:spLocks noGrp="1"/>
+          </p:cNvSpPr>
+          <p:nvPr>
+            <p:ph type="title"/>
+          </p:nvPr>
+        </p:nvSpPr>
+        <p:spPr/>
+        <p:txBody>
+          <a:bodyPr/>
+          <a:lstStyle/>
+          <a:p>
+            <a:r>
+              <a:rPr lang="en-US" dirty="0" smtClean="0"/>
+              <a:t>Multi Variate Charts</a:t>
+            </a:r>
+            <a:endParaRPr lang="en-US" dirty="0"/>
+          </a:p>
+        </p:txBody>
+      </p:sp>
+      <p:pic>
+        <p:nvPicPr>
+          <p:cNvPr id="2" name="Picture 1"/>
+          <p:cNvPicPr>
+            <a:picLocks noChangeAspect="1"/>
+          </p:cNvPicPr>
+          <p:nvPr/>
+        </p:nvPicPr>
+        <p:blipFill>
+          <a:blip r:embed="rId3"/>
+          <a:stretch>
+            <a:fillRect/>
+          </a:stretch>
+        </p:blipFill>
+        <p:spPr>
+          <a:xfrm>
+            <a:off x="5837237" y="2354262"/>
+            <a:ext cx="6238157" cy="3962400"/>
+          </a:xfrm>
+          <a:prstGeom prst="rect">
+            <a:avLst/>
+          </a:prstGeom>
+        </p:spPr>
+      </p:pic>
     </p:spTree>
     <p:extLst>
       <p:ext uri="{BB962C8B-B14F-4D97-AF65-F5344CB8AC3E}">
@@ -22363,6 +23805,182 @@
   <p:transition>
     <p:fade/>
   </p:transition>
+</p:sld>
+</file>
+
+<file path=ppt/slides/slide38.xml><?xml version="1.0" encoding="utf-8"?>
+<p:sld xmlns:a="http://schemas.openxmlformats.org/drawingml/2006/main" xmlns:r="http://schemas.openxmlformats.org/officeDocument/2006/relationships" xmlns:p="http://schemas.openxmlformats.org/presentationml/2006/main">
+  <p:cSld>
+    <p:spTree>
+      <p:nvGrpSpPr>
+        <p:cNvPr id="1" name=""/>
+        <p:cNvGrpSpPr/>
+        <p:nvPr/>
+      </p:nvGrpSpPr>
+      <p:grpSpPr>
+        <a:xfrm>
+          <a:off x="0" y="0"/>
+          <a:ext cx="0" cy="0"/>
+          <a:chOff x="0" y="0"/>
+          <a:chExt cx="0" cy="0"/>
+        </a:xfrm>
+      </p:grpSpPr>
+      <p:sp>
+        <p:nvSpPr>
+          <p:cNvPr id="2" name="Text Placeholder 1"/>
+          <p:cNvSpPr>
+            <a:spLocks noGrp="1"/>
+          </p:cNvSpPr>
+          <p:nvPr>
+            <p:ph type="body" sz="quarter" idx="15"/>
+          </p:nvPr>
+        </p:nvSpPr>
+        <p:spPr>
+          <a:xfrm>
+            <a:off x="4846638" y="2049462"/>
+            <a:ext cx="7315203" cy="2819400"/>
+          </a:xfrm>
+        </p:spPr>
+        <p:txBody>
+          <a:bodyPr/>
+          <a:lstStyle/>
+          <a:p>
+            <a:r>
+              <a:rPr lang="en-US" dirty="0" smtClean="0">
+                <a:solidFill>
+                  <a:schemeClr val="tx1">
+                    <a:lumMod val="75000"/>
+                  </a:schemeClr>
+                </a:solidFill>
+              </a:rPr>
+              <a:t>Pull </a:t>
+            </a:r>
+            <a:r>
+              <a:rPr lang="en-US" dirty="0" smtClean="0">
+                <a:solidFill>
+                  <a:schemeClr val="tx1">
+                    <a:lumMod val="75000"/>
+                  </a:schemeClr>
+                </a:solidFill>
+              </a:rPr>
+              <a:t>jobs data from BLS</a:t>
+            </a:r>
+            <a:endParaRPr lang="en-US" dirty="0" smtClean="0">
+              <a:solidFill>
+                <a:schemeClr val="tx1">
+                  <a:lumMod val="75000"/>
+                </a:schemeClr>
+              </a:solidFill>
+            </a:endParaRPr>
+          </a:p>
+          <a:p>
+            <a:r>
+              <a:rPr lang="en-US" dirty="0" smtClean="0">
+                <a:solidFill>
+                  <a:schemeClr val="tx1">
+                    <a:lumMod val="75000"/>
+                  </a:schemeClr>
+                </a:solidFill>
+              </a:rPr>
+              <a:t>Organize multi-sheet data set</a:t>
+            </a:r>
+            <a:endParaRPr lang="en-US" dirty="0" smtClean="0">
+              <a:solidFill>
+                <a:schemeClr val="tx1">
+                  <a:lumMod val="75000"/>
+                </a:schemeClr>
+              </a:solidFill>
+            </a:endParaRPr>
+          </a:p>
+          <a:p>
+            <a:r>
+              <a:rPr lang="en-US" dirty="0" smtClean="0">
+                <a:solidFill>
+                  <a:schemeClr val="tx1">
+                    <a:lumMod val="75000"/>
+                  </a:schemeClr>
+                </a:solidFill>
+              </a:rPr>
+              <a:t>Visualize within Excel</a:t>
+            </a:r>
+          </a:p>
+          <a:p>
+            <a:r>
+              <a:rPr lang="en-US" dirty="0" smtClean="0">
+                <a:solidFill>
+                  <a:schemeClr val="tx1">
+                    <a:lumMod val="75000"/>
+                  </a:schemeClr>
+                </a:solidFill>
+              </a:rPr>
+              <a:t>Relative vs. Absolute differences</a:t>
+            </a:r>
+            <a:endParaRPr lang="en-US" dirty="0" smtClean="0">
+              <a:solidFill>
+                <a:schemeClr val="tx1">
+                  <a:lumMod val="75000"/>
+                </a:schemeClr>
+              </a:solidFill>
+            </a:endParaRPr>
+          </a:p>
+        </p:txBody>
+      </p:sp>
+      <p:sp>
+        <p:nvSpPr>
+          <p:cNvPr id="5" name="Title 4"/>
+          <p:cNvSpPr>
+            <a:spLocks noGrp="1"/>
+          </p:cNvSpPr>
+          <p:nvPr>
+            <p:ph type="ctrTitle"/>
+          </p:nvPr>
+        </p:nvSpPr>
+        <p:spPr/>
+        <p:txBody>
+          <a:bodyPr/>
+          <a:lstStyle/>
+          <a:p>
+            <a:r>
+              <a:rPr lang="en-US" dirty="0" smtClean="0"/>
+              <a:t>Lab </a:t>
+            </a:r>
+            <a:r>
+              <a:rPr lang="en-US" dirty="0" smtClean="0"/>
+              <a:t>2</a:t>
+            </a:r>
+            <a:endParaRPr lang="en-US" dirty="0"/>
+          </a:p>
+        </p:txBody>
+      </p:sp>
+    </p:spTree>
+    <p:extLst>
+      <p:ext uri="{BB962C8B-B14F-4D97-AF65-F5344CB8AC3E}">
+        <p14:creationId xmlns:p14="http://schemas.microsoft.com/office/powerpoint/2010/main" val="2930289399"/>
+      </p:ext>
+    </p:extLst>
+  </p:cSld>
+  <p:clrMapOvr>
+    <a:masterClrMapping/>
+  </p:clrMapOvr>
+  <mc:AlternateContent xmlns:mc="http://schemas.openxmlformats.org/markup-compatibility/2006">
+    <mc:Choice xmlns:p14="http://schemas.microsoft.com/office/powerpoint/2010/main" Requires="p14">
+      <p:transition spd="med" p14:dur="700">
+        <p:fade/>
+      </p:transition>
+    </mc:Choice>
+    <mc:Fallback>
+      <p:transition spd="med">
+        <p:fade/>
+      </p:transition>
+    </mc:Fallback>
+  </mc:AlternateContent>
+  <p:timing>
+    <p:tnLst>
+      <p:par>
+        <p:cTn id="1" dur="indefinite" restart="never" nodeType="tmRoot"/>
+      </p:par>
+    </p:tnLst>
+  </p:timing>
 </p:sld>
 </file>
 
@@ -22656,26 +24274,17 @@
           <a:p>
             <a:r>
               <a:rPr lang="en-US" dirty="0" smtClean="0"/>
-              <a:t>Accessible through </a:t>
-            </a:r>
+              <a:t>Accessible through online forms or API calls</a:t>
+            </a:r>
+          </a:p>
+          <a:p>
+            <a:endParaRPr lang="en-US" dirty="0"/>
+          </a:p>
+          <a:p>
             <a:r>
               <a:rPr lang="en-US" dirty="0" smtClean="0"/>
-              <a:t>online forms or API </a:t>
-            </a:r>
-            <a:r>
-              <a:rPr lang="en-US" dirty="0" smtClean="0"/>
-              <a:t>calls</a:t>
-            </a:r>
-          </a:p>
-          <a:p>
-            <a:endParaRPr lang="en-US" dirty="0"/>
-          </a:p>
-          <a:p>
-            <a:r>
-              <a:rPr lang="en-US" dirty="0" smtClean="0"/>
-              <a:t>Accessing APIs requires some programming experience</a:t>
-            </a:r>
-            <a:endParaRPr lang="en-US" dirty="0" smtClean="0"/>
+              <a:t>Accessing APIs usually requires some programming experience</a:t>
+            </a:r>
           </a:p>
           <a:p>
             <a:endParaRPr lang="en-US" dirty="0"/>
@@ -23027,12 +24636,70 @@
             <p:ph type="body" sz="quarter" idx="10"/>
           </p:nvPr>
         </p:nvSpPr>
-        <p:spPr/>
+        <p:spPr>
+          <a:xfrm>
+            <a:off x="274638" y="1212850"/>
+            <a:ext cx="11887200" cy="4124206"/>
+          </a:xfrm>
+        </p:spPr>
         <p:txBody>
           <a:bodyPr/>
           <a:lstStyle/>
           <a:p>
-            <a:endParaRPr lang="en-US"/>
+            <a:pPr marL="0" indent="0">
+              <a:buNone/>
+            </a:pPr>
+            <a:r>
+              <a:rPr lang="en-US" dirty="0" smtClean="0"/>
+              <a:t>Education</a:t>
+            </a:r>
+          </a:p>
+          <a:p>
+            <a:pPr marL="0" indent="0">
+              <a:buNone/>
+            </a:pPr>
+            <a:r>
+              <a:rPr lang="en-US" dirty="0" smtClean="0"/>
+              <a:t>Finance</a:t>
+            </a:r>
+          </a:p>
+          <a:p>
+            <a:pPr marL="0" indent="0">
+              <a:buNone/>
+            </a:pPr>
+            <a:r>
+              <a:rPr lang="en-US" dirty="0"/>
+              <a:t>Demographics </a:t>
+            </a:r>
+            <a:endParaRPr lang="en-US" dirty="0" smtClean="0"/>
+          </a:p>
+          <a:p>
+            <a:pPr marL="0" indent="0">
+              <a:buNone/>
+            </a:pPr>
+            <a:r>
+              <a:rPr lang="en-US" dirty="0" smtClean="0"/>
+              <a:t>Polling</a:t>
+            </a:r>
+          </a:p>
+          <a:p>
+            <a:pPr marL="0" indent="0">
+              <a:buNone/>
+            </a:pPr>
+            <a:r>
+              <a:rPr lang="en-US" dirty="0" smtClean="0"/>
+              <a:t>Elections</a:t>
+            </a:r>
+          </a:p>
+          <a:p>
+            <a:pPr marL="0" indent="0">
+              <a:buNone/>
+            </a:pPr>
+            <a:r>
+              <a:rPr lang="en-US" dirty="0" smtClean="0"/>
+              <a:t>Music</a:t>
+            </a:r>
+            <a:endParaRPr lang="en-US" dirty="0"/>
           </a:p>
         </p:txBody>
       </p:sp>
@@ -23053,7 +24720,7 @@
           <a:p>
             <a:r>
               <a:rPr lang="en-US" dirty="0" smtClean="0"/>
-              <a:t>(soft skill stuff)</a:t>
+              <a:t>Start With a Topic</a:t>
             </a:r>
             <a:endParaRPr lang="en-US" dirty="0"/>
           </a:p>
@@ -23102,12 +24769,79 @@
             <p:ph type="body" sz="quarter" idx="10"/>
           </p:nvPr>
         </p:nvSpPr>
-        <p:spPr/>
+        <p:spPr>
+          <a:xfrm>
+            <a:off x="274639" y="1246605"/>
+            <a:ext cx="5410199" cy="4690515"/>
+          </a:xfrm>
+        </p:spPr>
         <p:txBody>
           <a:bodyPr/>
           <a:lstStyle/>
           <a:p>
-            <a:endParaRPr lang="en-US"/>
+            <a:pPr marL="0" indent="0">
+              <a:buNone/>
+            </a:pPr>
+            <a:r>
+              <a:rPr lang="en-US" dirty="0" smtClean="0"/>
+              <a:t>Working with existing data will raise questions</a:t>
+            </a:r>
+          </a:p>
+          <a:p>
+            <a:pPr marL="0" indent="0">
+              <a:buNone/>
+            </a:pPr>
+            <a:endParaRPr lang="en-US" dirty="0"/>
+          </a:p>
+          <a:p>
+            <a:pPr marL="0" indent="0">
+              <a:buNone/>
+            </a:pPr>
+            <a:r>
+              <a:rPr lang="en-US" dirty="0" smtClean="0"/>
+              <a:t>You may have to collect the “missing link</a:t>
+            </a:r>
+            <a:r>
+              <a:rPr lang="en-US" dirty="0" smtClean="0"/>
+              <a:t>”</a:t>
+            </a:r>
+          </a:p>
+          <a:p>
+            <a:pPr marL="0" indent="0">
+              <a:buNone/>
+            </a:pPr>
+            <a:endParaRPr lang="en-US" dirty="0"/>
+          </a:p>
+          <a:p>
+            <a:pPr marL="0" indent="0">
+              <a:buNone/>
+            </a:pPr>
+            <a:r>
+              <a:rPr lang="en-US" sz="2400" dirty="0"/>
+              <a:t>http://www.informationisbeautiful.net</a:t>
+            </a:r>
+            <a:r>
+              <a:rPr lang="en-US" sz="2400" dirty="0" smtClean="0"/>
+              <a:t>/</a:t>
+            </a:r>
+          </a:p>
+          <a:p>
+            <a:pPr marL="0" indent="0">
+              <a:buNone/>
+            </a:pPr>
+            <a:r>
+              <a:rPr lang="en-US" sz="2400" dirty="0" smtClean="0"/>
+              <a:t>visualizations/the-</a:t>
+            </a:r>
+            <a:r>
+              <a:rPr lang="en-US" sz="2400" dirty="0" err="1" smtClean="0"/>
+              <a:t>microbescope</a:t>
+            </a:r>
+            <a:r>
+              <a:rPr lang="en-US" sz="2400" dirty="0"/>
+              <a:t>/</a:t>
+            </a:r>
+            <a:endParaRPr lang="en-US" sz="2400" dirty="0"/>
           </a:p>
         </p:txBody>
       </p:sp>
@@ -23128,16 +24862,40 @@
           <a:p>
             <a:r>
               <a:rPr lang="en-US" dirty="0" smtClean="0"/>
-              <a:t>Soft skill search terms</a:t>
+              <a:t>Start With the Data You Can Find</a:t>
             </a:r>
             <a:endParaRPr lang="en-US" dirty="0"/>
           </a:p>
         </p:txBody>
       </p:sp>
+      <p:pic>
+        <p:nvPicPr>
+          <p:cNvPr id="2" name="Picture 1"/>
+          <p:cNvPicPr>
+            <a:picLocks noChangeAspect="1"/>
+          </p:cNvPicPr>
+          <p:nvPr/>
+        </p:nvPicPr>
+        <p:blipFill>
+          <a:blip r:embed="rId2"/>
+          <a:stretch>
+            <a:fillRect/>
+          </a:stretch>
+        </p:blipFill>
+        <p:spPr>
+          <a:xfrm>
+            <a:off x="5684837" y="1212849"/>
+            <a:ext cx="9741870" cy="5561013"/>
+          </a:xfrm>
+          <a:prstGeom prst="rect">
+            <a:avLst/>
+          </a:prstGeom>
+        </p:spPr>
+      </p:pic>
     </p:spTree>
     <p:extLst>
       <p:ext uri="{BB962C8B-B14F-4D97-AF65-F5344CB8AC3E}">
-        <p14:creationId xmlns:p14="http://schemas.microsoft.com/office/powerpoint/2010/main" val="1656420440"/>
+        <p14:creationId xmlns:p14="http://schemas.microsoft.com/office/powerpoint/2010/main" val="2491792190"/>
       </p:ext>
     </p:extLst>
   </p:cSld>
@@ -24708,100 +26466,6 @@
 </file>
 
 <file path=customXml/item1.xml><?xml version="1.0" encoding="utf-8"?>
-<?mso-contentType ?>
-<FormTemplates xmlns="http://schemas.microsoft.com/sharepoint/v3/contenttype/forms">
-  <Display>DocumentLibraryForm</Display>
-  <Edit>DocumentLibraryForm</Edit>
-  <New>DocumentLibraryForm</New>
-</FormTemplates>
-</file>
-
-<file path=customXml/item2.xml><?xml version="1.0" encoding="utf-8"?>
-<p:properties xmlns:p="http://schemas.microsoft.com/office/2006/metadata/properties" xmlns:xsi="http://www.w3.org/2001/XMLSchema-instance" xmlns:pc="http://schemas.microsoft.com/office/infopath/2007/PartnerControls">
-  <documentManagement>
-    <h9a868b2ee15488883f623ae5237ecae xmlns="12a172fe-0250-434a-85cf-03b10810c5e5">
-      <Terms xmlns="http://schemas.microsoft.com/office/infopath/2007/PartnerControls">
-        <TermInfo xmlns="http://schemas.microsoft.com/office/infopath/2007/PartnerControls">
-          <TermName xmlns="http://schemas.microsoft.com/office/infopath/2007/PartnerControls">Moscone Center</TermName>
-          <TermId xmlns="http://schemas.microsoft.com/office/infopath/2007/PartnerControls">d4f36a2e-dd0d-4424-990f-7c93b4e9f063</TermId>
-        </TermInfo>
-      </Terms>
-    </h9a868b2ee15488883f623ae5237ecae>
-    <k62f7d35b80b40fb8c27985e50b34fcd xmlns="12a172fe-0250-434a-85cf-03b10810c5e5">
-      <Terms xmlns="http://schemas.microsoft.com/office/infopath/2007/PartnerControls">
-        <TermInfo xmlns="http://schemas.microsoft.com/office/infopath/2007/PartnerControls">
-          <TermName xmlns="http://schemas.microsoft.com/office/infopath/2007/PartnerControls">BUILD</TermName>
-          <TermId xmlns="http://schemas.microsoft.com/office/infopath/2007/PartnerControls">58542b36-5bf5-46a6-a53f-a41fb7a73785</TermId>
-        </TermInfo>
-      </Terms>
-    </k62f7d35b80b40fb8c27985e50b34fcd>
-    <LikesCount xmlns="http://schemas.microsoft.com/sharepoint/v3" xsi:nil="true"/>
-    <pfbfa50075a04958bd8757dc155d3e08 xmlns="12a172fe-0250-434a-85cf-03b10810c5e5">
-      <Terms xmlns="http://schemas.microsoft.com/office/infopath/2007/PartnerControls">
-        <TermInfo xmlns="http://schemas.microsoft.com/office/infopath/2007/PartnerControls">
-          <TermName xmlns="http://schemas.microsoft.com/office/infopath/2007/PartnerControls">San Francisco</TermName>
-          <TermId xmlns="http://schemas.microsoft.com/office/infopath/2007/PartnerControls">84dfcb53-432b-499d-8965-93d483d36b4a</TermId>
-        </TermInfo>
-      </Terms>
-    </pfbfa50075a04958bd8757dc155d3e08>
-    <Presentation_x0020_Date xmlns="12a172fe-0250-434a-85cf-03b10810c5e5">2015-04-29T00:00:00-07:00</Presentation_x0020_Date>
-    <o72fbe6ee5ae4131af0832c08ec51202 xmlns="12a172fe-0250-434a-85cf-03b10810c5e5">
-      <Terms xmlns="http://schemas.microsoft.com/office/infopath/2007/PartnerControls"/>
-    </o72fbe6ee5ae4131af0832c08ec51202>
-    <Event_x0020_Start_x0020_Date xmlns="12a172fe-0250-434a-85cf-03b10810c5e5">2015-04-29T07:00:00+00:00</Event_x0020_Start_x0020_Date>
-    <MS_x0020_Content_x0020_Owner xmlns="12a172fe-0250-434a-85cf-03b10810c5e5">
-      <UserInfo>
-        <DisplayName/>
-        <AccountId xsi:nil="true"/>
-        <AccountType/>
-      </UserInfo>
-    </MS_x0020_Content_x0020_Owner>
-    <MS_x0020_Speaker xmlns="12a172fe-0250-434a-85cf-03b10810c5e5">
-      <UserInfo>
-        <DisplayName/>
-        <AccountId xsi:nil="true"/>
-        <AccountType/>
-      </UserInfo>
-    </MS_x0020_Speaker>
-    <External_x0020_Speaker xmlns="12a172fe-0250-434a-85cf-03b10810c5e5">Chris Anderson, Brett Humphrey</External_x0020_Speaker>
-    <Session_x0020_Code xmlns="12a172fe-0250-434a-85cf-03b10810c5e5">2-612</Session_x0020_Code>
-    <le8386062bd54e24a95c83b32ccbdb34 xmlns="12a172fe-0250-434a-85cf-03b10810c5e5">
-      <Terms xmlns="http://schemas.microsoft.com/office/infopath/2007/PartnerControls"/>
-    </le8386062bd54e24a95c83b32ccbdb34>
-    <j4d4d959795b4220a289a041ed046605 xmlns="12a172fe-0250-434a-85cf-03b10810c5e5">
-      <Terms xmlns="http://schemas.microsoft.com/office/infopath/2007/PartnerControls"/>
-    </j4d4d959795b4220a289a041ed046605>
-    <Event_x0020_End_x0020_Date xmlns="12a172fe-0250-434a-85cf-03b10810c5e5">2015-05-01T07:00:00+00:00</Event_x0020_End_x0020_Date>
-    <TaxKeywordTaxHTField xmlns="230e9df3-be65-4c73-a93b-d1236ebd677e">
-      <Terms xmlns="http://schemas.microsoft.com/office/infopath/2007/PartnerControls">
-        <TermInfo xmlns="http://schemas.microsoft.com/office/infopath/2007/PartnerControls">
-          <TermName xmlns="http://schemas.microsoft.com/office/infopath/2007/PartnerControls">Build 2015</TermName>
-          <TermId xmlns="http://schemas.microsoft.com/office/infopath/2007/PartnerControls">54419920-0a06-43b0-b2df-79127b266d93</TermId>
-        </TermInfo>
-      </Terms>
-    </TaxKeywordTaxHTField>
-    <TaxCatchAll xmlns="230e9df3-be65-4c73-a93b-d1236ebd677e">
-      <Value>173</Value>
-      <Value>172</Value>
-      <Value>171</Value>
-      <Value>170</Value>
-    </TaxCatchAll>
-    <eb9cf3a3af7b473faa5c9c98148a90a4 xmlns="12a172fe-0250-434a-85cf-03b10810c5e5">
-      <Terms xmlns="http://schemas.microsoft.com/office/infopath/2007/PartnerControls"/>
-    </eb9cf3a3af7b473faa5c9c98148a90a4>
-    <SharingHintHash xmlns="12a172fe-0250-434a-85cf-03b10810c5e5">-103767253</SharingHintHash>
-    <SharedWithUsers xmlns="12a172fe-0250-434a-85cf-03b10810c5e5">
-      <UserInfo>
-        <DisplayName/>
-        <AccountId xsi:nil="true"/>
-        <AccountType/>
-      </UserInfo>
-    </SharedWithUsers>
-  </documentManagement>
-</p:properties>
-</file>
-
-<file path=customXml/item3.xml><?xml version="1.0" encoding="utf-8"?>
 <ct:contentTypeSchema xmlns:ct="http://schemas.microsoft.com/office/2006/metadata/contentType" xmlns:ma="http://schemas.microsoft.com/office/2006/metadata/properties/metaAttributes" ct:_="" ma:_="" ma:contentTypeName="PresentationsDoc" ma:contentTypeID="0x01010046EBBE4F454C2C47A5E89CD935B1FC7800E83BCD34BAE21044A0567CF64FDFDE54" ma:contentTypeVersion="5" ma:contentTypeDescription="Create a new document." ma:contentTypeScope="" ma:versionID="9f49739d1da212619d044bf1bfa27251">
   <xsd:schema xmlns:xsd="http://www.w3.org/2001/XMLSchema" xmlns:xs="http://www.w3.org/2001/XMLSchema" xmlns:p="http://schemas.microsoft.com/office/2006/metadata/properties" xmlns:ns1="http://schemas.microsoft.com/sharepoint/v3" xmlns:ns2="12a172fe-0250-434a-85cf-03b10810c5e5" xmlns:ns3="230e9df3-be65-4c73-a93b-d1236ebd677e" targetNamespace="http://schemas.microsoft.com/office/2006/metadata/properties" ma:root="true" ma:fieldsID="d1ec06fbcf9feb71c233288b468d8e39" ns1:_="" ns2:_="" ns3:_="">
     <xsd:import namespace="http://schemas.microsoft.com/sharepoint/v3"/>
@@ -25137,33 +26801,101 @@
 </ct:contentTypeSchema>
 </file>
 
-<file path=customXml/itemProps1.xml><?xml version="1.0" encoding="utf-8"?>
-<ds:datastoreItem xmlns:ds="http://schemas.openxmlformats.org/officeDocument/2006/customXml" ds:itemID="{758FDAC0-319D-4A54-8D8E-1D42CB1F8004}">
-  <ds:schemaRefs>
-    <ds:schemaRef ds:uri="http://schemas.microsoft.com/sharepoint/v3/contenttype/forms"/>
-  </ds:schemaRefs>
-</ds:datastoreItem>
+<file path=customXml/item2.xml><?xml version="1.0" encoding="utf-8"?>
+<?mso-contentType ?>
+<FormTemplates xmlns="http://schemas.microsoft.com/sharepoint/v3/contenttype/forms">
+  <Display>DocumentLibraryForm</Display>
+  <Edit>DocumentLibraryForm</Edit>
+  <New>DocumentLibraryForm</New>
+</FormTemplates>
 </file>
 
-<file path=customXml/itemProps2.xml><?xml version="1.0" encoding="utf-8"?>
-<ds:datastoreItem xmlns:ds="http://schemas.openxmlformats.org/officeDocument/2006/customXml" ds:itemID="{F990F116-B58F-4255-B05B-DA3808E0E5C6}">
-  <ds:schemaRefs>
-    <ds:schemaRef ds:uri="230e9df3-be65-4c73-a93b-d1236ebd677e"/>
-    <ds:schemaRef ds:uri="http://schemas.openxmlformats.org/package/2006/metadata/core-properties"/>
-    <ds:schemaRef ds:uri="http://purl.org/dc/elements/1.1/"/>
-    <ds:schemaRef ds:uri="http://schemas.microsoft.com/office/2006/metadata/properties"/>
-    <ds:schemaRef ds:uri="http://schemas.microsoft.com/office/infopath/2007/PartnerControls"/>
-    <ds:schemaRef ds:uri="http://schemas.microsoft.com/sharepoint/v3"/>
-    <ds:schemaRef ds:uri="http://purl.org/dc/terms/"/>
-    <ds:schemaRef ds:uri="http://schemas.microsoft.com/office/2006/documentManagement/types"/>
-    <ds:schemaRef ds:uri="http://purl.org/dc/dcmitype/"/>
-    <ds:schemaRef ds:uri="12a172fe-0250-434a-85cf-03b10810c5e5"/>
-    <ds:schemaRef ds:uri="http://www.w3.org/XML/1998/namespace"/>
-  </ds:schemaRefs>
-</ds:datastoreItem>
+<file path=customXml/item3.xml><?xml version="1.0" encoding="utf-8"?>
+<p:properties xmlns:p="http://schemas.microsoft.com/office/2006/metadata/properties" xmlns:xsi="http://www.w3.org/2001/XMLSchema-instance" xmlns:pc="http://schemas.microsoft.com/office/infopath/2007/PartnerControls">
+  <documentManagement>
+    <h9a868b2ee15488883f623ae5237ecae xmlns="12a172fe-0250-434a-85cf-03b10810c5e5">
+      <Terms xmlns="http://schemas.microsoft.com/office/infopath/2007/PartnerControls">
+        <TermInfo xmlns="http://schemas.microsoft.com/office/infopath/2007/PartnerControls">
+          <TermName xmlns="http://schemas.microsoft.com/office/infopath/2007/PartnerControls">Moscone Center</TermName>
+          <TermId xmlns="http://schemas.microsoft.com/office/infopath/2007/PartnerControls">d4f36a2e-dd0d-4424-990f-7c93b4e9f063</TermId>
+        </TermInfo>
+      </Terms>
+    </h9a868b2ee15488883f623ae5237ecae>
+    <k62f7d35b80b40fb8c27985e50b34fcd xmlns="12a172fe-0250-434a-85cf-03b10810c5e5">
+      <Terms xmlns="http://schemas.microsoft.com/office/infopath/2007/PartnerControls">
+        <TermInfo xmlns="http://schemas.microsoft.com/office/infopath/2007/PartnerControls">
+          <TermName xmlns="http://schemas.microsoft.com/office/infopath/2007/PartnerControls">BUILD</TermName>
+          <TermId xmlns="http://schemas.microsoft.com/office/infopath/2007/PartnerControls">58542b36-5bf5-46a6-a53f-a41fb7a73785</TermId>
+        </TermInfo>
+      </Terms>
+    </k62f7d35b80b40fb8c27985e50b34fcd>
+    <LikesCount xmlns="http://schemas.microsoft.com/sharepoint/v3" xsi:nil="true"/>
+    <pfbfa50075a04958bd8757dc155d3e08 xmlns="12a172fe-0250-434a-85cf-03b10810c5e5">
+      <Terms xmlns="http://schemas.microsoft.com/office/infopath/2007/PartnerControls">
+        <TermInfo xmlns="http://schemas.microsoft.com/office/infopath/2007/PartnerControls">
+          <TermName xmlns="http://schemas.microsoft.com/office/infopath/2007/PartnerControls">San Francisco</TermName>
+          <TermId xmlns="http://schemas.microsoft.com/office/infopath/2007/PartnerControls">84dfcb53-432b-499d-8965-93d483d36b4a</TermId>
+        </TermInfo>
+      </Terms>
+    </pfbfa50075a04958bd8757dc155d3e08>
+    <Presentation_x0020_Date xmlns="12a172fe-0250-434a-85cf-03b10810c5e5">2015-04-29T00:00:00-07:00</Presentation_x0020_Date>
+    <o72fbe6ee5ae4131af0832c08ec51202 xmlns="12a172fe-0250-434a-85cf-03b10810c5e5">
+      <Terms xmlns="http://schemas.microsoft.com/office/infopath/2007/PartnerControls"/>
+    </o72fbe6ee5ae4131af0832c08ec51202>
+    <Event_x0020_Start_x0020_Date xmlns="12a172fe-0250-434a-85cf-03b10810c5e5">2015-04-29T07:00:00+00:00</Event_x0020_Start_x0020_Date>
+    <MS_x0020_Content_x0020_Owner xmlns="12a172fe-0250-434a-85cf-03b10810c5e5">
+      <UserInfo>
+        <DisplayName/>
+        <AccountId xsi:nil="true"/>
+        <AccountType/>
+      </UserInfo>
+    </MS_x0020_Content_x0020_Owner>
+    <MS_x0020_Speaker xmlns="12a172fe-0250-434a-85cf-03b10810c5e5">
+      <UserInfo>
+        <DisplayName/>
+        <AccountId xsi:nil="true"/>
+        <AccountType/>
+      </UserInfo>
+    </MS_x0020_Speaker>
+    <External_x0020_Speaker xmlns="12a172fe-0250-434a-85cf-03b10810c5e5">Chris Anderson, Brett Humphrey</External_x0020_Speaker>
+    <Session_x0020_Code xmlns="12a172fe-0250-434a-85cf-03b10810c5e5">2-612</Session_x0020_Code>
+    <le8386062bd54e24a95c83b32ccbdb34 xmlns="12a172fe-0250-434a-85cf-03b10810c5e5">
+      <Terms xmlns="http://schemas.microsoft.com/office/infopath/2007/PartnerControls"/>
+    </le8386062bd54e24a95c83b32ccbdb34>
+    <j4d4d959795b4220a289a041ed046605 xmlns="12a172fe-0250-434a-85cf-03b10810c5e5">
+      <Terms xmlns="http://schemas.microsoft.com/office/infopath/2007/PartnerControls"/>
+    </j4d4d959795b4220a289a041ed046605>
+    <Event_x0020_End_x0020_Date xmlns="12a172fe-0250-434a-85cf-03b10810c5e5">2015-05-01T07:00:00+00:00</Event_x0020_End_x0020_Date>
+    <TaxKeywordTaxHTField xmlns="230e9df3-be65-4c73-a93b-d1236ebd677e">
+      <Terms xmlns="http://schemas.microsoft.com/office/infopath/2007/PartnerControls">
+        <TermInfo xmlns="http://schemas.microsoft.com/office/infopath/2007/PartnerControls">
+          <TermName xmlns="http://schemas.microsoft.com/office/infopath/2007/PartnerControls">Build 2015</TermName>
+          <TermId xmlns="http://schemas.microsoft.com/office/infopath/2007/PartnerControls">54419920-0a06-43b0-b2df-79127b266d93</TermId>
+        </TermInfo>
+      </Terms>
+    </TaxKeywordTaxHTField>
+    <TaxCatchAll xmlns="230e9df3-be65-4c73-a93b-d1236ebd677e">
+      <Value>173</Value>
+      <Value>172</Value>
+      <Value>171</Value>
+      <Value>170</Value>
+    </TaxCatchAll>
+    <eb9cf3a3af7b473faa5c9c98148a90a4 xmlns="12a172fe-0250-434a-85cf-03b10810c5e5">
+      <Terms xmlns="http://schemas.microsoft.com/office/infopath/2007/PartnerControls"/>
+    </eb9cf3a3af7b473faa5c9c98148a90a4>
+    <SharingHintHash xmlns="12a172fe-0250-434a-85cf-03b10810c5e5">-103767253</SharingHintHash>
+    <SharedWithUsers xmlns="12a172fe-0250-434a-85cf-03b10810c5e5">
+      <UserInfo>
+        <DisplayName/>
+        <AccountId xsi:nil="true"/>
+        <AccountType/>
+      </UserInfo>
+    </SharedWithUsers>
+  </documentManagement>
+</p:properties>
 </file>
 
-<file path=customXml/itemProps3.xml><?xml version="1.0" encoding="utf-8"?>
+<file path=customXml/itemProps1.xml><?xml version="1.0" encoding="utf-8"?>
 <ds:datastoreItem xmlns:ds="http://schemas.openxmlformats.org/officeDocument/2006/customXml" ds:itemID="{99E0065C-627B-42FD-A7AD-D2ABAFAC7E7D}">
   <ds:schemaRefs>
     <ds:schemaRef ds:uri="http://schemas.microsoft.com/office/2006/metadata/contentType"/>
@@ -25182,4 +26914,30 @@
     <ds:schemaRef ds:uri="http://schemas.microsoft.com/internal/obd"/>
   </ds:schemaRefs>
 </ds:datastoreItem>
+</file>
+
+<file path=customXml/itemProps2.xml><?xml version="1.0" encoding="utf-8"?>
+<ds:datastoreItem xmlns:ds="http://schemas.openxmlformats.org/officeDocument/2006/customXml" ds:itemID="{758FDAC0-319D-4A54-8D8E-1D42CB1F8004}">
+  <ds:schemaRefs>
+    <ds:schemaRef ds:uri="http://schemas.microsoft.com/sharepoint/v3/contenttype/forms"/>
+  </ds:schemaRefs>
+</ds:datastoreItem>
+</file>
+
+<file path=customXml/itemProps3.xml><?xml version="1.0" encoding="utf-8"?>
+<ds:datastoreItem xmlns:ds="http://schemas.openxmlformats.org/officeDocument/2006/customXml" ds:itemID="{F990F116-B58F-4255-B05B-DA3808E0E5C6}">
+  <ds:schemaRefs>
+    <ds:schemaRef ds:uri="230e9df3-be65-4c73-a93b-d1236ebd677e"/>
+    <ds:schemaRef ds:uri="http://schemas.openxmlformats.org/package/2006/metadata/core-properties"/>
+    <ds:schemaRef ds:uri="http://purl.org/dc/elements/1.1/"/>
+    <ds:schemaRef ds:uri="http://schemas.microsoft.com/office/2006/metadata/properties"/>
+    <ds:schemaRef ds:uri="http://schemas.microsoft.com/office/infopath/2007/PartnerControls"/>
+    <ds:schemaRef ds:uri="http://schemas.microsoft.com/sharepoint/v3"/>
+    <ds:schemaRef ds:uri="http://purl.org/dc/terms/"/>
+    <ds:schemaRef ds:uri="http://schemas.microsoft.com/office/2006/documentManagement/types"/>
+    <ds:schemaRef ds:uri="http://purl.org/dc/dcmitype/"/>
+    <ds:schemaRef ds:uri="12a172fe-0250-434a-85cf-03b10810c5e5"/>
+    <ds:schemaRef ds:uri="http://www.w3.org/XML/1998/namespace"/>
+  </ds:schemaRefs>
+</ds:datastoreItem>
 </file>
</xml_diff>

<commit_message>
Updates with Lauren part 1
</commit_message>
<xml_diff>
--- a/Session 2.pptx
+++ b/Session 2.pptx
@@ -7,52 +7,54 @@
     <p:sldMasterId id="2147484327" r:id="rId6"/>
   </p:sldMasterIdLst>
   <p:notesMasterIdLst>
-    <p:notesMasterId r:id="rId47"/>
+    <p:notesMasterId r:id="rId49"/>
   </p:notesMasterIdLst>
   <p:handoutMasterIdLst>
-    <p:handoutMasterId r:id="rId48"/>
+    <p:handoutMasterId r:id="rId50"/>
   </p:handoutMasterIdLst>
   <p:sldIdLst>
     <p:sldId id="258" r:id="rId7"/>
-    <p:sldId id="355" r:id="rId8"/>
-    <p:sldId id="419" r:id="rId9"/>
-    <p:sldId id="402" r:id="rId10"/>
-    <p:sldId id="403" r:id="rId11"/>
-    <p:sldId id="356" r:id="rId12"/>
-    <p:sldId id="399" r:id="rId13"/>
-    <p:sldId id="426" r:id="rId14"/>
-    <p:sldId id="436" r:id="rId15"/>
-    <p:sldId id="394" r:id="rId16"/>
-    <p:sldId id="404" r:id="rId17"/>
-    <p:sldId id="437" r:id="rId18"/>
-    <p:sldId id="405" r:id="rId19"/>
-    <p:sldId id="406" r:id="rId20"/>
-    <p:sldId id="407" r:id="rId21"/>
-    <p:sldId id="408" r:id="rId22"/>
-    <p:sldId id="420" r:id="rId23"/>
-    <p:sldId id="435" r:id="rId24"/>
-    <p:sldId id="409" r:id="rId25"/>
-    <p:sldId id="395" r:id="rId26"/>
-    <p:sldId id="398" r:id="rId27"/>
-    <p:sldId id="410" r:id="rId28"/>
-    <p:sldId id="427" r:id="rId29"/>
-    <p:sldId id="428" r:id="rId30"/>
-    <p:sldId id="411" r:id="rId31"/>
-    <p:sldId id="434" r:id="rId32"/>
-    <p:sldId id="425" r:id="rId33"/>
-    <p:sldId id="417" r:id="rId34"/>
-    <p:sldId id="412" r:id="rId35"/>
-    <p:sldId id="414" r:id="rId36"/>
-    <p:sldId id="415" r:id="rId37"/>
-    <p:sldId id="421" r:id="rId38"/>
-    <p:sldId id="396" r:id="rId39"/>
-    <p:sldId id="430" r:id="rId40"/>
-    <p:sldId id="418" r:id="rId41"/>
-    <p:sldId id="429" r:id="rId42"/>
-    <p:sldId id="431" r:id="rId43"/>
-    <p:sldId id="423" r:id="rId44"/>
-    <p:sldId id="424" r:id="rId45"/>
-    <p:sldId id="432" r:id="rId46"/>
+    <p:sldId id="439" r:id="rId8"/>
+    <p:sldId id="355" r:id="rId9"/>
+    <p:sldId id="419" r:id="rId10"/>
+    <p:sldId id="402" r:id="rId11"/>
+    <p:sldId id="403" r:id="rId12"/>
+    <p:sldId id="438" r:id="rId13"/>
+    <p:sldId id="356" r:id="rId14"/>
+    <p:sldId id="399" r:id="rId15"/>
+    <p:sldId id="426" r:id="rId16"/>
+    <p:sldId id="436" r:id="rId17"/>
+    <p:sldId id="394" r:id="rId18"/>
+    <p:sldId id="404" r:id="rId19"/>
+    <p:sldId id="437" r:id="rId20"/>
+    <p:sldId id="405" r:id="rId21"/>
+    <p:sldId id="406" r:id="rId22"/>
+    <p:sldId id="407" r:id="rId23"/>
+    <p:sldId id="408" r:id="rId24"/>
+    <p:sldId id="420" r:id="rId25"/>
+    <p:sldId id="435" r:id="rId26"/>
+    <p:sldId id="409" r:id="rId27"/>
+    <p:sldId id="395" r:id="rId28"/>
+    <p:sldId id="398" r:id="rId29"/>
+    <p:sldId id="410" r:id="rId30"/>
+    <p:sldId id="427" r:id="rId31"/>
+    <p:sldId id="428" r:id="rId32"/>
+    <p:sldId id="411" r:id="rId33"/>
+    <p:sldId id="434" r:id="rId34"/>
+    <p:sldId id="425" r:id="rId35"/>
+    <p:sldId id="417" r:id="rId36"/>
+    <p:sldId id="412" r:id="rId37"/>
+    <p:sldId id="414" r:id="rId38"/>
+    <p:sldId id="415" r:id="rId39"/>
+    <p:sldId id="421" r:id="rId40"/>
+    <p:sldId id="396" r:id="rId41"/>
+    <p:sldId id="430" r:id="rId42"/>
+    <p:sldId id="418" r:id="rId43"/>
+    <p:sldId id="429" r:id="rId44"/>
+    <p:sldId id="431" r:id="rId45"/>
+    <p:sldId id="423" r:id="rId46"/>
+    <p:sldId id="424" r:id="rId47"/>
+    <p:sldId id="432" r:id="rId48"/>
   </p:sldIdLst>
   <p:sldSz cx="12436475" cy="6994525"/>
   <p:notesSz cx="6858000" cy="9144000"/>
@@ -157,10 +159,12 @@
         <p14:section name="Data Visualization Session 2" id="{D75A0D65-BF15-4822-BC6D-74C66FDCD9EE}">
           <p14:sldIdLst>
             <p14:sldId id="258"/>
+            <p14:sldId id="439"/>
             <p14:sldId id="355"/>
             <p14:sldId id="419"/>
             <p14:sldId id="402"/>
             <p14:sldId id="403"/>
+            <p14:sldId id="438"/>
             <p14:sldId id="356"/>
             <p14:sldId id="399"/>
             <p14:sldId id="426"/>
@@ -313,7 +317,7 @@
               <a:rPr lang="en-US" smtClean="0">
                 <a:latin typeface="Segoe UI" pitchFamily="34" charset="0"/>
               </a:rPr>
-              <a:t>6/28/2015 2:49 PM</a:t>
+              <a:t>11/5/2015 1:08 PM</a:t>
             </a:fld>
             <a:endParaRPr lang="en-US" dirty="0">
               <a:latin typeface="Segoe UI" pitchFamily="34" charset="0"/>
@@ -615,7 +619,7 @@
           <a:p>
             <a:fld id="{38EEC551-8CDA-4EB6-89BB-2A86C9F091C8}" type="datetime8">
               <a:rPr lang="en-US" smtClean="0"/>
-              <a:t>6/28/2015 2:49 PM</a:t>
+              <a:t>11/5/2015 1:08 PM</a:t>
             </a:fld>
             <a:endParaRPr lang="en-US" dirty="0"/>
           </a:p>
@@ -980,7 +984,7 @@
           <a:p>
             <a:fld id="{C6996B83-60CF-42A8-BA06-F99D0BEC30B3}" type="datetime1">
               <a:rPr lang="en-US" smtClean="0"/>
-              <a:t>6/28/2015</a:t>
+              <a:t>11/5/2015</a:t>
             </a:fld>
             <a:endParaRPr lang="en-US" dirty="0"/>
           </a:p>
@@ -1037,6 +1041,426 @@
     <p:extLst>
       <p:ext uri="{BB962C8B-B14F-4D97-AF65-F5344CB8AC3E}">
         <p14:creationId xmlns:p14="http://schemas.microsoft.com/office/powerpoint/2010/main" val="480285891"/>
+      </p:ext>
+    </p:extLst>
+  </p:cSld>
+  <p:clrMapOvr>
+    <a:masterClrMapping/>
+  </p:clrMapOvr>
+</p:notes>
+</file>
+
+<file path=ppt/notesSlides/notesSlide10.xml><?xml version="1.0" encoding="utf-8"?>
+<p:notes xmlns:a="http://schemas.openxmlformats.org/drawingml/2006/main" xmlns:r="http://schemas.openxmlformats.org/officeDocument/2006/relationships" xmlns:p="http://schemas.openxmlformats.org/presentationml/2006/main">
+  <p:cSld>
+    <p:spTree>
+      <p:nvGrpSpPr>
+        <p:cNvPr id="1" name=""/>
+        <p:cNvGrpSpPr/>
+        <p:nvPr/>
+      </p:nvGrpSpPr>
+      <p:grpSpPr>
+        <a:xfrm>
+          <a:off x="0" y="0"/>
+          <a:ext cx="0" cy="0"/>
+          <a:chOff x="0" y="0"/>
+          <a:chExt cx="0" cy="0"/>
+        </a:xfrm>
+      </p:grpSpPr>
+      <p:sp>
+        <p:nvSpPr>
+          <p:cNvPr id="2" name="Slide Image Placeholder 1"/>
+          <p:cNvSpPr>
+            <a:spLocks noGrp="1" noRot="1" noChangeAspect="1"/>
+          </p:cNvSpPr>
+          <p:nvPr>
+            <p:ph type="sldImg"/>
+          </p:nvPr>
+        </p:nvSpPr>
+        <p:spPr/>
+      </p:sp>
+      <p:sp>
+        <p:nvSpPr>
+          <p:cNvPr id="3" name="Notes Placeholder 2"/>
+          <p:cNvSpPr>
+            <a:spLocks noGrp="1"/>
+          </p:cNvSpPr>
+          <p:nvPr>
+            <p:ph type="body" idx="1"/>
+          </p:nvPr>
+        </p:nvSpPr>
+        <p:spPr/>
+        <p:txBody>
+          <a:bodyPr/>
+          <a:lstStyle/>
+          <a:p>
+            <a:endParaRPr lang="en-US"/>
+          </a:p>
+        </p:txBody>
+      </p:sp>
+      <p:sp>
+        <p:nvSpPr>
+          <p:cNvPr id="4" name="Header Placeholder 3"/>
+          <p:cNvSpPr>
+            <a:spLocks noGrp="1"/>
+          </p:cNvSpPr>
+          <p:nvPr>
+            <p:ph type="hdr" sz="quarter" idx="10"/>
+          </p:nvPr>
+        </p:nvSpPr>
+        <p:spPr/>
+        <p:txBody>
+          <a:bodyPr/>
+          <a:lstStyle/>
+          <a:p>
+            <a:r>
+              <a:rPr lang="en-US" smtClean="0">
+                <a:solidFill>
+                  <a:prstClr val="black"/>
+                </a:solidFill>
+              </a:rPr>
+              <a:t>Build 2014</a:t>
+            </a:r>
+            <a:endParaRPr lang="en-US" dirty="0">
+              <a:solidFill>
+                <a:prstClr val="black"/>
+              </a:solidFill>
+            </a:endParaRPr>
+          </a:p>
+        </p:txBody>
+      </p:sp>
+      <p:sp>
+        <p:nvSpPr>
+          <p:cNvPr id="5" name="Footer Placeholder 4"/>
+          <p:cNvSpPr>
+            <a:spLocks noGrp="1"/>
+          </p:cNvSpPr>
+          <p:nvPr>
+            <p:ph type="ftr" sz="quarter" idx="11"/>
+          </p:nvPr>
+        </p:nvSpPr>
+        <p:spPr/>
+        <p:txBody>
+          <a:bodyPr/>
+          <a:lstStyle/>
+          <a:p>
+            <a:pPr defTabSz="914099" eaLnBrk="0" hangingPunct="0"/>
+            <a:r>
+              <a:rPr lang="en-US" sz="400" smtClean="0">
+                <a:gradFill>
+                  <a:gsLst>
+                    <a:gs pos="0">
+                      <a:prstClr val="black"/>
+                    </a:gs>
+                    <a:gs pos="100000">
+                      <a:prstClr val="black"/>
+                    </a:gs>
+                  </a:gsLst>
+                  <a:lin ang="5400000" scaled="0"/>
+                </a:gradFill>
+                <a:latin typeface="Segoe UI" pitchFamily="34" charset="0"/>
+                <a:ea typeface="Segoe UI" pitchFamily="34" charset="0"/>
+                <a:cs typeface="Segoe UI" pitchFamily="34" charset="0"/>
+              </a:rPr>
+              <a:t>© 2014 Microsoft Corporation. All rights reserved. Microsoft, Windows, and other product names are or may be registered trademarks and/or trademarks in the U.S. and/or other countries. The information herein is for informational purposes only and represents the current view of Microsoft Corporation as of the date of this presentation.  Because Microsoft must respond to changing market conditions, it should not be interpreted to be a commitment on the part of Microsoft, and Microsoft cannot guarantee the accuracy of any information provided after the date of this presentation.  MICROSOFT MAKES NO WARRANTIES, EXPRESS, IMPLIED OR STATUTORY, AS TO THE INFORMATION IN THIS PRESENTATION.</a:t>
+            </a:r>
+            <a:endParaRPr lang="en-US" sz="400" dirty="0" smtClean="0">
+              <a:gradFill>
+                <a:gsLst>
+                  <a:gs pos="0">
+                    <a:prstClr val="black"/>
+                  </a:gs>
+                  <a:gs pos="100000">
+                    <a:prstClr val="black"/>
+                  </a:gs>
+                </a:gsLst>
+                <a:lin ang="5400000" scaled="0"/>
+              </a:gradFill>
+              <a:latin typeface="Segoe UI" pitchFamily="34" charset="0"/>
+              <a:ea typeface="Segoe UI" pitchFamily="34" charset="0"/>
+              <a:cs typeface="Segoe UI" pitchFamily="34" charset="0"/>
+            </a:endParaRPr>
+          </a:p>
+        </p:txBody>
+      </p:sp>
+      <p:sp>
+        <p:nvSpPr>
+          <p:cNvPr id="6" name="Date Placeholder 5"/>
+          <p:cNvSpPr>
+            <a:spLocks noGrp="1"/>
+          </p:cNvSpPr>
+          <p:nvPr>
+            <p:ph type="dt" idx="12"/>
+          </p:nvPr>
+        </p:nvSpPr>
+        <p:spPr/>
+        <p:txBody>
+          <a:bodyPr/>
+          <a:lstStyle/>
+          <a:p>
+            <a:fld id="{9F00D60D-1703-4D24-8308-FEE06A50A69C}" type="datetime1">
+              <a:rPr lang="en-US" smtClean="0">
+                <a:solidFill>
+                  <a:prstClr val="black"/>
+                </a:solidFill>
+              </a:rPr>
+              <a:pPr/>
+              <a:t>11/5/2015</a:t>
+            </a:fld>
+            <a:endParaRPr lang="en-US" dirty="0">
+              <a:solidFill>
+                <a:prstClr val="black"/>
+              </a:solidFill>
+            </a:endParaRPr>
+          </a:p>
+        </p:txBody>
+      </p:sp>
+      <p:sp>
+        <p:nvSpPr>
+          <p:cNvPr id="7" name="Slide Number Placeholder 6"/>
+          <p:cNvSpPr>
+            <a:spLocks noGrp="1"/>
+          </p:cNvSpPr>
+          <p:nvPr>
+            <p:ph type="sldNum" sz="quarter" idx="13"/>
+          </p:nvPr>
+        </p:nvSpPr>
+        <p:spPr/>
+        <p:txBody>
+          <a:bodyPr/>
+          <a:lstStyle/>
+          <a:p>
+            <a:fld id="{B4008EB6-D09E-4580-8CD6-DDB14511944F}" type="slidenum">
+              <a:rPr lang="en-US" smtClean="0">
+                <a:solidFill>
+                  <a:prstClr val="black"/>
+                </a:solidFill>
+              </a:rPr>
+              <a:pPr/>
+              <a:t>35</a:t>
+            </a:fld>
+            <a:endParaRPr lang="en-US" dirty="0">
+              <a:solidFill>
+                <a:prstClr val="black"/>
+              </a:solidFill>
+            </a:endParaRPr>
+          </a:p>
+        </p:txBody>
+      </p:sp>
+    </p:spTree>
+    <p:extLst>
+      <p:ext uri="{BB962C8B-B14F-4D97-AF65-F5344CB8AC3E}">
+        <p14:creationId xmlns:p14="http://schemas.microsoft.com/office/powerpoint/2010/main" val="2972198638"/>
+      </p:ext>
+    </p:extLst>
+  </p:cSld>
+  <p:clrMapOvr>
+    <a:masterClrMapping/>
+  </p:clrMapOvr>
+</p:notes>
+</file>
+
+<file path=ppt/notesSlides/notesSlide11.xml><?xml version="1.0" encoding="utf-8"?>
+<p:notes xmlns:a="http://schemas.openxmlformats.org/drawingml/2006/main" xmlns:r="http://schemas.openxmlformats.org/officeDocument/2006/relationships" xmlns:p="http://schemas.openxmlformats.org/presentationml/2006/main">
+  <p:cSld>
+    <p:spTree>
+      <p:nvGrpSpPr>
+        <p:cNvPr id="1" name=""/>
+        <p:cNvGrpSpPr/>
+        <p:nvPr/>
+      </p:nvGrpSpPr>
+      <p:grpSpPr>
+        <a:xfrm>
+          <a:off x="0" y="0"/>
+          <a:ext cx="0" cy="0"/>
+          <a:chOff x="0" y="0"/>
+          <a:chExt cx="0" cy="0"/>
+        </a:xfrm>
+      </p:grpSpPr>
+      <p:sp>
+        <p:nvSpPr>
+          <p:cNvPr id="2" name="Slide Image Placeholder 1"/>
+          <p:cNvSpPr>
+            <a:spLocks noGrp="1" noRot="1" noChangeAspect="1"/>
+          </p:cNvSpPr>
+          <p:nvPr>
+            <p:ph type="sldImg"/>
+          </p:nvPr>
+        </p:nvSpPr>
+        <p:spPr/>
+      </p:sp>
+      <p:sp>
+        <p:nvSpPr>
+          <p:cNvPr id="3" name="Notes Placeholder 2"/>
+          <p:cNvSpPr>
+            <a:spLocks noGrp="1"/>
+          </p:cNvSpPr>
+          <p:nvPr>
+            <p:ph type="body" idx="1"/>
+          </p:nvPr>
+        </p:nvSpPr>
+        <p:spPr/>
+        <p:txBody>
+          <a:bodyPr/>
+          <a:lstStyle/>
+          <a:p>
+            <a:endParaRPr lang="en-US"/>
+          </a:p>
+        </p:txBody>
+      </p:sp>
+      <p:sp>
+        <p:nvSpPr>
+          <p:cNvPr id="4" name="Header Placeholder 3"/>
+          <p:cNvSpPr>
+            <a:spLocks noGrp="1"/>
+          </p:cNvSpPr>
+          <p:nvPr>
+            <p:ph type="hdr" sz="quarter" idx="10"/>
+          </p:nvPr>
+        </p:nvSpPr>
+        <p:spPr/>
+        <p:txBody>
+          <a:bodyPr/>
+          <a:lstStyle/>
+          <a:p>
+            <a:r>
+              <a:rPr lang="en-US" smtClean="0">
+                <a:solidFill>
+                  <a:prstClr val="black"/>
+                </a:solidFill>
+              </a:rPr>
+              <a:t>Build 2014</a:t>
+            </a:r>
+            <a:endParaRPr lang="en-US" dirty="0">
+              <a:solidFill>
+                <a:prstClr val="black"/>
+              </a:solidFill>
+            </a:endParaRPr>
+          </a:p>
+        </p:txBody>
+      </p:sp>
+      <p:sp>
+        <p:nvSpPr>
+          <p:cNvPr id="5" name="Footer Placeholder 4"/>
+          <p:cNvSpPr>
+            <a:spLocks noGrp="1"/>
+          </p:cNvSpPr>
+          <p:nvPr>
+            <p:ph type="ftr" sz="quarter" idx="11"/>
+          </p:nvPr>
+        </p:nvSpPr>
+        <p:spPr/>
+        <p:txBody>
+          <a:bodyPr/>
+          <a:lstStyle/>
+          <a:p>
+            <a:pPr defTabSz="914099" eaLnBrk="0" hangingPunct="0"/>
+            <a:r>
+              <a:rPr lang="en-US" sz="400" smtClean="0">
+                <a:gradFill>
+                  <a:gsLst>
+                    <a:gs pos="0">
+                      <a:prstClr val="black"/>
+                    </a:gs>
+                    <a:gs pos="100000">
+                      <a:prstClr val="black"/>
+                    </a:gs>
+                  </a:gsLst>
+                  <a:lin ang="5400000" scaled="0"/>
+                </a:gradFill>
+                <a:latin typeface="Segoe UI" pitchFamily="34" charset="0"/>
+                <a:ea typeface="Segoe UI" pitchFamily="34" charset="0"/>
+                <a:cs typeface="Segoe UI" pitchFamily="34" charset="0"/>
+              </a:rPr>
+              <a:t>© 2014 Microsoft Corporation. All rights reserved. Microsoft, Windows, and other product names are or may be registered trademarks and/or trademarks in the U.S. and/or other countries. The information herein is for informational purposes only and represents the current view of Microsoft Corporation as of the date of this presentation.  Because Microsoft must respond to changing market conditions, it should not be interpreted to be a commitment on the part of Microsoft, and Microsoft cannot guarantee the accuracy of any information provided after the date of this presentation.  MICROSOFT MAKES NO WARRANTIES, EXPRESS, IMPLIED OR STATUTORY, AS TO THE INFORMATION IN THIS PRESENTATION.</a:t>
+            </a:r>
+            <a:endParaRPr lang="en-US" sz="400" dirty="0" smtClean="0">
+              <a:gradFill>
+                <a:gsLst>
+                  <a:gs pos="0">
+                    <a:prstClr val="black"/>
+                  </a:gs>
+                  <a:gs pos="100000">
+                    <a:prstClr val="black"/>
+                  </a:gs>
+                </a:gsLst>
+                <a:lin ang="5400000" scaled="0"/>
+              </a:gradFill>
+              <a:latin typeface="Segoe UI" pitchFamily="34" charset="0"/>
+              <a:ea typeface="Segoe UI" pitchFamily="34" charset="0"/>
+              <a:cs typeface="Segoe UI" pitchFamily="34" charset="0"/>
+            </a:endParaRPr>
+          </a:p>
+        </p:txBody>
+      </p:sp>
+      <p:sp>
+        <p:nvSpPr>
+          <p:cNvPr id="6" name="Date Placeholder 5"/>
+          <p:cNvSpPr>
+            <a:spLocks noGrp="1"/>
+          </p:cNvSpPr>
+          <p:nvPr>
+            <p:ph type="dt" idx="12"/>
+          </p:nvPr>
+        </p:nvSpPr>
+        <p:spPr/>
+        <p:txBody>
+          <a:bodyPr/>
+          <a:lstStyle/>
+          <a:p>
+            <a:fld id="{9F00D60D-1703-4D24-8308-FEE06A50A69C}" type="datetime1">
+              <a:rPr lang="en-US" smtClean="0">
+                <a:solidFill>
+                  <a:prstClr val="black"/>
+                </a:solidFill>
+              </a:rPr>
+              <a:pPr/>
+              <a:t>11/5/2015</a:t>
+            </a:fld>
+            <a:endParaRPr lang="en-US" dirty="0">
+              <a:solidFill>
+                <a:prstClr val="black"/>
+              </a:solidFill>
+            </a:endParaRPr>
+          </a:p>
+        </p:txBody>
+      </p:sp>
+      <p:sp>
+        <p:nvSpPr>
+          <p:cNvPr id="7" name="Slide Number Placeholder 6"/>
+          <p:cNvSpPr>
+            <a:spLocks noGrp="1"/>
+          </p:cNvSpPr>
+          <p:nvPr>
+            <p:ph type="sldNum" sz="quarter" idx="13"/>
+          </p:nvPr>
+        </p:nvSpPr>
+        <p:spPr/>
+        <p:txBody>
+          <a:bodyPr/>
+          <a:lstStyle/>
+          <a:p>
+            <a:fld id="{B4008EB6-D09E-4580-8CD6-DDB14511944F}" type="slidenum">
+              <a:rPr lang="en-US" smtClean="0">
+                <a:solidFill>
+                  <a:prstClr val="black"/>
+                </a:solidFill>
+              </a:rPr>
+              <a:pPr/>
+              <a:t>42</a:t>
+            </a:fld>
+            <a:endParaRPr lang="en-US" dirty="0">
+              <a:solidFill>
+                <a:prstClr val="black"/>
+              </a:solidFill>
+            </a:endParaRPr>
+          </a:p>
+        </p:txBody>
+      </p:sp>
+    </p:spTree>
+    <p:extLst>
+      <p:ext uri="{BB962C8B-B14F-4D97-AF65-F5344CB8AC3E}">
+        <p14:creationId xmlns:p14="http://schemas.microsoft.com/office/powerpoint/2010/main" val="86818076"/>
       </p:ext>
     </p:extLst>
   </p:cSld>
@@ -1201,7 +1625,7 @@
                 </a:solidFill>
               </a:rPr>
               <a:pPr/>
-              <a:t>6/28/2015</a:t>
+              <a:t>11/5/2015</a:t>
             </a:fld>
             <a:endParaRPr lang="en-US" dirty="0">
               <a:solidFill>
@@ -1246,7 +1670,7 @@
     </p:spTree>
     <p:extLst>
       <p:ext uri="{BB962C8B-B14F-4D97-AF65-F5344CB8AC3E}">
-        <p14:creationId xmlns:p14="http://schemas.microsoft.com/office/powerpoint/2010/main" val="1707128923"/>
+        <p14:creationId xmlns:p14="http://schemas.microsoft.com/office/powerpoint/2010/main" val="3643013339"/>
       </p:ext>
     </p:extLst>
   </p:cSld>
@@ -1411,7 +1835,7 @@
                 </a:solidFill>
               </a:rPr>
               <a:pPr/>
-              <a:t>6/28/2015</a:t>
+              <a:t>11/5/2015</a:t>
             </a:fld>
             <a:endParaRPr lang="en-US" dirty="0">
               <a:solidFill>
@@ -1456,7 +1880,7 @@
     </p:spTree>
     <p:extLst>
       <p:ext uri="{BB962C8B-B14F-4D97-AF65-F5344CB8AC3E}">
-        <p14:creationId xmlns:p14="http://schemas.microsoft.com/office/powerpoint/2010/main" val="1167229633"/>
+        <p14:creationId xmlns:p14="http://schemas.microsoft.com/office/powerpoint/2010/main" val="1707128923"/>
       </p:ext>
     </p:extLst>
   </p:cSld>
@@ -1621,7 +2045,7 @@
                 </a:solidFill>
               </a:rPr>
               <a:pPr/>
-              <a:t>6/28/2015</a:t>
+              <a:t>11/5/2015</a:t>
             </a:fld>
             <a:endParaRPr lang="en-US" dirty="0">
               <a:solidFill>
@@ -1653,7 +2077,7 @@
                 </a:solidFill>
               </a:rPr>
               <a:pPr/>
-              <a:t>6</a:t>
+              <a:t>4</a:t>
             </a:fld>
             <a:endParaRPr lang="en-US" dirty="0">
               <a:solidFill>
@@ -1666,7 +2090,7 @@
     </p:spTree>
     <p:extLst>
       <p:ext uri="{BB962C8B-B14F-4D97-AF65-F5344CB8AC3E}">
-        <p14:creationId xmlns:p14="http://schemas.microsoft.com/office/powerpoint/2010/main" val="3415486537"/>
+        <p14:creationId xmlns:p14="http://schemas.microsoft.com/office/powerpoint/2010/main" val="1167229633"/>
       </p:ext>
     </p:extLst>
   </p:cSld>
@@ -1720,15 +2144,7 @@
           <a:bodyPr/>
           <a:lstStyle/>
           <a:p>
-            <a:r>
-              <a:rPr lang="en-US" dirty="0" smtClean="0"/>
-              <a:t>David McCandless</a:t>
-            </a:r>
-            <a:r>
-              <a:rPr lang="en-US" baseline="0" dirty="0" smtClean="0"/>
-              <a:t> built this visualization to show how contagious various microbes were vs. how likely we are to die from them. He was able to fine the deadliness fairly easily, but the contagion of the microbes is based on the “basic reproduction number” which is the number of additional cases of a disease that result from an initial case of the disease. Unfortunately, this information is now published cleanly, so he had to go deep into a lot of research in order to discover and extract the data that he wanted to visualize. </a:t>
-            </a:r>
-            <a:endParaRPr lang="en-US" dirty="0"/>
+            <a:endParaRPr lang="en-US"/>
           </a:p>
         </p:txBody>
       </p:sp>
@@ -1749,12 +2165,16 @@
           <a:p>
             <a:r>
               <a:rPr lang="en-US" smtClean="0">
-                <a:latin typeface="Segoe UI" pitchFamily="34" charset="0"/>
+                <a:solidFill>
+                  <a:prstClr val="black"/>
+                </a:solidFill>
               </a:rPr>
-              <a:t>Build 2015</a:t>
+              <a:t>Build 2014</a:t>
             </a:r>
             <a:endParaRPr lang="en-US" dirty="0">
-              <a:latin typeface="Segoe UI" pitchFamily="34" charset="0"/>
+              <a:solidFill>
+                <a:prstClr val="black"/>
+              </a:solidFill>
             </a:endParaRPr>
           </a:p>
         </p:txBody>
@@ -1792,7 +2212,7 @@
                 <a:ea typeface="Segoe UI" pitchFamily="34" charset="0"/>
                 <a:cs typeface="Segoe UI" pitchFamily="34" charset="0"/>
               </a:rPr>
-              <a:t>© 2015 Microsoft Corporation. All rights reserved. MICROSOFT MAKES NO WARRANTIES, EXPRESS, IMPLIED OR STATUTORY, AS TO THE INFORMATION IN THIS PRESENTATION.</a:t>
+              <a:t>© 2014 Microsoft Corporation. All rights reserved. Microsoft, Windows, and other product names are or may be registered trademarks and/or trademarks in the U.S. and/or other countries. The information herein is for informational purposes only and represents the current view of Microsoft Corporation as of the date of this presentation.  Because Microsoft must respond to changing market conditions, it should not be interpreted to be a commitment on the part of Microsoft, and Microsoft cannot guarantee the accuracy of any information provided after the date of this presentation.  MICROSOFT MAKES NO WARRANTIES, EXPRESS, IMPLIED OR STATUTORY, AS TO THE INFORMATION IN THIS PRESENTATION.</a:t>
             </a:r>
             <a:endParaRPr lang="en-US" sz="400" dirty="0" smtClean="0">
               <a:gradFill>
@@ -1828,11 +2248,20 @@
           <a:bodyPr/>
           <a:lstStyle/>
           <a:p>
-            <a:fld id="{38EEC551-8CDA-4EB6-89BB-2A86C9F091C8}" type="datetime8">
-              <a:rPr lang="en-US" smtClean="0"/>
-              <a:t>6/28/2015 10:45 PM</a:t>
+            <a:fld id="{9F00D60D-1703-4D24-8308-FEE06A50A69C}" type="datetime1">
+              <a:rPr lang="en-US" smtClean="0">
+                <a:solidFill>
+                  <a:prstClr val="black"/>
+                </a:solidFill>
+              </a:rPr>
+              <a:pPr/>
+              <a:t>11/5/2015</a:t>
             </a:fld>
-            <a:endParaRPr lang="en-US" dirty="0"/>
+            <a:endParaRPr lang="en-US" dirty="0">
+              <a:solidFill>
+                <a:prstClr val="black"/>
+              </a:solidFill>
+            </a:endParaRPr>
           </a:p>
         </p:txBody>
       </p:sp>
@@ -1852,18 +2281,26 @@
           <a:lstStyle/>
           <a:p>
             <a:fld id="{B4008EB6-D09E-4580-8CD6-DDB14511944F}" type="slidenum">
-              <a:rPr lang="en-US" smtClean="0"/>
+              <a:rPr lang="en-US" smtClean="0">
+                <a:solidFill>
+                  <a:prstClr val="black"/>
+                </a:solidFill>
+              </a:rPr>
               <a:pPr/>
-              <a:t>9</a:t>
+              <a:t>8</a:t>
             </a:fld>
-            <a:endParaRPr lang="en-US" dirty="0"/>
+            <a:endParaRPr lang="en-US" dirty="0">
+              <a:solidFill>
+                <a:prstClr val="black"/>
+              </a:solidFill>
+            </a:endParaRPr>
           </a:p>
         </p:txBody>
       </p:sp>
     </p:spTree>
     <p:extLst>
       <p:ext uri="{BB962C8B-B14F-4D97-AF65-F5344CB8AC3E}">
-        <p14:creationId xmlns:p14="http://schemas.microsoft.com/office/powerpoint/2010/main" val="581541006"/>
+        <p14:creationId xmlns:p14="http://schemas.microsoft.com/office/powerpoint/2010/main" val="3415486537"/>
       </p:ext>
     </p:extLst>
   </p:cSld>
@@ -1917,7 +2354,15 @@
           <a:bodyPr/>
           <a:lstStyle/>
           <a:p>
-            <a:endParaRPr lang="en-US"/>
+            <a:r>
+              <a:rPr lang="en-US" dirty="0" smtClean="0"/>
+              <a:t>David McCandless</a:t>
+            </a:r>
+            <a:r>
+              <a:rPr lang="en-US" baseline="0" dirty="0" smtClean="0"/>
+              <a:t> built this visualization to show how contagious various microbes were vs. how likely we are to die from them. He was able to fine the deadliness fairly easily, but the contagion of the microbes is based on the “basic reproduction number” which is the number of additional cases of a disease that result from an initial case of the disease. Unfortunately, this information is now published cleanly, so he had to go deep into a lot of research in order to discover and extract the data that he wanted to visualize. </a:t>
+            </a:r>
+            <a:endParaRPr lang="en-US" dirty="0"/>
           </a:p>
         </p:txBody>
       </p:sp>
@@ -1938,16 +2383,12 @@
           <a:p>
             <a:r>
               <a:rPr lang="en-US" smtClean="0">
-                <a:solidFill>
-                  <a:prstClr val="black"/>
-                </a:solidFill>
+                <a:latin typeface="Segoe UI" pitchFamily="34" charset="0"/>
               </a:rPr>
-              <a:t>Build 2014</a:t>
+              <a:t>Build 2015</a:t>
             </a:r>
             <a:endParaRPr lang="en-US" dirty="0">
-              <a:solidFill>
-                <a:prstClr val="black"/>
-              </a:solidFill>
+              <a:latin typeface="Segoe UI" pitchFamily="34" charset="0"/>
             </a:endParaRPr>
           </a:p>
         </p:txBody>
@@ -1985,7 +2426,7 @@
                 <a:ea typeface="Segoe UI" pitchFamily="34" charset="0"/>
                 <a:cs typeface="Segoe UI" pitchFamily="34" charset="0"/>
               </a:rPr>
-              <a:t>© 2014 Microsoft Corporation. All rights reserved. Microsoft, Windows, and other product names are or may be registered trademarks and/or trademarks in the U.S. and/or other countries. The information herein is for informational purposes only and represents the current view of Microsoft Corporation as of the date of this presentation.  Because Microsoft must respond to changing market conditions, it should not be interpreted to be a commitment on the part of Microsoft, and Microsoft cannot guarantee the accuracy of any information provided after the date of this presentation.  MICROSOFT MAKES NO WARRANTIES, EXPRESS, IMPLIED OR STATUTORY, AS TO THE INFORMATION IN THIS PRESENTATION.</a:t>
+              <a:t>© 2015 Microsoft Corporation. All rights reserved. MICROSOFT MAKES NO WARRANTIES, EXPRESS, IMPLIED OR STATUTORY, AS TO THE INFORMATION IN THIS PRESENTATION.</a:t>
             </a:r>
             <a:endParaRPr lang="en-US" sz="400" dirty="0" smtClean="0">
               <a:gradFill>
@@ -2021,20 +2462,11 @@
           <a:bodyPr/>
           <a:lstStyle/>
           <a:p>
-            <a:fld id="{9F00D60D-1703-4D24-8308-FEE06A50A69C}" type="datetime1">
-              <a:rPr lang="en-US" smtClean="0">
-                <a:solidFill>
-                  <a:prstClr val="black"/>
-                </a:solidFill>
-              </a:rPr>
-              <a:pPr/>
-              <a:t>6/28/2015</a:t>
+            <a:fld id="{38EEC551-8CDA-4EB6-89BB-2A86C9F091C8}" type="datetime8">
+              <a:rPr lang="en-US" smtClean="0"/>
+              <a:t>11/5/2015 1:08 PM</a:t>
             </a:fld>
-            <a:endParaRPr lang="en-US" dirty="0">
-              <a:solidFill>
-                <a:prstClr val="black"/>
-              </a:solidFill>
-            </a:endParaRPr>
+            <a:endParaRPr lang="en-US" dirty="0"/>
           </a:p>
         </p:txBody>
       </p:sp>
@@ -2054,26 +2486,18 @@
           <a:lstStyle/>
           <a:p>
             <a:fld id="{B4008EB6-D09E-4580-8CD6-DDB14511944F}" type="slidenum">
-              <a:rPr lang="en-US" smtClean="0">
-                <a:solidFill>
-                  <a:prstClr val="black"/>
-                </a:solidFill>
-              </a:rPr>
+              <a:rPr lang="en-US" smtClean="0"/>
               <a:pPr/>
-              <a:t>10</a:t>
+              <a:t>11</a:t>
             </a:fld>
-            <a:endParaRPr lang="en-US" dirty="0">
-              <a:solidFill>
-                <a:prstClr val="black"/>
-              </a:solidFill>
-            </a:endParaRPr>
+            <a:endParaRPr lang="en-US" dirty="0"/>
           </a:p>
         </p:txBody>
       </p:sp>
     </p:spTree>
     <p:extLst>
       <p:ext uri="{BB962C8B-B14F-4D97-AF65-F5344CB8AC3E}">
-        <p14:creationId xmlns:p14="http://schemas.microsoft.com/office/powerpoint/2010/main" val="3693673346"/>
+        <p14:creationId xmlns:p14="http://schemas.microsoft.com/office/powerpoint/2010/main" val="581541006"/>
       </p:ext>
     </p:extLst>
   </p:cSld>
@@ -2238,7 +2662,7 @@
                 </a:solidFill>
               </a:rPr>
               <a:pPr/>
-              <a:t>6/28/2015</a:t>
+              <a:t>11/5/2015</a:t>
             </a:fld>
             <a:endParaRPr lang="en-US" dirty="0">
               <a:solidFill>
@@ -2270,7 +2694,7 @@
                 </a:solidFill>
               </a:rPr>
               <a:pPr/>
-              <a:t>20</a:t>
+              <a:t>12</a:t>
             </a:fld>
             <a:endParaRPr lang="en-US" dirty="0">
               <a:solidFill>
@@ -2283,7 +2707,7 @@
     </p:spTree>
     <p:extLst>
       <p:ext uri="{BB962C8B-B14F-4D97-AF65-F5344CB8AC3E}">
-        <p14:creationId xmlns:p14="http://schemas.microsoft.com/office/powerpoint/2010/main" val="1410818140"/>
+        <p14:creationId xmlns:p14="http://schemas.microsoft.com/office/powerpoint/2010/main" val="3693673346"/>
       </p:ext>
     </p:extLst>
   </p:cSld>
@@ -2337,7 +2761,11 @@
           <a:bodyPr/>
           <a:lstStyle/>
           <a:p>
-            <a:endParaRPr lang="en-US"/>
+            <a:r>
+              <a:rPr lang="en-US" dirty="0" err="1" smtClean="0"/>
+              <a:t>Treemap</a:t>
+            </a:r>
+            <a:endParaRPr lang="en-US" dirty="0"/>
           </a:p>
         </p:txBody>
       </p:sp>
@@ -2358,16 +2786,12 @@
           <a:p>
             <a:r>
               <a:rPr lang="en-US" smtClean="0">
-                <a:solidFill>
-                  <a:prstClr val="black"/>
-                </a:solidFill>
+                <a:latin typeface="Segoe UI" pitchFamily="34" charset="0"/>
               </a:rPr>
-              <a:t>Build 2014</a:t>
+              <a:t>Build 2015</a:t>
             </a:r>
             <a:endParaRPr lang="en-US" dirty="0">
-              <a:solidFill>
-                <a:prstClr val="black"/>
-              </a:solidFill>
+              <a:latin typeface="Segoe UI" pitchFamily="34" charset="0"/>
             </a:endParaRPr>
           </a:p>
         </p:txBody>
@@ -2405,7 +2829,7 @@
                 <a:ea typeface="Segoe UI" pitchFamily="34" charset="0"/>
                 <a:cs typeface="Segoe UI" pitchFamily="34" charset="0"/>
               </a:rPr>
-              <a:t>© 2014 Microsoft Corporation. All rights reserved. Microsoft, Windows, and other product names are or may be registered trademarks and/or trademarks in the U.S. and/or other countries. The information herein is for informational purposes only and represents the current view of Microsoft Corporation as of the date of this presentation.  Because Microsoft must respond to changing market conditions, it should not be interpreted to be a commitment on the part of Microsoft, and Microsoft cannot guarantee the accuracy of any information provided after the date of this presentation.  MICROSOFT MAKES NO WARRANTIES, EXPRESS, IMPLIED OR STATUTORY, AS TO THE INFORMATION IN THIS PRESENTATION.</a:t>
+              <a:t>© 2015 Microsoft Corporation. All rights reserved. MICROSOFT MAKES NO WARRANTIES, EXPRESS, IMPLIED OR STATUTORY, AS TO THE INFORMATION IN THIS PRESENTATION.</a:t>
             </a:r>
             <a:endParaRPr lang="en-US" sz="400" dirty="0" smtClean="0">
               <a:gradFill>
@@ -2441,20 +2865,11 @@
           <a:bodyPr/>
           <a:lstStyle/>
           <a:p>
-            <a:fld id="{9F00D60D-1703-4D24-8308-FEE06A50A69C}" type="datetime1">
-              <a:rPr lang="en-US" smtClean="0">
-                <a:solidFill>
-                  <a:prstClr val="black"/>
-                </a:solidFill>
-              </a:rPr>
-              <a:pPr/>
-              <a:t>6/28/2015</a:t>
+            <a:fld id="{38EEC551-8CDA-4EB6-89BB-2A86C9F091C8}" type="datetime8">
+              <a:rPr lang="en-US" smtClean="0"/>
+              <a:t>11/5/2015 1:26 PM</a:t>
             </a:fld>
-            <a:endParaRPr lang="en-US" dirty="0">
-              <a:solidFill>
-                <a:prstClr val="black"/>
-              </a:solidFill>
-            </a:endParaRPr>
+            <a:endParaRPr lang="en-US" dirty="0"/>
           </a:p>
         </p:txBody>
       </p:sp>
@@ -2474,26 +2889,18 @@
           <a:lstStyle/>
           <a:p>
             <a:fld id="{B4008EB6-D09E-4580-8CD6-DDB14511944F}" type="slidenum">
-              <a:rPr lang="en-US" smtClean="0">
-                <a:solidFill>
-                  <a:prstClr val="black"/>
-                </a:solidFill>
-              </a:rPr>
+              <a:rPr lang="en-US" smtClean="0"/>
               <a:pPr/>
-              <a:t>33</a:t>
+              <a:t>16</a:t>
             </a:fld>
-            <a:endParaRPr lang="en-US" dirty="0">
-              <a:solidFill>
-                <a:prstClr val="black"/>
-              </a:solidFill>
-            </a:endParaRPr>
+            <a:endParaRPr lang="en-US" dirty="0"/>
           </a:p>
         </p:txBody>
       </p:sp>
     </p:spTree>
     <p:extLst>
       <p:ext uri="{BB962C8B-B14F-4D97-AF65-F5344CB8AC3E}">
-        <p14:creationId xmlns:p14="http://schemas.microsoft.com/office/powerpoint/2010/main" val="2972198638"/>
+        <p14:creationId xmlns:p14="http://schemas.microsoft.com/office/powerpoint/2010/main" val="3642654820"/>
       </p:ext>
     </p:extLst>
   </p:cSld>
@@ -2658,7 +3065,7 @@
                 </a:solidFill>
               </a:rPr>
               <a:pPr/>
-              <a:t>6/28/2015</a:t>
+              <a:t>11/5/2015</a:t>
             </a:fld>
             <a:endParaRPr lang="en-US" dirty="0">
               <a:solidFill>
@@ -2690,7 +3097,7 @@
                 </a:solidFill>
               </a:rPr>
               <a:pPr/>
-              <a:t>40</a:t>
+              <a:t>22</a:t>
             </a:fld>
             <a:endParaRPr lang="en-US" dirty="0">
               <a:solidFill>
@@ -2703,7 +3110,7 @@
     </p:spTree>
     <p:extLst>
       <p:ext uri="{BB962C8B-B14F-4D97-AF65-F5344CB8AC3E}">
-        <p14:creationId xmlns:p14="http://schemas.microsoft.com/office/powerpoint/2010/main" val="86818076"/>
+        <p14:creationId xmlns:p14="http://schemas.microsoft.com/office/powerpoint/2010/main" val="1410818140"/>
       </p:ext>
     </p:extLst>
   </p:cSld>
@@ -19482,15 +19889,7 @@
             </a:br>
             <a:r>
               <a:rPr lang="en-US" dirty="0" smtClean="0"/>
-              <a:t>Session 2: </a:t>
-            </a:r>
-            <a:r>
-              <a:rPr lang="en-US" dirty="0" smtClean="0"/>
-              <a:t>Asking the Question / Analyzing</a:t>
-            </a:r>
-            <a:r>
-              <a:rPr lang="en-US" dirty="0" smtClean="0"/>
-              <a:t> the Data</a:t>
+              <a:t>Session 2: Asking the Question / Analyzing the Data</a:t>
             </a:r>
             <a:r>
               <a:rPr lang="en-US" sz="1400" dirty="0" smtClean="0"/>
@@ -19573,6 +19972,278 @@
       </p:grpSpPr>
       <p:sp>
         <p:nvSpPr>
+          <p:cNvPr id="5" name="Text Placeholder 4"/>
+          <p:cNvSpPr>
+            <a:spLocks noGrp="1"/>
+          </p:cNvSpPr>
+          <p:nvPr>
+            <p:ph type="body" sz="quarter" idx="10"/>
+          </p:nvPr>
+        </p:nvSpPr>
+        <p:spPr>
+          <a:xfrm>
+            <a:off x="274639" y="1246605"/>
+            <a:ext cx="5410199" cy="4690515"/>
+          </a:xfrm>
+        </p:spPr>
+        <p:txBody>
+          <a:bodyPr/>
+          <a:lstStyle/>
+          <a:p>
+            <a:pPr marL="0" indent="0">
+              <a:buNone/>
+            </a:pPr>
+            <a:r>
+              <a:rPr lang="en-US" dirty="0" smtClean="0"/>
+              <a:t>Working with existing data will raise questions</a:t>
+            </a:r>
+          </a:p>
+          <a:p>
+            <a:pPr marL="0" indent="0">
+              <a:buNone/>
+            </a:pPr>
+            <a:endParaRPr lang="en-US" dirty="0"/>
+          </a:p>
+          <a:p>
+            <a:pPr marL="0" indent="0">
+              <a:buNone/>
+            </a:pPr>
+            <a:r>
+              <a:rPr lang="en-US" dirty="0" smtClean="0"/>
+              <a:t>You may have to collect the “missing link”</a:t>
+            </a:r>
+          </a:p>
+          <a:p>
+            <a:pPr marL="0" indent="0">
+              <a:buNone/>
+            </a:pPr>
+            <a:endParaRPr lang="en-US" dirty="0"/>
+          </a:p>
+          <a:p>
+            <a:pPr marL="0" indent="0">
+              <a:buNone/>
+            </a:pPr>
+            <a:r>
+              <a:rPr lang="en-US" sz="2400" dirty="0"/>
+              <a:t>http://www.informationisbeautiful.net</a:t>
+            </a:r>
+            <a:r>
+              <a:rPr lang="en-US" sz="2400" dirty="0" smtClean="0"/>
+              <a:t>/</a:t>
+            </a:r>
+          </a:p>
+          <a:p>
+            <a:pPr marL="0" indent="0">
+              <a:buNone/>
+            </a:pPr>
+            <a:r>
+              <a:rPr lang="en-US" sz="2400" dirty="0" smtClean="0"/>
+              <a:t>visualizations/the-</a:t>
+            </a:r>
+            <a:r>
+              <a:rPr lang="en-US" sz="2400" dirty="0" err="1" smtClean="0"/>
+              <a:t>microbescope</a:t>
+            </a:r>
+            <a:r>
+              <a:rPr lang="en-US" sz="2400" dirty="0"/>
+              <a:t>/</a:t>
+            </a:r>
+          </a:p>
+        </p:txBody>
+      </p:sp>
+      <p:sp>
+        <p:nvSpPr>
+          <p:cNvPr id="4" name="Title 3"/>
+          <p:cNvSpPr>
+            <a:spLocks noGrp="1"/>
+          </p:cNvSpPr>
+          <p:nvPr>
+            <p:ph type="title"/>
+          </p:nvPr>
+        </p:nvSpPr>
+        <p:spPr/>
+        <p:txBody>
+          <a:bodyPr/>
+          <a:lstStyle/>
+          <a:p>
+            <a:r>
+              <a:rPr lang="en-US" dirty="0" smtClean="0"/>
+              <a:t>Start With the Data You Can Find</a:t>
+            </a:r>
+            <a:endParaRPr lang="en-US" dirty="0"/>
+          </a:p>
+        </p:txBody>
+      </p:sp>
+      <p:pic>
+        <p:nvPicPr>
+          <p:cNvPr id="2" name="Picture 1"/>
+          <p:cNvPicPr>
+            <a:picLocks noChangeAspect="1"/>
+          </p:cNvPicPr>
+          <p:nvPr/>
+        </p:nvPicPr>
+        <p:blipFill>
+          <a:blip r:embed="rId2"/>
+          <a:stretch>
+            <a:fillRect/>
+          </a:stretch>
+        </p:blipFill>
+        <p:spPr>
+          <a:xfrm>
+            <a:off x="5684837" y="1212849"/>
+            <a:ext cx="9741870" cy="5561013"/>
+          </a:xfrm>
+          <a:prstGeom prst="rect">
+            <a:avLst/>
+          </a:prstGeom>
+        </p:spPr>
+      </p:pic>
+    </p:spTree>
+    <p:extLst>
+      <p:ext uri="{BB962C8B-B14F-4D97-AF65-F5344CB8AC3E}">
+        <p14:creationId xmlns:p14="http://schemas.microsoft.com/office/powerpoint/2010/main" val="2491792190"/>
+      </p:ext>
+    </p:extLst>
+  </p:cSld>
+  <p:clrMapOvr>
+    <a:masterClrMapping/>
+  </p:clrMapOvr>
+  <p:transition>
+    <p:fade/>
+  </p:transition>
+</p:sld>
+</file>
+
+<file path=ppt/slides/slide11.xml><?xml version="1.0" encoding="utf-8"?>
+<p:sld xmlns:a="http://schemas.openxmlformats.org/drawingml/2006/main" xmlns:r="http://schemas.openxmlformats.org/officeDocument/2006/relationships" xmlns:p="http://schemas.openxmlformats.org/presentationml/2006/main">
+  <p:cSld>
+    <p:spTree>
+      <p:nvGrpSpPr>
+        <p:cNvPr id="1" name=""/>
+        <p:cNvGrpSpPr/>
+        <p:nvPr/>
+      </p:nvGrpSpPr>
+      <p:grpSpPr>
+        <a:xfrm>
+          <a:off x="0" y="0"/>
+          <a:ext cx="0" cy="0"/>
+          <a:chOff x="0" y="0"/>
+          <a:chExt cx="0" cy="0"/>
+        </a:xfrm>
+      </p:grpSpPr>
+      <p:sp>
+        <p:nvSpPr>
+          <p:cNvPr id="4" name="Title 3"/>
+          <p:cNvSpPr>
+            <a:spLocks noGrp="1"/>
+          </p:cNvSpPr>
+          <p:nvPr>
+            <p:ph type="title"/>
+          </p:nvPr>
+        </p:nvSpPr>
+        <p:spPr/>
+        <p:txBody>
+          <a:bodyPr/>
+          <a:lstStyle/>
+          <a:p>
+            <a:r>
+              <a:rPr lang="en-US" dirty="0" smtClean="0"/>
+              <a:t>Start With the Data You Can Find</a:t>
+            </a:r>
+            <a:endParaRPr lang="en-US" dirty="0"/>
+          </a:p>
+        </p:txBody>
+      </p:sp>
+      <p:pic>
+        <p:nvPicPr>
+          <p:cNvPr id="2" name="Picture 1"/>
+          <p:cNvPicPr>
+            <a:picLocks noChangeAspect="1"/>
+          </p:cNvPicPr>
+          <p:nvPr/>
+        </p:nvPicPr>
+        <p:blipFill>
+          <a:blip r:embed="rId3"/>
+          <a:stretch>
+            <a:fillRect/>
+          </a:stretch>
+        </p:blipFill>
+        <p:spPr>
+          <a:xfrm>
+            <a:off x="0" y="26698"/>
+            <a:ext cx="12238037" cy="6985916"/>
+          </a:xfrm>
+          <a:prstGeom prst="rect">
+            <a:avLst/>
+          </a:prstGeom>
+        </p:spPr>
+      </p:pic>
+      <p:sp>
+        <p:nvSpPr>
+          <p:cNvPr id="3" name="Text Placeholder 2"/>
+          <p:cNvSpPr>
+            <a:spLocks noGrp="1"/>
+          </p:cNvSpPr>
+          <p:nvPr>
+            <p:ph type="body" sz="quarter" idx="10"/>
+          </p:nvPr>
+        </p:nvSpPr>
+        <p:spPr>
+          <a:xfrm>
+            <a:off x="274638" y="1212850"/>
+            <a:ext cx="11887200" cy="738664"/>
+          </a:xfrm>
+        </p:spPr>
+        <p:txBody>
+          <a:bodyPr/>
+          <a:lstStyle/>
+          <a:p>
+            <a:pPr marL="0" indent="0">
+              <a:buNone/>
+            </a:pPr>
+            <a:r>
+              <a:rPr lang="en-US" dirty="0" smtClean="0"/>
+              <a:t> </a:t>
+            </a:r>
+            <a:endParaRPr lang="en-US" dirty="0"/>
+          </a:p>
+        </p:txBody>
+      </p:sp>
+    </p:spTree>
+    <p:extLst>
+      <p:ext uri="{BB962C8B-B14F-4D97-AF65-F5344CB8AC3E}">
+        <p14:creationId xmlns:p14="http://schemas.microsoft.com/office/powerpoint/2010/main" val="1138816033"/>
+      </p:ext>
+    </p:extLst>
+  </p:cSld>
+  <p:clrMapOvr>
+    <a:masterClrMapping/>
+  </p:clrMapOvr>
+  <p:transition>
+    <p:fade/>
+  </p:transition>
+</p:sld>
+</file>
+
+<file path=ppt/slides/slide12.xml><?xml version="1.0" encoding="utf-8"?>
+<p:sld xmlns:a="http://schemas.openxmlformats.org/drawingml/2006/main" xmlns:r="http://schemas.openxmlformats.org/officeDocument/2006/relationships" xmlns:p="http://schemas.openxmlformats.org/presentationml/2006/main">
+  <p:cSld>
+    <p:spTree>
+      <p:nvGrpSpPr>
+        <p:cNvPr id="1" name=""/>
+        <p:cNvGrpSpPr/>
+        <p:nvPr/>
+      </p:nvGrpSpPr>
+      <p:grpSpPr>
+        <a:xfrm>
+          <a:off x="0" y="0"/>
+          <a:ext cx="0" cy="0"/>
+          <a:chOff x="0" y="0"/>
+          <a:chExt cx="0" cy="0"/>
+        </a:xfrm>
+      </p:grpSpPr>
+      <p:sp>
+        <p:nvSpPr>
           <p:cNvPr id="2" name="Text Placeholder 1"/>
           <p:cNvSpPr>
             <a:spLocks noGrp="1"/>
@@ -19667,7 +20338,7 @@
 </p:sld>
 </file>
 
-<file path=ppt/slides/slide11.xml><?xml version="1.0" encoding="utf-8"?>
+<file path=ppt/slides/slide13.xml><?xml version="1.0" encoding="utf-8"?>
 <p:sld xmlns:a="http://schemas.openxmlformats.org/drawingml/2006/main" xmlns:r="http://schemas.openxmlformats.org/officeDocument/2006/relationships" xmlns:p="http://schemas.openxmlformats.org/presentationml/2006/main">
   <p:cSld>
     <p:spTree>
@@ -19869,7 +20540,7 @@
 </p:sld>
 </file>
 
-<file path=ppt/slides/slide12.xml><?xml version="1.0" encoding="utf-8"?>
+<file path=ppt/slides/slide14.xml><?xml version="1.0" encoding="utf-8"?>
 <p:sld xmlns:a="http://schemas.openxmlformats.org/drawingml/2006/main" xmlns:r="http://schemas.openxmlformats.org/officeDocument/2006/relationships" xmlns:p="http://schemas.openxmlformats.org/presentationml/2006/main">
   <p:cSld>
     <p:spTree>
@@ -19966,7 +20637,7 @@
 </p:sld>
 </file>
 
-<file path=ppt/slides/slide13.xml><?xml version="1.0" encoding="utf-8"?>
+<file path=ppt/slides/slide15.xml><?xml version="1.0" encoding="utf-8"?>
 <p:sld xmlns:a="http://schemas.openxmlformats.org/drawingml/2006/main" xmlns:r="http://schemas.openxmlformats.org/officeDocument/2006/relationships" xmlns:p="http://schemas.openxmlformats.org/presentationml/2006/main">
   <p:cSld>
     <p:spTree>
@@ -20187,7 +20858,7 @@
 </p:sld>
 </file>
 
-<file path=ppt/slides/slide14.xml><?xml version="1.0" encoding="utf-8"?>
+<file path=ppt/slides/slide16.xml><?xml version="1.0" encoding="utf-8"?>
 <p:sld xmlns:a="http://schemas.openxmlformats.org/drawingml/2006/main" xmlns:r="http://schemas.openxmlformats.org/officeDocument/2006/relationships" xmlns:p="http://schemas.openxmlformats.org/presentationml/2006/main">
   <p:cSld>
     <p:spTree>
@@ -20217,7 +20888,7 @@
         <p:spPr>
           <a:xfrm>
             <a:off x="7285037" y="1058862"/>
-            <a:ext cx="8308167" cy="914400"/>
+            <a:ext cx="8308167" cy="1905000"/>
           </a:xfrm>
         </p:spPr>
         <p:txBody>
@@ -20232,19 +20903,19 @@
           <a:p>
             <a:r>
               <a:rPr lang="en-US" sz="2800" dirty="0" smtClean="0">
-                <a:hlinkClick r:id="rId2"/>
+                <a:hlinkClick r:id="rId3"/>
               </a:rPr>
               <a:t>http</a:t>
             </a:r>
             <a:r>
               <a:rPr lang="en-US" sz="2800" dirty="0">
-                <a:hlinkClick r:id="rId2"/>
+                <a:hlinkClick r:id="rId3"/>
               </a:rPr>
               <a:t>://www.bls.gov/data</a:t>
             </a:r>
             <a:r>
               <a:rPr lang="en-US" sz="2800" dirty="0" smtClean="0">
-                <a:hlinkClick r:id="rId2"/>
+                <a:hlinkClick r:id="rId3"/>
               </a:rPr>
               <a:t>/</a:t>
             </a:r>
@@ -20290,7 +20961,7 @@
           <p:nvPr/>
         </p:nvPicPr>
         <p:blipFill>
-          <a:blip r:embed="rId3"/>
+          <a:blip r:embed="rId4"/>
           <a:stretch>
             <a:fillRect/>
           </a:stretch>
@@ -20382,7 +21053,7 @@
 </p:sld>
 </file>
 
-<file path=ppt/slides/slide15.xml><?xml version="1.0" encoding="utf-8"?>
+<file path=ppt/slides/slide17.xml><?xml version="1.0" encoding="utf-8"?>
 <p:sld xmlns:a="http://schemas.openxmlformats.org/drawingml/2006/main" xmlns:r="http://schemas.openxmlformats.org/officeDocument/2006/relationships" xmlns:p="http://schemas.openxmlformats.org/presentationml/2006/main">
   <p:cSld>
     <p:spTree>
@@ -20550,7 +21221,7 @@
 </p:sld>
 </file>
 
-<file path=ppt/slides/slide16.xml><?xml version="1.0" encoding="utf-8"?>
+<file path=ppt/slides/slide18.xml><?xml version="1.0" encoding="utf-8"?>
 <p:sld xmlns:a="http://schemas.openxmlformats.org/drawingml/2006/main" xmlns:r="http://schemas.openxmlformats.org/officeDocument/2006/relationships" xmlns:p="http://schemas.openxmlformats.org/presentationml/2006/main">
   <p:cSld>
     <p:spTree>
@@ -20688,7 +21359,7 @@
 </p:sld>
 </file>
 
-<file path=ppt/slides/slide17.xml><?xml version="1.0" encoding="utf-8"?>
+<file path=ppt/slides/slide19.xml><?xml version="1.0" encoding="utf-8"?>
 <p:sld xmlns:a="http://schemas.openxmlformats.org/drawingml/2006/main" xmlns:r="http://schemas.openxmlformats.org/officeDocument/2006/relationships" xmlns:p="http://schemas.openxmlformats.org/presentationml/2006/main">
   <p:cSld>
     <p:spTree>
@@ -20783,323 +21454,6 @@
     <p:extLst>
       <p:ext uri="{BB962C8B-B14F-4D97-AF65-F5344CB8AC3E}">
         <p14:creationId xmlns:p14="http://schemas.microsoft.com/office/powerpoint/2010/main" val="2094981963"/>
-      </p:ext>
-    </p:extLst>
-  </p:cSld>
-  <p:clrMapOvr>
-    <a:masterClrMapping/>
-  </p:clrMapOvr>
-  <p:transition>
-    <p:fade/>
-  </p:transition>
-</p:sld>
-</file>
-
-<file path=ppt/slides/slide18.xml><?xml version="1.0" encoding="utf-8"?>
-<p:sld xmlns:a="http://schemas.openxmlformats.org/drawingml/2006/main" xmlns:r="http://schemas.openxmlformats.org/officeDocument/2006/relationships" xmlns:p="http://schemas.openxmlformats.org/presentationml/2006/main">
-  <p:cSld>
-    <p:spTree>
-      <p:nvGrpSpPr>
-        <p:cNvPr id="1" name=""/>
-        <p:cNvGrpSpPr/>
-        <p:nvPr/>
-      </p:nvGrpSpPr>
-      <p:grpSpPr>
-        <a:xfrm>
-          <a:off x="0" y="0"/>
-          <a:ext cx="0" cy="0"/>
-          <a:chOff x="0" y="0"/>
-          <a:chExt cx="0" cy="0"/>
-        </a:xfrm>
-      </p:grpSpPr>
-      <p:sp>
-        <p:nvSpPr>
-          <p:cNvPr id="4" name="Title 3"/>
-          <p:cNvSpPr>
-            <a:spLocks noGrp="1"/>
-          </p:cNvSpPr>
-          <p:nvPr>
-            <p:ph type="title"/>
-          </p:nvPr>
-        </p:nvSpPr>
-        <p:spPr/>
-        <p:txBody>
-          <a:bodyPr/>
-          <a:lstStyle/>
-          <a:p>
-            <a:r>
-              <a:rPr lang="en-US" dirty="0" smtClean="0"/>
-              <a:t>FRED Data – Excel Add-In</a:t>
-            </a:r>
-            <a:endParaRPr lang="en-US" dirty="0"/>
-          </a:p>
-        </p:txBody>
-      </p:sp>
-      <p:sp>
-        <p:nvSpPr>
-          <p:cNvPr id="3" name="Text Placeholder 2"/>
-          <p:cNvSpPr>
-            <a:spLocks noGrp="1"/>
-          </p:cNvSpPr>
-          <p:nvPr>
-            <p:ph type="body" sz="quarter" idx="15"/>
-          </p:nvPr>
-        </p:nvSpPr>
-        <p:spPr>
-          <a:xfrm>
-            <a:off x="274639" y="1404142"/>
-            <a:ext cx="9601201" cy="914400"/>
-          </a:xfrm>
-        </p:spPr>
-        <p:txBody>
-          <a:bodyPr/>
-          <a:lstStyle/>
-          <a:p>
-            <a:r>
-              <a:rPr lang="en-US" dirty="0"/>
-              <a:t>http://research.stlouisfed.org/fred-addin</a:t>
-            </a:r>
-            <a:r>
-              <a:rPr lang="en-US" dirty="0" smtClean="0"/>
-              <a:t>/</a:t>
-            </a:r>
-            <a:endParaRPr lang="en-US" dirty="0"/>
-          </a:p>
-        </p:txBody>
-      </p:sp>
-      <p:pic>
-        <p:nvPicPr>
-          <p:cNvPr id="6" name="Picture 5"/>
-          <p:cNvPicPr>
-            <a:picLocks noChangeAspect="1"/>
-          </p:cNvPicPr>
-          <p:nvPr/>
-        </p:nvPicPr>
-        <p:blipFill>
-          <a:blip r:embed="rId2"/>
-          <a:stretch>
-            <a:fillRect/>
-          </a:stretch>
-        </p:blipFill>
-        <p:spPr>
-          <a:xfrm>
-            <a:off x="463694" y="3725862"/>
-            <a:ext cx="11511453" cy="1979613"/>
-          </a:xfrm>
-          <a:prstGeom prst="rect">
-            <a:avLst/>
-          </a:prstGeom>
-        </p:spPr>
-      </p:pic>
-      <p:sp>
-        <p:nvSpPr>
-          <p:cNvPr id="2" name="TextBox 1"/>
-          <p:cNvSpPr txBox="1"/>
-          <p:nvPr/>
-        </p:nvSpPr>
-        <p:spPr>
-          <a:xfrm>
-            <a:off x="274639" y="2430462"/>
-            <a:ext cx="8116743" cy="960263"/>
-          </a:xfrm>
-          <a:prstGeom prst="rect">
-            <a:avLst/>
-          </a:prstGeom>
-          <a:noFill/>
-        </p:spPr>
-        <p:txBody>
-          <a:bodyPr wrap="square" lIns="182880" tIns="146304" rIns="182880" bIns="146304" rtlCol="0">
-            <a:spAutoFit/>
-          </a:bodyPr>
-          <a:lstStyle/>
-          <a:p>
-            <a:pPr>
-              <a:lnSpc>
-                <a:spcPct val="90000"/>
-              </a:lnSpc>
-              <a:spcAft>
-                <a:spcPts val="600"/>
-              </a:spcAft>
-            </a:pPr>
-            <a:r>
-              <a:rPr lang="en-US" sz="4800" dirty="0" smtClean="0">
-                <a:gradFill>
-                  <a:gsLst>
-                    <a:gs pos="2917">
-                      <a:schemeClr val="tx1"/>
-                    </a:gs>
-                    <a:gs pos="30000">
-                      <a:schemeClr val="tx1"/>
-                    </a:gs>
-                  </a:gsLst>
-                  <a:lin ang="5400000" scaled="0"/>
-                </a:gradFill>
-              </a:rPr>
-              <a:t>DEMO</a:t>
-            </a:r>
-            <a:endParaRPr lang="en-US" sz="4800" dirty="0" smtClean="0">
-              <a:gradFill>
-                <a:gsLst>
-                  <a:gs pos="2917">
-                    <a:schemeClr val="tx1"/>
-                  </a:gs>
-                  <a:gs pos="30000">
-                    <a:schemeClr val="tx1"/>
-                  </a:gs>
-                </a:gsLst>
-                <a:lin ang="5400000" scaled="0"/>
-              </a:gradFill>
-            </a:endParaRPr>
-          </a:p>
-        </p:txBody>
-      </p:sp>
-    </p:spTree>
-    <p:extLst>
-      <p:ext uri="{BB962C8B-B14F-4D97-AF65-F5344CB8AC3E}">
-        <p14:creationId xmlns:p14="http://schemas.microsoft.com/office/powerpoint/2010/main" val="4201448430"/>
-      </p:ext>
-    </p:extLst>
-  </p:cSld>
-  <p:clrMapOvr>
-    <a:masterClrMapping/>
-  </p:clrMapOvr>
-  <p:transition>
-    <p:fade/>
-  </p:transition>
-</p:sld>
-</file>
-
-<file path=ppt/slides/slide19.xml><?xml version="1.0" encoding="utf-8"?>
-<p:sld xmlns:a="http://schemas.openxmlformats.org/drawingml/2006/main" xmlns:r="http://schemas.openxmlformats.org/officeDocument/2006/relationships" xmlns:p="http://schemas.openxmlformats.org/presentationml/2006/main">
-  <p:cSld>
-    <p:spTree>
-      <p:nvGrpSpPr>
-        <p:cNvPr id="1" name=""/>
-        <p:cNvGrpSpPr/>
-        <p:nvPr/>
-      </p:nvGrpSpPr>
-      <p:grpSpPr>
-        <a:xfrm>
-          <a:off x="0" y="0"/>
-          <a:ext cx="0" cy="0"/>
-          <a:chOff x="0" y="0"/>
-          <a:chExt cx="0" cy="0"/>
-        </a:xfrm>
-      </p:grpSpPr>
-      <p:sp>
-        <p:nvSpPr>
-          <p:cNvPr id="5" name="Text Placeholder 4"/>
-          <p:cNvSpPr>
-            <a:spLocks noGrp="1"/>
-          </p:cNvSpPr>
-          <p:nvPr>
-            <p:ph type="body" sz="quarter" idx="15"/>
-          </p:nvPr>
-        </p:nvSpPr>
-        <p:spPr>
-          <a:xfrm>
-            <a:off x="274639" y="1363662"/>
-            <a:ext cx="11887202" cy="4419601"/>
-          </a:xfrm>
-        </p:spPr>
-        <p:txBody>
-          <a:bodyPr anchor="t"/>
-          <a:lstStyle/>
-          <a:p>
-            <a:r>
-              <a:rPr lang="en-US" dirty="0" smtClean="0">
-                <a:hlinkClick r:id="rId2"/>
-              </a:rPr>
-              <a:t>http</a:t>
-            </a:r>
-            <a:r>
-              <a:rPr lang="en-US" dirty="0">
-                <a:hlinkClick r:id="rId2"/>
-              </a:rPr>
-              <a:t>://www.opensecrets.org/resources/create</a:t>
-            </a:r>
-            <a:r>
-              <a:rPr lang="en-US" dirty="0" smtClean="0">
-                <a:hlinkClick r:id="rId2"/>
-              </a:rPr>
-              <a:t>/</a:t>
-            </a:r>
-            <a:endParaRPr lang="en-US" dirty="0" smtClean="0"/>
-          </a:p>
-          <a:p>
-            <a:endParaRPr lang="en-US" dirty="0"/>
-          </a:p>
-          <a:p>
-            <a:r>
-              <a:rPr lang="en-US" dirty="0">
-                <a:hlinkClick r:id="rId3"/>
-              </a:rPr>
-              <a:t>http://</a:t>
-            </a:r>
-            <a:r>
-              <a:rPr lang="en-US" dirty="0" smtClean="0">
-                <a:hlinkClick r:id="rId3"/>
-              </a:rPr>
-              <a:t>developer.nytimes.com/docs</a:t>
-            </a:r>
-            <a:endParaRPr lang="en-US" dirty="0" smtClean="0"/>
-          </a:p>
-          <a:p>
-            <a:endParaRPr lang="en-US" dirty="0"/>
-          </a:p>
-          <a:p>
-            <a:r>
-              <a:rPr lang="en-US" dirty="0">
-                <a:hlinkClick r:id="rId4"/>
-              </a:rPr>
-              <a:t>http://sunlightfoundation.com/api</a:t>
-            </a:r>
-            <a:r>
-              <a:rPr lang="en-US" dirty="0" smtClean="0">
-                <a:hlinkClick r:id="rId4"/>
-              </a:rPr>
-              <a:t>/</a:t>
-            </a:r>
-            <a:endParaRPr lang="en-US" dirty="0"/>
-          </a:p>
-          <a:p>
-            <a:endParaRPr lang="en-US" dirty="0" smtClean="0"/>
-          </a:p>
-          <a:p>
-            <a:endParaRPr lang="en-US" dirty="0" smtClean="0"/>
-          </a:p>
-          <a:p>
-            <a:endParaRPr lang="en-US" dirty="0"/>
-          </a:p>
-        </p:txBody>
-      </p:sp>
-      <p:sp>
-        <p:nvSpPr>
-          <p:cNvPr id="4" name="Title 3"/>
-          <p:cNvSpPr>
-            <a:spLocks noGrp="1"/>
-          </p:cNvSpPr>
-          <p:nvPr>
-            <p:ph type="title"/>
-          </p:nvPr>
-        </p:nvSpPr>
-        <p:spPr/>
-        <p:txBody>
-          <a:bodyPr/>
-          <a:lstStyle/>
-          <a:p>
-            <a:r>
-              <a:rPr lang="en-US" dirty="0" smtClean="0"/>
-              <a:t>APIs</a:t>
-            </a:r>
-            <a:endParaRPr lang="en-US" dirty="0"/>
-          </a:p>
-        </p:txBody>
-      </p:sp>
-    </p:spTree>
-    <p:extLst>
-      <p:ext uri="{BB962C8B-B14F-4D97-AF65-F5344CB8AC3E}">
-        <p14:creationId xmlns:p14="http://schemas.microsoft.com/office/powerpoint/2010/main" val="1132302561"/>
       </p:ext>
     </p:extLst>
   </p:cSld>
@@ -21157,8 +21511,25 @@
                   </a:schemeClr>
                 </a:solidFill>
               </a:rPr>
-              <a:t>Finding the appropriate data</a:t>
-            </a:r>
+              <a:t>Lauren </a:t>
+            </a:r>
+            <a:r>
+              <a:rPr lang="en-US" dirty="0" err="1" smtClean="0">
+                <a:solidFill>
+                  <a:schemeClr val="tx1">
+                    <a:lumMod val="75000"/>
+                  </a:schemeClr>
+                </a:solidFill>
+              </a:rPr>
+              <a:t>Luxenburg</a:t>
+            </a:r>
+            <a:endParaRPr lang="en-US" dirty="0" smtClean="0">
+              <a:solidFill>
+                <a:schemeClr val="tx1">
+                  <a:lumMod val="75000"/>
+                </a:schemeClr>
+              </a:solidFill>
+            </a:endParaRPr>
           </a:p>
           <a:p>
             <a:r>
@@ -21169,8 +21540,36 @@
                   </a:schemeClr>
                 </a:solidFill>
               </a:rPr>
-              <a:t>Organize / analyze </a:t>
-            </a:r>
+              <a:t>@</a:t>
+            </a:r>
+            <a:r>
+              <a:rPr lang="en-US" dirty="0" err="1" smtClean="0">
+                <a:solidFill>
+                  <a:schemeClr val="tx1">
+                    <a:lumMod val="75000"/>
+                  </a:schemeClr>
+                </a:solidFill>
+              </a:rPr>
+              <a:t>LaurenC_Lux</a:t>
+            </a:r>
+            <a:endParaRPr lang="en-US" dirty="0" smtClean="0">
+              <a:solidFill>
+                <a:schemeClr val="tx1">
+                  <a:lumMod val="75000"/>
+                </a:schemeClr>
+              </a:solidFill>
+            </a:endParaRPr>
+          </a:p>
+          <a:p>
+            <a:endParaRPr lang="en-US" dirty="0" smtClean="0">
+              <a:solidFill>
+                <a:schemeClr val="tx1">
+                  <a:lumMod val="75000"/>
+                </a:schemeClr>
+              </a:solidFill>
+            </a:endParaRPr>
+          </a:p>
+          <a:p>
             <a:r>
               <a:rPr lang="en-US" dirty="0" smtClean="0">
                 <a:solidFill>
@@ -21179,7 +21578,7 @@
                   </a:schemeClr>
                 </a:solidFill>
               </a:rPr>
-              <a:t>your data</a:t>
+              <a:t>Director at WPA Research</a:t>
             </a:r>
           </a:p>
           <a:p>
@@ -21191,7 +21590,7 @@
                   </a:schemeClr>
                 </a:solidFill>
               </a:rPr>
-              <a:t>Basic charting</a:t>
+              <a:t>lluxenburg@wparesearch.com</a:t>
             </a:r>
             <a:endParaRPr lang="en-US" dirty="0">
               <a:solidFill>
@@ -21224,7 +21623,15 @@
                 <a:ea typeface="Segoe UI Black" panose="020B0A02040204020203" pitchFamily="34" charset="0"/>
                 <a:cs typeface="Segoe UI Black" panose="020B0A02040204020203" pitchFamily="34" charset="0"/>
               </a:rPr>
-              <a:t>  Agenda</a:t>
+              <a:t>  </a:t>
+            </a:r>
+            <a:r>
+              <a:rPr lang="en-US" dirty="0" smtClean="0">
+                <a:latin typeface="+mn-lt"/>
+                <a:ea typeface="Segoe UI Black" panose="020B0A02040204020203" pitchFamily="34" charset="0"/>
+                <a:cs typeface="Segoe UI Black" panose="020B0A02040204020203" pitchFamily="34" charset="0"/>
+              </a:rPr>
+              <a:t>Speaker</a:t>
             </a:r>
             <a:endParaRPr lang="en-US" dirty="0">
               <a:latin typeface="+mn-lt"/>
@@ -21237,20 +21644,20 @@
     </p:spTree>
     <p:extLst>
       <p:ext uri="{BB962C8B-B14F-4D97-AF65-F5344CB8AC3E}">
-        <p14:creationId xmlns:p14="http://schemas.microsoft.com/office/powerpoint/2010/main" val="622632091"/>
+        <p14:creationId xmlns:p14="http://schemas.microsoft.com/office/powerpoint/2010/main" val="1080298842"/>
       </p:ext>
     </p:extLst>
   </p:cSld>
   <p:clrMapOvr>
     <a:masterClrMapping/>
   </p:clrMapOvr>
-  <mc:AlternateContent xmlns:mc="http://schemas.openxmlformats.org/markup-compatibility/2006" xmlns:p14="http://schemas.microsoft.com/office/powerpoint/2010/main">
-    <mc:Choice Requires="p14">
+  <mc:AlternateContent xmlns:mc="http://schemas.openxmlformats.org/markup-compatibility/2006">
+    <mc:Choice xmlns:p14="http://schemas.microsoft.com/office/powerpoint/2010/main" Requires="p14">
       <p:transition spd="med" p14:dur="700">
         <p:fade/>
       </p:transition>
     </mc:Choice>
-    <mc:Fallback xmlns="">
+    <mc:Fallback>
       <p:transition spd="med">
         <p:fade/>
       </p:transition>
@@ -21285,6 +21692,310 @@
       </p:grpSpPr>
       <p:sp>
         <p:nvSpPr>
+          <p:cNvPr id="4" name="Title 3"/>
+          <p:cNvSpPr>
+            <a:spLocks noGrp="1"/>
+          </p:cNvSpPr>
+          <p:nvPr>
+            <p:ph type="title"/>
+          </p:nvPr>
+        </p:nvSpPr>
+        <p:spPr/>
+        <p:txBody>
+          <a:bodyPr/>
+          <a:lstStyle/>
+          <a:p>
+            <a:r>
+              <a:rPr lang="en-US" dirty="0" smtClean="0"/>
+              <a:t>FRED Data – Excel Add-In</a:t>
+            </a:r>
+            <a:endParaRPr lang="en-US" dirty="0"/>
+          </a:p>
+        </p:txBody>
+      </p:sp>
+      <p:sp>
+        <p:nvSpPr>
+          <p:cNvPr id="3" name="Text Placeholder 2"/>
+          <p:cNvSpPr>
+            <a:spLocks noGrp="1"/>
+          </p:cNvSpPr>
+          <p:nvPr>
+            <p:ph type="body" sz="quarter" idx="15"/>
+          </p:nvPr>
+        </p:nvSpPr>
+        <p:spPr>
+          <a:xfrm>
+            <a:off x="274639" y="1404142"/>
+            <a:ext cx="9601201" cy="914400"/>
+          </a:xfrm>
+        </p:spPr>
+        <p:txBody>
+          <a:bodyPr/>
+          <a:lstStyle/>
+          <a:p>
+            <a:r>
+              <a:rPr lang="en-US" dirty="0"/>
+              <a:t>http://research.stlouisfed.org/fred-addin</a:t>
+            </a:r>
+            <a:r>
+              <a:rPr lang="en-US" dirty="0" smtClean="0"/>
+              <a:t>/</a:t>
+            </a:r>
+            <a:endParaRPr lang="en-US" dirty="0"/>
+          </a:p>
+        </p:txBody>
+      </p:sp>
+      <p:pic>
+        <p:nvPicPr>
+          <p:cNvPr id="6" name="Picture 5"/>
+          <p:cNvPicPr>
+            <a:picLocks noChangeAspect="1"/>
+          </p:cNvPicPr>
+          <p:nvPr/>
+        </p:nvPicPr>
+        <p:blipFill>
+          <a:blip r:embed="rId2"/>
+          <a:stretch>
+            <a:fillRect/>
+          </a:stretch>
+        </p:blipFill>
+        <p:spPr>
+          <a:xfrm>
+            <a:off x="463694" y="3725862"/>
+            <a:ext cx="11511453" cy="1979613"/>
+          </a:xfrm>
+          <a:prstGeom prst="rect">
+            <a:avLst/>
+          </a:prstGeom>
+        </p:spPr>
+      </p:pic>
+      <p:sp>
+        <p:nvSpPr>
+          <p:cNvPr id="2" name="TextBox 1"/>
+          <p:cNvSpPr txBox="1"/>
+          <p:nvPr/>
+        </p:nvSpPr>
+        <p:spPr>
+          <a:xfrm>
+            <a:off x="274639" y="2430462"/>
+            <a:ext cx="8116743" cy="960263"/>
+          </a:xfrm>
+          <a:prstGeom prst="rect">
+            <a:avLst/>
+          </a:prstGeom>
+          <a:noFill/>
+        </p:spPr>
+        <p:txBody>
+          <a:bodyPr wrap="square" lIns="182880" tIns="146304" rIns="182880" bIns="146304" rtlCol="0">
+            <a:spAutoFit/>
+          </a:bodyPr>
+          <a:lstStyle/>
+          <a:p>
+            <a:pPr>
+              <a:lnSpc>
+                <a:spcPct val="90000"/>
+              </a:lnSpc>
+              <a:spcAft>
+                <a:spcPts val="600"/>
+              </a:spcAft>
+            </a:pPr>
+            <a:r>
+              <a:rPr lang="en-US" sz="4800" dirty="0" smtClean="0">
+                <a:gradFill>
+                  <a:gsLst>
+                    <a:gs pos="2917">
+                      <a:schemeClr val="tx1"/>
+                    </a:gs>
+                    <a:gs pos="30000">
+                      <a:schemeClr val="tx1"/>
+                    </a:gs>
+                  </a:gsLst>
+                  <a:lin ang="5400000" scaled="0"/>
+                </a:gradFill>
+              </a:rPr>
+              <a:t>DEMO</a:t>
+            </a:r>
+          </a:p>
+        </p:txBody>
+      </p:sp>
+    </p:spTree>
+    <p:extLst>
+      <p:ext uri="{BB962C8B-B14F-4D97-AF65-F5344CB8AC3E}">
+        <p14:creationId xmlns:p14="http://schemas.microsoft.com/office/powerpoint/2010/main" val="4201448430"/>
+      </p:ext>
+    </p:extLst>
+  </p:cSld>
+  <p:clrMapOvr>
+    <a:masterClrMapping/>
+  </p:clrMapOvr>
+  <p:transition>
+    <p:fade/>
+  </p:transition>
+</p:sld>
+</file>
+
+<file path=ppt/slides/slide21.xml><?xml version="1.0" encoding="utf-8"?>
+<p:sld xmlns:a="http://schemas.openxmlformats.org/drawingml/2006/main" xmlns:r="http://schemas.openxmlformats.org/officeDocument/2006/relationships" xmlns:p="http://schemas.openxmlformats.org/presentationml/2006/main">
+  <p:cSld>
+    <p:spTree>
+      <p:nvGrpSpPr>
+        <p:cNvPr id="1" name=""/>
+        <p:cNvGrpSpPr/>
+        <p:nvPr/>
+      </p:nvGrpSpPr>
+      <p:grpSpPr>
+        <a:xfrm>
+          <a:off x="0" y="0"/>
+          <a:ext cx="0" cy="0"/>
+          <a:chOff x="0" y="0"/>
+          <a:chExt cx="0" cy="0"/>
+        </a:xfrm>
+      </p:grpSpPr>
+      <p:sp>
+        <p:nvSpPr>
+          <p:cNvPr id="5" name="Text Placeholder 4"/>
+          <p:cNvSpPr>
+            <a:spLocks noGrp="1"/>
+          </p:cNvSpPr>
+          <p:nvPr>
+            <p:ph type="body" sz="quarter" idx="15"/>
+          </p:nvPr>
+        </p:nvSpPr>
+        <p:spPr>
+          <a:xfrm>
+            <a:off x="274639" y="1363662"/>
+            <a:ext cx="11887202" cy="4419601"/>
+          </a:xfrm>
+        </p:spPr>
+        <p:txBody>
+          <a:bodyPr anchor="t"/>
+          <a:lstStyle/>
+          <a:p>
+            <a:r>
+              <a:rPr lang="en-US" dirty="0" smtClean="0">
+                <a:hlinkClick r:id="rId2"/>
+              </a:rPr>
+              <a:t>http</a:t>
+            </a:r>
+            <a:r>
+              <a:rPr lang="en-US" dirty="0">
+                <a:hlinkClick r:id="rId2"/>
+              </a:rPr>
+              <a:t>://www.opensecrets.org/resources/create</a:t>
+            </a:r>
+            <a:r>
+              <a:rPr lang="en-US" dirty="0" smtClean="0">
+                <a:hlinkClick r:id="rId2"/>
+              </a:rPr>
+              <a:t>/</a:t>
+            </a:r>
+            <a:endParaRPr lang="en-US" dirty="0" smtClean="0"/>
+          </a:p>
+          <a:p>
+            <a:endParaRPr lang="en-US" dirty="0"/>
+          </a:p>
+          <a:p>
+            <a:r>
+              <a:rPr lang="en-US" dirty="0">
+                <a:hlinkClick r:id="rId3"/>
+              </a:rPr>
+              <a:t>http://</a:t>
+            </a:r>
+            <a:r>
+              <a:rPr lang="en-US" dirty="0" smtClean="0">
+                <a:hlinkClick r:id="rId3"/>
+              </a:rPr>
+              <a:t>developer.nytimes.com/docs</a:t>
+            </a:r>
+            <a:endParaRPr lang="en-US" dirty="0" smtClean="0"/>
+          </a:p>
+          <a:p>
+            <a:endParaRPr lang="en-US" dirty="0"/>
+          </a:p>
+          <a:p>
+            <a:r>
+              <a:rPr lang="en-US" dirty="0">
+                <a:hlinkClick r:id="rId4"/>
+              </a:rPr>
+              <a:t>http://sunlightfoundation.com/api</a:t>
+            </a:r>
+            <a:r>
+              <a:rPr lang="en-US" dirty="0" smtClean="0">
+                <a:hlinkClick r:id="rId4"/>
+              </a:rPr>
+              <a:t>/</a:t>
+            </a:r>
+            <a:endParaRPr lang="en-US" dirty="0"/>
+          </a:p>
+          <a:p>
+            <a:endParaRPr lang="en-US" dirty="0" smtClean="0"/>
+          </a:p>
+          <a:p>
+            <a:endParaRPr lang="en-US" dirty="0" smtClean="0"/>
+          </a:p>
+          <a:p>
+            <a:endParaRPr lang="en-US" dirty="0"/>
+          </a:p>
+        </p:txBody>
+      </p:sp>
+      <p:sp>
+        <p:nvSpPr>
+          <p:cNvPr id="4" name="Title 3"/>
+          <p:cNvSpPr>
+            <a:spLocks noGrp="1"/>
+          </p:cNvSpPr>
+          <p:nvPr>
+            <p:ph type="title"/>
+          </p:nvPr>
+        </p:nvSpPr>
+        <p:spPr/>
+        <p:txBody>
+          <a:bodyPr/>
+          <a:lstStyle/>
+          <a:p>
+            <a:r>
+              <a:rPr lang="en-US" dirty="0" smtClean="0"/>
+              <a:t>APIs</a:t>
+            </a:r>
+            <a:endParaRPr lang="en-US" dirty="0"/>
+          </a:p>
+        </p:txBody>
+      </p:sp>
+    </p:spTree>
+    <p:extLst>
+      <p:ext uri="{BB962C8B-B14F-4D97-AF65-F5344CB8AC3E}">
+        <p14:creationId xmlns:p14="http://schemas.microsoft.com/office/powerpoint/2010/main" val="1132302561"/>
+      </p:ext>
+    </p:extLst>
+  </p:cSld>
+  <p:clrMapOvr>
+    <a:masterClrMapping/>
+  </p:clrMapOvr>
+  <p:transition>
+    <p:fade/>
+  </p:transition>
+</p:sld>
+</file>
+
+<file path=ppt/slides/slide22.xml><?xml version="1.0" encoding="utf-8"?>
+<p:sld xmlns:a="http://schemas.openxmlformats.org/drawingml/2006/main" xmlns:r="http://schemas.openxmlformats.org/officeDocument/2006/relationships" xmlns:p="http://schemas.openxmlformats.org/presentationml/2006/main">
+  <p:cSld>
+    <p:spTree>
+      <p:nvGrpSpPr>
+        <p:cNvPr id="1" name=""/>
+        <p:cNvGrpSpPr/>
+        <p:nvPr/>
+      </p:nvGrpSpPr>
+      <p:grpSpPr>
+        <a:xfrm>
+          <a:off x="0" y="0"/>
+          <a:ext cx="0" cy="0"/>
+          <a:chOff x="0" y="0"/>
+          <a:chExt cx="0" cy="0"/>
+        </a:xfrm>
+      </p:grpSpPr>
+      <p:sp>
+        <p:nvSpPr>
           <p:cNvPr id="2" name="Text Placeholder 1"/>
           <p:cNvSpPr>
             <a:spLocks noGrp="1"/>
@@ -21379,7 +22090,7 @@
 </p:sld>
 </file>
 
-<file path=ppt/slides/slide21.xml><?xml version="1.0" encoding="utf-8"?>
+<file path=ppt/slides/slide23.xml><?xml version="1.0" encoding="utf-8"?>
 <p:sld xmlns:a="http://schemas.openxmlformats.org/drawingml/2006/main" xmlns:r="http://schemas.openxmlformats.org/officeDocument/2006/relationships" xmlns:p="http://schemas.openxmlformats.org/presentationml/2006/main">
   <p:cSld>
     <p:spTree>
@@ -21436,13 +22147,8 @@
           <a:p>
             <a:r>
               <a:rPr lang="en-US" dirty="0" smtClean="0"/>
-              <a:t>Copying values (not equations</a:t>
-            </a:r>
-            <a:r>
-              <a:rPr lang="en-US" dirty="0" smtClean="0"/>
-              <a:t>)</a:t>
-            </a:r>
-            <a:endParaRPr lang="en-US" dirty="0" smtClean="0"/>
+              <a:t>Copying values (not equations)</a:t>
+            </a:r>
           </a:p>
           <a:p>
             <a:r>
@@ -21498,7 +22204,7 @@
 </p:sld>
 </file>
 
-<file path=ppt/slides/slide22.xml><?xml version="1.0" encoding="utf-8"?>
+<file path=ppt/slides/slide24.xml><?xml version="1.0" encoding="utf-8"?>
 <p:sld xmlns:a="http://schemas.openxmlformats.org/drawingml/2006/main" xmlns:r="http://schemas.openxmlformats.org/officeDocument/2006/relationships" xmlns:p="http://schemas.openxmlformats.org/presentationml/2006/main">
   <p:cSld>
     <p:spTree>
@@ -21540,7 +22246,15 @@
             </a:pPr>
             <a:r>
               <a:rPr lang="en-US" dirty="0" smtClean="0"/>
-              <a:t>=AVERAGE(A1:A12)</a:t>
+              <a:t>=</a:t>
+            </a:r>
+            <a:r>
+              <a:rPr lang="en-US" dirty="0" smtClean="0"/>
+              <a:t>AVERAGE(B1:B12</a:t>
+            </a:r>
+            <a:r>
+              <a:rPr lang="en-US" dirty="0" smtClean="0"/>
+              <a:t>)</a:t>
             </a:r>
           </a:p>
           <a:p>
@@ -21605,7 +22319,7 @@
 </p:sld>
 </file>
 
-<file path=ppt/slides/slide23.xml><?xml version="1.0" encoding="utf-8"?>
+<file path=ppt/slides/slide25.xml><?xml version="1.0" encoding="utf-8"?>
 <p:sld xmlns:a="http://schemas.openxmlformats.org/drawingml/2006/main" xmlns:r="http://schemas.openxmlformats.org/officeDocument/2006/relationships" xmlns:p="http://schemas.openxmlformats.org/presentationml/2006/main">
   <p:cSld>
     <p:spTree>
@@ -21802,7 +22516,7 @@
 </p:sld>
 </file>
 
-<file path=ppt/slides/slide24.xml><?xml version="1.0" encoding="utf-8"?>
+<file path=ppt/slides/slide26.xml><?xml version="1.0" encoding="utf-8"?>
 <p:sld xmlns:a="http://schemas.openxmlformats.org/drawingml/2006/main" xmlns:r="http://schemas.openxmlformats.org/officeDocument/2006/relationships" xmlns:p="http://schemas.openxmlformats.org/presentationml/2006/main">
   <p:cSld>
     <p:spTree>
@@ -21975,7 +22689,7 @@
 </p:sld>
 </file>
 
-<file path=ppt/slides/slide25.xml><?xml version="1.0" encoding="utf-8"?>
+<file path=ppt/slides/slide27.xml><?xml version="1.0" encoding="utf-8"?>
 <p:sld xmlns:a="http://schemas.openxmlformats.org/drawingml/2006/main" xmlns:r="http://schemas.openxmlformats.org/officeDocument/2006/relationships" xmlns:p="http://schemas.openxmlformats.org/presentationml/2006/main">
   <p:cSld>
     <p:spTree>
@@ -22032,7 +22746,15 @@
             </a:pPr>
             <a:r>
               <a:rPr lang="en-US" dirty="0" smtClean="0"/>
-              <a:t>=SUM(A1:A12)</a:t>
+              <a:t>=</a:t>
+            </a:r>
+            <a:r>
+              <a:rPr lang="en-US" dirty="0" smtClean="0"/>
+              <a:t>SUM(B1:B12</a:t>
+            </a:r>
+            <a:r>
+              <a:rPr lang="en-US" dirty="0" smtClean="0"/>
+              <a:t>)</a:t>
             </a:r>
             <a:endParaRPr lang="en-US" dirty="0"/>
           </a:p>
@@ -22092,7 +22814,7 @@
 </p:sld>
 </file>
 
-<file path=ppt/slides/slide26.xml><?xml version="1.0" encoding="utf-8"?>
+<file path=ppt/slides/slide28.xml><?xml version="1.0" encoding="utf-8"?>
 <p:sld xmlns:a="http://schemas.openxmlformats.org/drawingml/2006/main" xmlns:r="http://schemas.openxmlformats.org/officeDocument/2006/relationships" xmlns:p="http://schemas.openxmlformats.org/presentationml/2006/main">
   <p:cSld>
     <p:spTree>
@@ -22149,15 +22871,7 @@
             </a:pPr>
             <a:r>
               <a:rPr lang="en-US" sz="3600" dirty="0" smtClean="0"/>
-              <a:t>=(</a:t>
-            </a:r>
-            <a:r>
-              <a:rPr lang="en-US" sz="3600" dirty="0" smtClean="0"/>
-              <a:t>A3/A2)-</a:t>
-            </a:r>
-            <a:r>
-              <a:rPr lang="en-US" sz="3600" dirty="0" smtClean="0"/>
-              <a:t>1</a:t>
+              <a:t>=(A3/A2)-1</a:t>
             </a:r>
             <a:endParaRPr lang="en-US" sz="3600" dirty="0"/>
           </a:p>
@@ -22352,7 +23066,7 @@
 </p:sld>
 </file>
 
-<file path=ppt/slides/slide27.xml><?xml version="1.0" encoding="utf-8"?>
+<file path=ppt/slides/slide29.xml><?xml version="1.0" encoding="utf-8"?>
 <p:sld xmlns:a="http://schemas.openxmlformats.org/drawingml/2006/main" xmlns:r="http://schemas.openxmlformats.org/officeDocument/2006/relationships" xmlns:p="http://schemas.openxmlformats.org/presentationml/2006/main">
   <p:cSld>
     <p:spTree>
@@ -22472,263 +23186,6 @@
     <p:extLst>
       <p:ext uri="{BB962C8B-B14F-4D97-AF65-F5344CB8AC3E}">
         <p14:creationId xmlns:p14="http://schemas.microsoft.com/office/powerpoint/2010/main" val="2481230084"/>
-      </p:ext>
-    </p:extLst>
-  </p:cSld>
-  <p:clrMapOvr>
-    <a:masterClrMapping/>
-  </p:clrMapOvr>
-  <p:transition>
-    <p:fade/>
-  </p:transition>
-</p:sld>
-</file>
-
-<file path=ppt/slides/slide28.xml><?xml version="1.0" encoding="utf-8"?>
-<p:sld xmlns:a="http://schemas.openxmlformats.org/drawingml/2006/main" xmlns:r="http://schemas.openxmlformats.org/officeDocument/2006/relationships" xmlns:p="http://schemas.openxmlformats.org/presentationml/2006/main">
-  <p:cSld>
-    <p:spTree>
-      <p:nvGrpSpPr>
-        <p:cNvPr id="1" name=""/>
-        <p:cNvGrpSpPr/>
-        <p:nvPr/>
-      </p:nvGrpSpPr>
-      <p:grpSpPr>
-        <a:xfrm>
-          <a:off x="0" y="0"/>
-          <a:ext cx="0" cy="0"/>
-          <a:chOff x="0" y="0"/>
-          <a:chExt cx="0" cy="0"/>
-        </a:xfrm>
-      </p:grpSpPr>
-      <p:sp>
-        <p:nvSpPr>
-          <p:cNvPr id="5" name="Text Placeholder 4"/>
-          <p:cNvSpPr>
-            <a:spLocks noGrp="1"/>
-          </p:cNvSpPr>
-          <p:nvPr>
-            <p:ph type="body" sz="quarter" idx="10"/>
-          </p:nvPr>
-        </p:nvSpPr>
-        <p:spPr>
-          <a:xfrm>
-            <a:off x="274638" y="1212850"/>
-            <a:ext cx="7005410" cy="1292662"/>
-          </a:xfrm>
-        </p:spPr>
-        <p:txBody>
-          <a:bodyPr/>
-          <a:lstStyle/>
-          <a:p>
-            <a:pPr marL="0" indent="0">
-              <a:buNone/>
-            </a:pPr>
-            <a:r>
-              <a:rPr lang="en-US" dirty="0" smtClean="0"/>
-              <a:t>Copy-Paste data to swap rows/columns</a:t>
-            </a:r>
-            <a:endParaRPr lang="en-US" dirty="0"/>
-          </a:p>
-        </p:txBody>
-      </p:sp>
-      <p:sp>
-        <p:nvSpPr>
-          <p:cNvPr id="4" name="Title 3"/>
-          <p:cNvSpPr>
-            <a:spLocks noGrp="1"/>
-          </p:cNvSpPr>
-          <p:nvPr>
-            <p:ph type="title"/>
-          </p:nvPr>
-        </p:nvSpPr>
-        <p:spPr/>
-        <p:txBody>
-          <a:bodyPr/>
-          <a:lstStyle/>
-          <a:p>
-            <a:r>
-              <a:rPr lang="en-US" dirty="0" smtClean="0"/>
-              <a:t>Transposing Data</a:t>
-            </a:r>
-            <a:endParaRPr lang="en-US" dirty="0"/>
-          </a:p>
-        </p:txBody>
-      </p:sp>
-      <p:pic>
-        <p:nvPicPr>
-          <p:cNvPr id="2" name="Picture 1"/>
-          <p:cNvPicPr>
-            <a:picLocks noChangeAspect="1"/>
-          </p:cNvPicPr>
-          <p:nvPr/>
-        </p:nvPicPr>
-        <p:blipFill>
-          <a:blip r:embed="rId2"/>
-          <a:stretch>
-            <a:fillRect/>
-          </a:stretch>
-        </p:blipFill>
-        <p:spPr>
-          <a:xfrm>
-            <a:off x="7314885" y="1212849"/>
-            <a:ext cx="4814481" cy="2436813"/>
-          </a:xfrm>
-          <a:prstGeom prst="rect">
-            <a:avLst/>
-          </a:prstGeom>
-        </p:spPr>
-      </p:pic>
-    </p:spTree>
-    <p:extLst>
-      <p:ext uri="{BB962C8B-B14F-4D97-AF65-F5344CB8AC3E}">
-        <p14:creationId xmlns:p14="http://schemas.microsoft.com/office/powerpoint/2010/main" val="824994502"/>
-      </p:ext>
-    </p:extLst>
-  </p:cSld>
-  <p:clrMapOvr>
-    <a:masterClrMapping/>
-  </p:clrMapOvr>
-  <p:transition>
-    <p:fade/>
-  </p:transition>
-</p:sld>
-</file>
-
-<file path=ppt/slides/slide29.xml><?xml version="1.0" encoding="utf-8"?>
-<p:sld xmlns:a="http://schemas.openxmlformats.org/drawingml/2006/main" xmlns:r="http://schemas.openxmlformats.org/officeDocument/2006/relationships" xmlns:p="http://schemas.openxmlformats.org/presentationml/2006/main">
-  <p:cSld>
-    <p:spTree>
-      <p:nvGrpSpPr>
-        <p:cNvPr id="1" name=""/>
-        <p:cNvGrpSpPr/>
-        <p:nvPr/>
-      </p:nvGrpSpPr>
-      <p:grpSpPr>
-        <a:xfrm>
-          <a:off x="0" y="0"/>
-          <a:ext cx="0" cy="0"/>
-          <a:chOff x="0" y="0"/>
-          <a:chExt cx="0" cy="0"/>
-        </a:xfrm>
-      </p:grpSpPr>
-      <p:sp>
-        <p:nvSpPr>
-          <p:cNvPr id="5" name="Text Placeholder 4"/>
-          <p:cNvSpPr>
-            <a:spLocks noGrp="1"/>
-          </p:cNvSpPr>
-          <p:nvPr>
-            <p:ph type="body" sz="quarter" idx="10"/>
-          </p:nvPr>
-        </p:nvSpPr>
-        <p:spPr>
-          <a:xfrm>
-            <a:off x="274638" y="1212850"/>
-            <a:ext cx="6934199" cy="5232202"/>
-          </a:xfrm>
-        </p:spPr>
-        <p:txBody>
-          <a:bodyPr/>
-          <a:lstStyle/>
-          <a:p>
-            <a:pPr marL="0" indent="0">
-              <a:buNone/>
-            </a:pPr>
-            <a:r>
-              <a:rPr lang="en-US" dirty="0" smtClean="0"/>
-              <a:t>Strip out formulas from cells</a:t>
-            </a:r>
-          </a:p>
-          <a:p>
-            <a:pPr marL="0" indent="0">
-              <a:buNone/>
-            </a:pPr>
-            <a:endParaRPr lang="en-US" dirty="0"/>
-          </a:p>
-          <a:p>
-            <a:pPr marL="0" indent="0">
-              <a:buNone/>
-            </a:pPr>
-            <a:r>
-              <a:rPr lang="en-US" dirty="0" smtClean="0"/>
-              <a:t>Retain only the calculated values</a:t>
-            </a:r>
-          </a:p>
-          <a:p>
-            <a:pPr marL="0" indent="0">
-              <a:buNone/>
-            </a:pPr>
-            <a:endParaRPr lang="en-US" dirty="0"/>
-          </a:p>
-          <a:p>
-            <a:pPr marL="0" indent="0">
-              <a:buNone/>
-            </a:pPr>
-            <a:r>
-              <a:rPr lang="en-US" dirty="0" smtClean="0"/>
-              <a:t>Valuable for moving data from sheet to sheet</a:t>
-            </a:r>
-          </a:p>
-          <a:p>
-            <a:endParaRPr lang="en-US" dirty="0"/>
-          </a:p>
-        </p:txBody>
-      </p:sp>
-      <p:sp>
-        <p:nvSpPr>
-          <p:cNvPr id="4" name="Title 3"/>
-          <p:cNvSpPr>
-            <a:spLocks noGrp="1"/>
-          </p:cNvSpPr>
-          <p:nvPr>
-            <p:ph type="title"/>
-          </p:nvPr>
-        </p:nvSpPr>
-        <p:spPr/>
-        <p:txBody>
-          <a:bodyPr/>
-          <a:lstStyle/>
-          <a:p>
-            <a:r>
-              <a:rPr lang="en-US" dirty="0" smtClean="0"/>
-              <a:t>Copying Values </a:t>
-            </a:r>
-            <a:br>
-              <a:rPr lang="en-US" dirty="0" smtClean="0"/>
-            </a:br>
-            <a:endParaRPr lang="en-US" dirty="0"/>
-          </a:p>
-        </p:txBody>
-      </p:sp>
-      <p:pic>
-        <p:nvPicPr>
-          <p:cNvPr id="2" name="Picture 1"/>
-          <p:cNvPicPr>
-            <a:picLocks noChangeAspect="1"/>
-          </p:cNvPicPr>
-          <p:nvPr/>
-        </p:nvPicPr>
-        <p:blipFill>
-          <a:blip r:embed="rId2"/>
-          <a:stretch>
-            <a:fillRect/>
-          </a:stretch>
-        </p:blipFill>
-        <p:spPr>
-          <a:xfrm>
-            <a:off x="7303521" y="1212848"/>
-            <a:ext cx="4825845" cy="2436813"/>
-          </a:xfrm>
-          <a:prstGeom prst="rect">
-            <a:avLst/>
-          </a:prstGeom>
-        </p:spPr>
-      </p:pic>
-    </p:spTree>
-    <p:extLst>
-      <p:ext uri="{BB962C8B-B14F-4D97-AF65-F5344CB8AC3E}">
-        <p14:creationId xmlns:p14="http://schemas.microsoft.com/office/powerpoint/2010/main" val="2593738375"/>
       </p:ext>
     </p:extLst>
   </p:cSld>
@@ -22786,7 +23243,31 @@
                   </a:schemeClr>
                 </a:solidFill>
               </a:rPr>
-              <a:t>Excel is your new best friend</a:t>
+              <a:t>Finding the appropriate data</a:t>
+            </a:r>
+          </a:p>
+          <a:p>
+            <a:r>
+              <a:rPr lang="en-US" dirty="0" smtClean="0">
+                <a:solidFill>
+                  <a:schemeClr val="tx1">
+                    <a:lumMod val="75000"/>
+                  </a:schemeClr>
+                </a:solidFill>
+              </a:rPr>
+              <a:t>Organize / analyze your data</a:t>
+            </a:r>
+          </a:p>
+          <a:p>
+            <a:r>
+              <a:rPr lang="en-US" dirty="0" smtClean="0">
+                <a:solidFill>
+                  <a:schemeClr val="tx1">
+                    <a:lumMod val="75000"/>
+                  </a:schemeClr>
+                </a:solidFill>
+              </a:rPr>
+              <a:t>Basic charting</a:t>
             </a:r>
             <a:endParaRPr lang="en-US" dirty="0">
               <a:solidFill>
@@ -22832,7 +23313,7 @@
     </p:spTree>
     <p:extLst>
       <p:ext uri="{BB962C8B-B14F-4D97-AF65-F5344CB8AC3E}">
-        <p14:creationId xmlns:p14="http://schemas.microsoft.com/office/powerpoint/2010/main" val="1929999013"/>
+        <p14:creationId xmlns:p14="http://schemas.microsoft.com/office/powerpoint/2010/main" val="622632091"/>
       </p:ext>
     </p:extLst>
   </p:cSld>
@@ -22891,6 +23372,263 @@
         <p:spPr>
           <a:xfrm>
             <a:off x="274638" y="1212850"/>
+            <a:ext cx="7005410" cy="1292662"/>
+          </a:xfrm>
+        </p:spPr>
+        <p:txBody>
+          <a:bodyPr/>
+          <a:lstStyle/>
+          <a:p>
+            <a:pPr marL="0" indent="0">
+              <a:buNone/>
+            </a:pPr>
+            <a:r>
+              <a:rPr lang="en-US" dirty="0" smtClean="0"/>
+              <a:t>Copy-Paste data to swap rows/columns</a:t>
+            </a:r>
+            <a:endParaRPr lang="en-US" dirty="0"/>
+          </a:p>
+        </p:txBody>
+      </p:sp>
+      <p:sp>
+        <p:nvSpPr>
+          <p:cNvPr id="4" name="Title 3"/>
+          <p:cNvSpPr>
+            <a:spLocks noGrp="1"/>
+          </p:cNvSpPr>
+          <p:nvPr>
+            <p:ph type="title"/>
+          </p:nvPr>
+        </p:nvSpPr>
+        <p:spPr/>
+        <p:txBody>
+          <a:bodyPr/>
+          <a:lstStyle/>
+          <a:p>
+            <a:r>
+              <a:rPr lang="en-US" dirty="0" smtClean="0"/>
+              <a:t>Transposing Data</a:t>
+            </a:r>
+            <a:endParaRPr lang="en-US" dirty="0"/>
+          </a:p>
+        </p:txBody>
+      </p:sp>
+      <p:pic>
+        <p:nvPicPr>
+          <p:cNvPr id="2" name="Picture 1"/>
+          <p:cNvPicPr>
+            <a:picLocks noChangeAspect="1"/>
+          </p:cNvPicPr>
+          <p:nvPr/>
+        </p:nvPicPr>
+        <p:blipFill>
+          <a:blip r:embed="rId2"/>
+          <a:stretch>
+            <a:fillRect/>
+          </a:stretch>
+        </p:blipFill>
+        <p:spPr>
+          <a:xfrm>
+            <a:off x="7314885" y="1212849"/>
+            <a:ext cx="4814481" cy="2436813"/>
+          </a:xfrm>
+          <a:prstGeom prst="rect">
+            <a:avLst/>
+          </a:prstGeom>
+        </p:spPr>
+      </p:pic>
+    </p:spTree>
+    <p:extLst>
+      <p:ext uri="{BB962C8B-B14F-4D97-AF65-F5344CB8AC3E}">
+        <p14:creationId xmlns:p14="http://schemas.microsoft.com/office/powerpoint/2010/main" val="824994502"/>
+      </p:ext>
+    </p:extLst>
+  </p:cSld>
+  <p:clrMapOvr>
+    <a:masterClrMapping/>
+  </p:clrMapOvr>
+  <p:transition>
+    <p:fade/>
+  </p:transition>
+</p:sld>
+</file>
+
+<file path=ppt/slides/slide31.xml><?xml version="1.0" encoding="utf-8"?>
+<p:sld xmlns:a="http://schemas.openxmlformats.org/drawingml/2006/main" xmlns:r="http://schemas.openxmlformats.org/officeDocument/2006/relationships" xmlns:p="http://schemas.openxmlformats.org/presentationml/2006/main">
+  <p:cSld>
+    <p:spTree>
+      <p:nvGrpSpPr>
+        <p:cNvPr id="1" name=""/>
+        <p:cNvGrpSpPr/>
+        <p:nvPr/>
+      </p:nvGrpSpPr>
+      <p:grpSpPr>
+        <a:xfrm>
+          <a:off x="0" y="0"/>
+          <a:ext cx="0" cy="0"/>
+          <a:chOff x="0" y="0"/>
+          <a:chExt cx="0" cy="0"/>
+        </a:xfrm>
+      </p:grpSpPr>
+      <p:sp>
+        <p:nvSpPr>
+          <p:cNvPr id="5" name="Text Placeholder 4"/>
+          <p:cNvSpPr>
+            <a:spLocks noGrp="1"/>
+          </p:cNvSpPr>
+          <p:nvPr>
+            <p:ph type="body" sz="quarter" idx="10"/>
+          </p:nvPr>
+        </p:nvSpPr>
+        <p:spPr>
+          <a:xfrm>
+            <a:off x="274638" y="1212850"/>
+            <a:ext cx="6934199" cy="5232202"/>
+          </a:xfrm>
+        </p:spPr>
+        <p:txBody>
+          <a:bodyPr/>
+          <a:lstStyle/>
+          <a:p>
+            <a:pPr marL="0" indent="0">
+              <a:buNone/>
+            </a:pPr>
+            <a:r>
+              <a:rPr lang="en-US" dirty="0" smtClean="0"/>
+              <a:t>Strip out formulas from cells</a:t>
+            </a:r>
+          </a:p>
+          <a:p>
+            <a:pPr marL="0" indent="0">
+              <a:buNone/>
+            </a:pPr>
+            <a:endParaRPr lang="en-US" dirty="0"/>
+          </a:p>
+          <a:p>
+            <a:pPr marL="0" indent="0">
+              <a:buNone/>
+            </a:pPr>
+            <a:r>
+              <a:rPr lang="en-US" dirty="0" smtClean="0"/>
+              <a:t>Retain only the calculated values</a:t>
+            </a:r>
+          </a:p>
+          <a:p>
+            <a:pPr marL="0" indent="0">
+              <a:buNone/>
+            </a:pPr>
+            <a:endParaRPr lang="en-US" dirty="0"/>
+          </a:p>
+          <a:p>
+            <a:pPr marL="0" indent="0">
+              <a:buNone/>
+            </a:pPr>
+            <a:r>
+              <a:rPr lang="en-US" dirty="0" smtClean="0"/>
+              <a:t>Valuable for moving data from sheet to sheet</a:t>
+            </a:r>
+          </a:p>
+          <a:p>
+            <a:endParaRPr lang="en-US" dirty="0"/>
+          </a:p>
+        </p:txBody>
+      </p:sp>
+      <p:sp>
+        <p:nvSpPr>
+          <p:cNvPr id="4" name="Title 3"/>
+          <p:cNvSpPr>
+            <a:spLocks noGrp="1"/>
+          </p:cNvSpPr>
+          <p:nvPr>
+            <p:ph type="title"/>
+          </p:nvPr>
+        </p:nvSpPr>
+        <p:spPr/>
+        <p:txBody>
+          <a:bodyPr/>
+          <a:lstStyle/>
+          <a:p>
+            <a:r>
+              <a:rPr lang="en-US" dirty="0" smtClean="0"/>
+              <a:t>Copying Values </a:t>
+            </a:r>
+            <a:br>
+              <a:rPr lang="en-US" dirty="0" smtClean="0"/>
+            </a:br>
+            <a:endParaRPr lang="en-US" dirty="0"/>
+          </a:p>
+        </p:txBody>
+      </p:sp>
+      <p:pic>
+        <p:nvPicPr>
+          <p:cNvPr id="2" name="Picture 1"/>
+          <p:cNvPicPr>
+            <a:picLocks noChangeAspect="1"/>
+          </p:cNvPicPr>
+          <p:nvPr/>
+        </p:nvPicPr>
+        <p:blipFill>
+          <a:blip r:embed="rId2"/>
+          <a:stretch>
+            <a:fillRect/>
+          </a:stretch>
+        </p:blipFill>
+        <p:spPr>
+          <a:xfrm>
+            <a:off x="7303521" y="1212848"/>
+            <a:ext cx="4825845" cy="2436813"/>
+          </a:xfrm>
+          <a:prstGeom prst="rect">
+            <a:avLst/>
+          </a:prstGeom>
+        </p:spPr>
+      </p:pic>
+    </p:spTree>
+    <p:extLst>
+      <p:ext uri="{BB962C8B-B14F-4D97-AF65-F5344CB8AC3E}">
+        <p14:creationId xmlns:p14="http://schemas.microsoft.com/office/powerpoint/2010/main" val="2593738375"/>
+      </p:ext>
+    </p:extLst>
+  </p:cSld>
+  <p:clrMapOvr>
+    <a:masterClrMapping/>
+  </p:clrMapOvr>
+  <p:transition>
+    <p:fade/>
+  </p:transition>
+</p:sld>
+</file>
+
+<file path=ppt/slides/slide32.xml><?xml version="1.0" encoding="utf-8"?>
+<p:sld xmlns:a="http://schemas.openxmlformats.org/drawingml/2006/main" xmlns:r="http://schemas.openxmlformats.org/officeDocument/2006/relationships" xmlns:p="http://schemas.openxmlformats.org/presentationml/2006/main">
+  <p:cSld>
+    <p:spTree>
+      <p:nvGrpSpPr>
+        <p:cNvPr id="1" name=""/>
+        <p:cNvGrpSpPr/>
+        <p:nvPr/>
+      </p:nvGrpSpPr>
+      <p:grpSpPr>
+        <a:xfrm>
+          <a:off x="0" y="0"/>
+          <a:ext cx="0" cy="0"/>
+          <a:chOff x="0" y="0"/>
+          <a:chExt cx="0" cy="0"/>
+        </a:xfrm>
+      </p:grpSpPr>
+      <p:sp>
+        <p:nvSpPr>
+          <p:cNvPr id="5" name="Text Placeholder 4"/>
+          <p:cNvSpPr>
+            <a:spLocks noGrp="1"/>
+          </p:cNvSpPr>
+          <p:nvPr>
+            <p:ph type="body" sz="quarter" idx="10"/>
+          </p:nvPr>
+        </p:nvSpPr>
+        <p:spPr>
+          <a:xfrm>
+            <a:off x="274638" y="1212850"/>
             <a:ext cx="11887200" cy="3447098"/>
           </a:xfrm>
         </p:spPr>
@@ -23004,7 +23742,7 @@
 </p:sld>
 </file>
 
-<file path=ppt/slides/slide31.xml><?xml version="1.0" encoding="utf-8"?>
+<file path=ppt/slides/slide33.xml><?xml version="1.0" encoding="utf-8"?>
 <p:sld xmlns:a="http://schemas.openxmlformats.org/drawingml/2006/main" xmlns:r="http://schemas.openxmlformats.org/officeDocument/2006/relationships" xmlns:p="http://schemas.openxmlformats.org/presentationml/2006/main">
   <p:cSld>
     <p:spTree>
@@ -23117,7 +23855,7 @@
 </p:sld>
 </file>
 
-<file path=ppt/slides/slide32.xml><?xml version="1.0" encoding="utf-8"?>
+<file path=ppt/slides/slide34.xml><?xml version="1.0" encoding="utf-8"?>
 <p:sld xmlns:a="http://schemas.openxmlformats.org/drawingml/2006/main" xmlns:r="http://schemas.openxmlformats.org/officeDocument/2006/relationships" xmlns:p="http://schemas.openxmlformats.org/presentationml/2006/main">
   <p:cSld>
     <p:spTree>
@@ -23230,7 +23968,7 @@
 </p:sld>
 </file>
 
-<file path=ppt/slides/slide33.xml><?xml version="1.0" encoding="utf-8"?>
+<file path=ppt/slides/slide35.xml><?xml version="1.0" encoding="utf-8"?>
 <p:sld xmlns:a="http://schemas.openxmlformats.org/drawingml/2006/main" xmlns:r="http://schemas.openxmlformats.org/officeDocument/2006/relationships" xmlns:p="http://schemas.openxmlformats.org/presentationml/2006/main">
   <p:cSld>
     <p:spTree>
@@ -23335,7 +24073,7 @@
 </p:sld>
 </file>
 
-<file path=ppt/slides/slide34.xml><?xml version="1.0" encoding="utf-8"?>
+<file path=ppt/slides/slide36.xml><?xml version="1.0" encoding="utf-8"?>
 <p:sld xmlns:a="http://schemas.openxmlformats.org/drawingml/2006/main" xmlns:r="http://schemas.openxmlformats.org/officeDocument/2006/relationships" xmlns:p="http://schemas.openxmlformats.org/presentationml/2006/main">
   <p:cSld>
     <p:spTree>
@@ -23476,7 +24214,7 @@
 </p:sld>
 </file>
 
-<file path=ppt/slides/slide35.xml><?xml version="1.0" encoding="utf-8"?>
+<file path=ppt/slides/slide37.xml><?xml version="1.0" encoding="utf-8"?>
 <p:sld xmlns:a="http://schemas.openxmlformats.org/drawingml/2006/main" xmlns:r="http://schemas.openxmlformats.org/officeDocument/2006/relationships" xmlns:p="http://schemas.openxmlformats.org/presentationml/2006/main">
   <p:cSld>
     <p:spTree>
@@ -23506,7 +24244,7 @@
         <p:spPr>
           <a:xfrm>
             <a:off x="274638" y="1212850"/>
-            <a:ext cx="4642419" cy="3323987"/>
+            <a:ext cx="4642419" cy="1292662"/>
           </a:xfrm>
         </p:spPr>
         <p:txBody>
@@ -23518,32 +24256,9 @@
             </a:pPr>
             <a:r>
               <a:rPr lang="en-US" dirty="0" smtClean="0"/>
-              <a:t>Values stack on</a:t>
-            </a:r>
-          </a:p>
-          <a:p>
-            <a:pPr marL="0" indent="0">
-              <a:buNone/>
-            </a:pPr>
-            <a:r>
-              <a:rPr lang="en-US" dirty="0" smtClean="0"/>
-              <a:t>each other</a:t>
-            </a:r>
-          </a:p>
-          <a:p>
-            <a:pPr marL="0" indent="0">
-              <a:buNone/>
-            </a:pPr>
-            <a:endParaRPr lang="en-US" dirty="0"/>
-          </a:p>
-          <a:p>
-            <a:pPr marL="0" indent="0">
-              <a:buNone/>
-            </a:pPr>
-            <a:r>
-              <a:rPr lang="en-US" dirty="0" smtClean="0"/>
-              <a:t>Used to show all parts of a sum</a:t>
-            </a:r>
+              <a:t>Height or length to show scale</a:t>
+            </a:r>
+            <a:endParaRPr lang="en-US" dirty="0" smtClean="0"/>
           </a:p>
         </p:txBody>
       </p:sp>
@@ -23610,7 +24325,7 @@
 </p:sld>
 </file>
 
-<file path=ppt/slides/slide36.xml><?xml version="1.0" encoding="utf-8"?>
+<file path=ppt/slides/slide38.xml><?xml version="1.0" encoding="utf-8"?>
 <p:sld xmlns:a="http://schemas.openxmlformats.org/drawingml/2006/main" xmlns:r="http://schemas.openxmlformats.org/officeDocument/2006/relationships" xmlns:p="http://schemas.openxmlformats.org/presentationml/2006/main">
   <p:cSld>
     <p:spTree>
@@ -23744,7 +24459,7 @@
 </p:sld>
 </file>
 
-<file path=ppt/slides/slide37.xml><?xml version="1.0" encoding="utf-8"?>
+<file path=ppt/slides/slide39.xml><?xml version="1.0" encoding="utf-8"?>
 <p:sld xmlns:a="http://schemas.openxmlformats.org/drawingml/2006/main" xmlns:r="http://schemas.openxmlformats.org/officeDocument/2006/relationships" xmlns:p="http://schemas.openxmlformats.org/presentationml/2006/main">
   <p:cSld>
     <p:spTree>
@@ -23869,7 +24584,127 @@
 </p:sld>
 </file>
 
-<file path=ppt/slides/slide38.xml><?xml version="1.0" encoding="utf-8"?>
+<file path=ppt/slides/slide4.xml><?xml version="1.0" encoding="utf-8"?>
+<p:sld xmlns:a="http://schemas.openxmlformats.org/drawingml/2006/main" xmlns:r="http://schemas.openxmlformats.org/officeDocument/2006/relationships" xmlns:p="http://schemas.openxmlformats.org/presentationml/2006/main">
+  <p:cSld>
+    <p:spTree>
+      <p:nvGrpSpPr>
+        <p:cNvPr id="1" name=""/>
+        <p:cNvGrpSpPr/>
+        <p:nvPr/>
+      </p:nvGrpSpPr>
+      <p:grpSpPr>
+        <a:xfrm>
+          <a:off x="0" y="0"/>
+          <a:ext cx="0" cy="0"/>
+          <a:chOff x="0" y="0"/>
+          <a:chExt cx="0" cy="0"/>
+        </a:xfrm>
+      </p:grpSpPr>
+      <p:sp>
+        <p:nvSpPr>
+          <p:cNvPr id="2" name="Text Placeholder 1"/>
+          <p:cNvSpPr>
+            <a:spLocks noGrp="1"/>
+          </p:cNvSpPr>
+          <p:nvPr>
+            <p:ph type="body" sz="quarter" idx="15"/>
+          </p:nvPr>
+        </p:nvSpPr>
+        <p:spPr>
+          <a:xfrm>
+            <a:off x="4846638" y="1592262"/>
+            <a:ext cx="7315203" cy="3657600"/>
+          </a:xfrm>
+        </p:spPr>
+        <p:txBody>
+          <a:bodyPr/>
+          <a:lstStyle/>
+          <a:p>
+            <a:r>
+              <a:rPr lang="en-US" dirty="0" smtClean="0">
+                <a:solidFill>
+                  <a:schemeClr val="tx1">
+                    <a:lumMod val="75000"/>
+                  </a:schemeClr>
+                </a:solidFill>
+              </a:rPr>
+              <a:t>Excel is your new best friend</a:t>
+            </a:r>
+            <a:endParaRPr lang="en-US" dirty="0">
+              <a:solidFill>
+                <a:schemeClr val="tx1">
+                  <a:lumMod val="75000"/>
+                </a:schemeClr>
+              </a:solidFill>
+            </a:endParaRPr>
+          </a:p>
+        </p:txBody>
+      </p:sp>
+      <p:sp>
+        <p:nvSpPr>
+          <p:cNvPr id="5" name="Title 4"/>
+          <p:cNvSpPr>
+            <a:spLocks noGrp="1"/>
+          </p:cNvSpPr>
+          <p:nvPr>
+            <p:ph type="ctrTitle"/>
+          </p:nvPr>
+        </p:nvSpPr>
+        <p:spPr/>
+        <p:txBody>
+          <a:bodyPr/>
+          <a:lstStyle/>
+          <a:p>
+            <a:r>
+              <a:rPr lang="en-US" dirty="0" smtClean="0">
+                <a:latin typeface="+mn-lt"/>
+                <a:ea typeface="Segoe UI Black" panose="020B0A02040204020203" pitchFamily="34" charset="0"/>
+                <a:cs typeface="Segoe UI Black" panose="020B0A02040204020203" pitchFamily="34" charset="0"/>
+              </a:rPr>
+              <a:t>  Agenda</a:t>
+            </a:r>
+            <a:endParaRPr lang="en-US" dirty="0">
+              <a:latin typeface="+mn-lt"/>
+              <a:ea typeface="Segoe UI Black" panose="020B0A02040204020203" pitchFamily="34" charset="0"/>
+              <a:cs typeface="Segoe UI Black" panose="020B0A02040204020203" pitchFamily="34" charset="0"/>
+            </a:endParaRPr>
+          </a:p>
+        </p:txBody>
+      </p:sp>
+    </p:spTree>
+    <p:extLst>
+      <p:ext uri="{BB962C8B-B14F-4D97-AF65-F5344CB8AC3E}">
+        <p14:creationId xmlns:p14="http://schemas.microsoft.com/office/powerpoint/2010/main" val="1929999013"/>
+      </p:ext>
+    </p:extLst>
+  </p:cSld>
+  <p:clrMapOvr>
+    <a:masterClrMapping/>
+  </p:clrMapOvr>
+  <mc:AlternateContent xmlns:mc="http://schemas.openxmlformats.org/markup-compatibility/2006" xmlns:p14="http://schemas.microsoft.com/office/powerpoint/2010/main">
+    <mc:Choice Requires="p14">
+      <p:transition spd="med" p14:dur="700">
+        <p:fade/>
+      </p:transition>
+    </mc:Choice>
+    <mc:Fallback xmlns="">
+      <p:transition spd="med">
+        <p:fade/>
+      </p:transition>
+    </mc:Fallback>
+  </mc:AlternateContent>
+  <p:timing>
+    <p:tnLst>
+      <p:par>
+        <p:cTn id="1" dur="indefinite" restart="never" nodeType="tmRoot"/>
+      </p:par>
+    </p:tnLst>
+  </p:timing>
+</p:sld>
+</file>
+
+<file path=ppt/slides/slide40.xml><?xml version="1.0" encoding="utf-8"?>
 <p:sld xmlns:a="http://schemas.openxmlformats.org/drawingml/2006/main" xmlns:r="http://schemas.openxmlformats.org/officeDocument/2006/relationships" xmlns:p="http://schemas.openxmlformats.org/presentationml/2006/main">
   <p:cSld>
     <p:spTree>
@@ -24010,7 +24845,7 @@
 </p:sld>
 </file>
 
-<file path=ppt/slides/slide39.xml><?xml version="1.0" encoding="utf-8"?>
+<file path=ppt/slides/slide41.xml><?xml version="1.0" encoding="utf-8"?>
 <p:sld xmlns:a="http://schemas.openxmlformats.org/drawingml/2006/main" xmlns:r="http://schemas.openxmlformats.org/officeDocument/2006/relationships" xmlns:p="http://schemas.openxmlformats.org/presentationml/2006/main">
   <p:cSld>
     <p:spTree>
@@ -24027,8 +24862,8 @@
           <a:chExt cx="0" cy="0"/>
         </a:xfrm>
       </p:grpSpPr>
-      <mc:AlternateContent xmlns:mc="http://schemas.openxmlformats.org/markup-compatibility/2006">
-        <mc:Choice xmlns:a14="http://schemas.microsoft.com/office/drawing/2010/main" Requires="a14">
+      <mc:AlternateContent xmlns:mc="http://schemas.openxmlformats.org/markup-compatibility/2006" xmlns:a14="http://schemas.microsoft.com/office/drawing/2010/main">
+        <mc:Choice Requires="a14">
           <p:sp>
             <p:nvSpPr>
               <p:cNvPr id="5" name="Text Placeholder 4"/>
@@ -24117,18 +24952,14 @@
                 </a:r>
                 <a:r>
                   <a:rPr lang="en-US" smtClean="0"/>
-                  <a:t>of </a:t>
-                </a:r>
-                <a:r>
-                  <a:rPr lang="en-US" smtClean="0"/>
-                  <a:t>determination</a:t>
+                  <a:t>of determination</a:t>
                 </a:r>
                 <a:endParaRPr lang="en-US" dirty="0"/>
               </a:p>
             </p:txBody>
           </p:sp>
         </mc:Choice>
-        <mc:Fallback>
+        <mc:Fallback xmlns="">
           <p:sp>
             <p:nvSpPr>
               <p:cNvPr id="5" name="Text Placeholder 4"/>
@@ -24229,7 +25060,148 @@
 </p:sld>
 </file>
 
-<file path=ppt/slides/slide4.xml><?xml version="1.0" encoding="utf-8"?>
+<file path=ppt/slides/slide42.xml><?xml version="1.0" encoding="utf-8"?>
+<p:sld xmlns:a="http://schemas.openxmlformats.org/drawingml/2006/main" xmlns:r="http://schemas.openxmlformats.org/officeDocument/2006/relationships" xmlns:p="http://schemas.openxmlformats.org/presentationml/2006/main">
+  <p:cSld>
+    <p:spTree>
+      <p:nvGrpSpPr>
+        <p:cNvPr id="1" name=""/>
+        <p:cNvGrpSpPr/>
+        <p:nvPr/>
+      </p:nvGrpSpPr>
+      <p:grpSpPr>
+        <a:xfrm>
+          <a:off x="0" y="0"/>
+          <a:ext cx="0" cy="0"/>
+          <a:chOff x="0" y="0"/>
+          <a:chExt cx="0" cy="0"/>
+        </a:xfrm>
+      </p:grpSpPr>
+      <p:sp>
+        <p:nvSpPr>
+          <p:cNvPr id="2" name="Text Placeholder 1"/>
+          <p:cNvSpPr>
+            <a:spLocks noGrp="1"/>
+          </p:cNvSpPr>
+          <p:nvPr>
+            <p:ph type="body" sz="quarter" idx="15"/>
+          </p:nvPr>
+        </p:nvSpPr>
+        <p:spPr>
+          <a:xfrm>
+            <a:off x="4846638" y="2049462"/>
+            <a:ext cx="7315203" cy="2819400"/>
+          </a:xfrm>
+        </p:spPr>
+        <p:txBody>
+          <a:bodyPr/>
+          <a:lstStyle/>
+          <a:p>
+            <a:r>
+              <a:rPr lang="en-US" dirty="0" smtClean="0">
+                <a:solidFill>
+                  <a:schemeClr val="tx1">
+                    <a:lumMod val="75000"/>
+                  </a:schemeClr>
+                </a:solidFill>
+              </a:rPr>
+              <a:t>Pull jobs data from BLS</a:t>
+            </a:r>
+          </a:p>
+          <a:p>
+            <a:r>
+              <a:rPr lang="en-US" dirty="0" smtClean="0">
+                <a:solidFill>
+                  <a:schemeClr val="tx1">
+                    <a:lumMod val="75000"/>
+                  </a:schemeClr>
+                </a:solidFill>
+              </a:rPr>
+              <a:t>Organize multi-sheet data set</a:t>
+            </a:r>
+          </a:p>
+          <a:p>
+            <a:r>
+              <a:rPr lang="en-US" dirty="0" smtClean="0">
+                <a:solidFill>
+                  <a:schemeClr val="tx1">
+                    <a:lumMod val="75000"/>
+                  </a:schemeClr>
+                </a:solidFill>
+              </a:rPr>
+              <a:t>Visualize within Excel</a:t>
+            </a:r>
+          </a:p>
+          <a:p>
+            <a:r>
+              <a:rPr lang="en-US" dirty="0" smtClean="0">
+                <a:solidFill>
+                  <a:schemeClr val="tx1">
+                    <a:lumMod val="75000"/>
+                  </a:schemeClr>
+                </a:solidFill>
+              </a:rPr>
+              <a:t>Relative vs. Absolute differences</a:t>
+            </a:r>
+          </a:p>
+        </p:txBody>
+      </p:sp>
+      <p:sp>
+        <p:nvSpPr>
+          <p:cNvPr id="5" name="Title 4"/>
+          <p:cNvSpPr>
+            <a:spLocks noGrp="1"/>
+          </p:cNvSpPr>
+          <p:nvPr>
+            <p:ph type="ctrTitle"/>
+          </p:nvPr>
+        </p:nvSpPr>
+        <p:spPr/>
+        <p:txBody>
+          <a:bodyPr/>
+          <a:lstStyle/>
+          <a:p>
+            <a:r>
+              <a:rPr lang="en-US" dirty="0" smtClean="0"/>
+              <a:t>Lab 2</a:t>
+            </a:r>
+            <a:endParaRPr lang="en-US" dirty="0"/>
+          </a:p>
+        </p:txBody>
+      </p:sp>
+    </p:spTree>
+    <p:extLst>
+      <p:ext uri="{BB962C8B-B14F-4D97-AF65-F5344CB8AC3E}">
+        <p14:creationId xmlns:p14="http://schemas.microsoft.com/office/powerpoint/2010/main" val="2930289399"/>
+      </p:ext>
+    </p:extLst>
+  </p:cSld>
+  <p:clrMapOvr>
+    <a:masterClrMapping/>
+  </p:clrMapOvr>
+  <mc:AlternateContent xmlns:mc="http://schemas.openxmlformats.org/markup-compatibility/2006" xmlns:p14="http://schemas.microsoft.com/office/powerpoint/2010/main">
+    <mc:Choice Requires="p14">
+      <p:transition spd="med" p14:dur="700">
+        <p:fade/>
+      </p:transition>
+    </mc:Choice>
+    <mc:Fallback xmlns="">
+      <p:transition spd="med">
+        <p:fade/>
+      </p:transition>
+    </mc:Fallback>
+  </mc:AlternateContent>
+  <p:timing>
+    <p:tnLst>
+      <p:par>
+        <p:cTn id="1" dur="indefinite" restart="never" nodeType="tmRoot"/>
+      </p:par>
+    </p:tnLst>
+  </p:timing>
+</p:sld>
+</file>
+
+<file path=ppt/slides/slide5.xml><?xml version="1.0" encoding="utf-8"?>
 <p:sld xmlns:a="http://schemas.openxmlformats.org/drawingml/2006/main" xmlns:r="http://schemas.openxmlformats.org/officeDocument/2006/relationships" xmlns:p="http://schemas.openxmlformats.org/presentationml/2006/main">
   <p:cSld>
     <p:spTree>
@@ -24309,7 +25281,17 @@
           <a:p>
             <a:r>
               <a:rPr lang="en-US" dirty="0" smtClean="0"/>
-              <a:t>Specific data, limited to a topic</a:t>
+              <a:t>Specific data, limited to a </a:t>
+            </a:r>
+            <a:r>
+              <a:rPr lang="en-US" dirty="0" smtClean="0"/>
+              <a:t>topic</a:t>
+            </a:r>
+          </a:p>
+          <a:p>
+            <a:r>
+              <a:rPr lang="en-US" dirty="0" smtClean="0"/>
+              <a:t>Talk about Pew, </a:t>
             </a:r>
             <a:endParaRPr lang="en-US" dirty="0">
               <a:hlinkClick r:id="rId2"/>
@@ -24471,148 +25453,7 @@
 </p:sld>
 </file>
 
-<file path=ppt/slides/slide40.xml><?xml version="1.0" encoding="utf-8"?>
-<p:sld xmlns:a="http://schemas.openxmlformats.org/drawingml/2006/main" xmlns:r="http://schemas.openxmlformats.org/officeDocument/2006/relationships" xmlns:p="http://schemas.openxmlformats.org/presentationml/2006/main">
-  <p:cSld>
-    <p:spTree>
-      <p:nvGrpSpPr>
-        <p:cNvPr id="1" name=""/>
-        <p:cNvGrpSpPr/>
-        <p:nvPr/>
-      </p:nvGrpSpPr>
-      <p:grpSpPr>
-        <a:xfrm>
-          <a:off x="0" y="0"/>
-          <a:ext cx="0" cy="0"/>
-          <a:chOff x="0" y="0"/>
-          <a:chExt cx="0" cy="0"/>
-        </a:xfrm>
-      </p:grpSpPr>
-      <p:sp>
-        <p:nvSpPr>
-          <p:cNvPr id="2" name="Text Placeholder 1"/>
-          <p:cNvSpPr>
-            <a:spLocks noGrp="1"/>
-          </p:cNvSpPr>
-          <p:nvPr>
-            <p:ph type="body" sz="quarter" idx="15"/>
-          </p:nvPr>
-        </p:nvSpPr>
-        <p:spPr>
-          <a:xfrm>
-            <a:off x="4846638" y="2049462"/>
-            <a:ext cx="7315203" cy="2819400"/>
-          </a:xfrm>
-        </p:spPr>
-        <p:txBody>
-          <a:bodyPr/>
-          <a:lstStyle/>
-          <a:p>
-            <a:r>
-              <a:rPr lang="en-US" dirty="0" smtClean="0">
-                <a:solidFill>
-                  <a:schemeClr val="tx1">
-                    <a:lumMod val="75000"/>
-                  </a:schemeClr>
-                </a:solidFill>
-              </a:rPr>
-              <a:t>Pull jobs data from BLS</a:t>
-            </a:r>
-          </a:p>
-          <a:p>
-            <a:r>
-              <a:rPr lang="en-US" dirty="0" smtClean="0">
-                <a:solidFill>
-                  <a:schemeClr val="tx1">
-                    <a:lumMod val="75000"/>
-                  </a:schemeClr>
-                </a:solidFill>
-              </a:rPr>
-              <a:t>Organize multi-sheet data set</a:t>
-            </a:r>
-          </a:p>
-          <a:p>
-            <a:r>
-              <a:rPr lang="en-US" dirty="0" smtClean="0">
-                <a:solidFill>
-                  <a:schemeClr val="tx1">
-                    <a:lumMod val="75000"/>
-                  </a:schemeClr>
-                </a:solidFill>
-              </a:rPr>
-              <a:t>Visualize within Excel</a:t>
-            </a:r>
-          </a:p>
-          <a:p>
-            <a:r>
-              <a:rPr lang="en-US" dirty="0" smtClean="0">
-                <a:solidFill>
-                  <a:schemeClr val="tx1">
-                    <a:lumMod val="75000"/>
-                  </a:schemeClr>
-                </a:solidFill>
-              </a:rPr>
-              <a:t>Relative vs. Absolute differences</a:t>
-            </a:r>
-          </a:p>
-        </p:txBody>
-      </p:sp>
-      <p:sp>
-        <p:nvSpPr>
-          <p:cNvPr id="5" name="Title 4"/>
-          <p:cNvSpPr>
-            <a:spLocks noGrp="1"/>
-          </p:cNvSpPr>
-          <p:nvPr>
-            <p:ph type="ctrTitle"/>
-          </p:nvPr>
-        </p:nvSpPr>
-        <p:spPr/>
-        <p:txBody>
-          <a:bodyPr/>
-          <a:lstStyle/>
-          <a:p>
-            <a:r>
-              <a:rPr lang="en-US" dirty="0" smtClean="0"/>
-              <a:t>Lab 2</a:t>
-            </a:r>
-            <a:endParaRPr lang="en-US" dirty="0"/>
-          </a:p>
-        </p:txBody>
-      </p:sp>
-    </p:spTree>
-    <p:extLst>
-      <p:ext uri="{BB962C8B-B14F-4D97-AF65-F5344CB8AC3E}">
-        <p14:creationId xmlns:p14="http://schemas.microsoft.com/office/powerpoint/2010/main" val="2930289399"/>
-      </p:ext>
-    </p:extLst>
-  </p:cSld>
-  <p:clrMapOvr>
-    <a:masterClrMapping/>
-  </p:clrMapOvr>
-  <mc:AlternateContent xmlns:mc="http://schemas.openxmlformats.org/markup-compatibility/2006" xmlns:p14="http://schemas.microsoft.com/office/powerpoint/2010/main">
-    <mc:Choice Requires="p14">
-      <p:transition spd="med" p14:dur="700">
-        <p:fade/>
-      </p:transition>
-    </mc:Choice>
-    <mc:Fallback xmlns="">
-      <p:transition spd="med">
-        <p:fade/>
-      </p:transition>
-    </mc:Fallback>
-  </mc:AlternateContent>
-  <p:timing>
-    <p:tnLst>
-      <p:par>
-        <p:cTn id="1" dur="indefinite" restart="never" nodeType="tmRoot"/>
-      </p:par>
-    </p:tnLst>
-  </p:timing>
-</p:sld>
-</file>
-
-<file path=ppt/slides/slide5.xml><?xml version="1.0" encoding="utf-8"?>
+<file path=ppt/slides/slide6.xml><?xml version="1.0" encoding="utf-8"?>
 <p:sld xmlns:a="http://schemas.openxmlformats.org/drawingml/2006/main" xmlns:r="http://schemas.openxmlformats.org/officeDocument/2006/relationships" xmlns:p="http://schemas.openxmlformats.org/presentationml/2006/main">
   <p:cSld>
     <p:spTree>
@@ -24669,8 +25510,18 @@
           <a:p>
             <a:r>
               <a:rPr lang="en-US" dirty="0" smtClean="0"/>
-              <a:t>Accessing APIs usually requires some programming experience</a:t>
-            </a:r>
+              <a:t>Accessing APIs usually requires some programming </a:t>
+            </a:r>
+            <a:r>
+              <a:rPr lang="en-US" dirty="0" smtClean="0"/>
+              <a:t>experience</a:t>
+            </a:r>
+          </a:p>
+          <a:p>
+            <a:endParaRPr lang="en-US" dirty="0"/>
+          </a:p>
+          <a:p>
+            <a:endParaRPr lang="en-US" dirty="0" smtClean="0"/>
           </a:p>
           <a:p>
             <a:endParaRPr lang="en-US" dirty="0"/>
@@ -24890,7 +25741,298 @@
 </p:sld>
 </file>
 
-<file path=ppt/slides/slide6.xml><?xml version="1.0" encoding="utf-8"?>
+<file path=ppt/slides/slide7.xml><?xml version="1.0" encoding="utf-8"?>
+<p:sld xmlns:a="http://schemas.openxmlformats.org/drawingml/2006/main" xmlns:r="http://schemas.openxmlformats.org/officeDocument/2006/relationships" xmlns:p="http://schemas.openxmlformats.org/presentationml/2006/main">
+  <p:cSld>
+    <p:spTree>
+      <p:nvGrpSpPr>
+        <p:cNvPr id="1" name=""/>
+        <p:cNvGrpSpPr/>
+        <p:nvPr/>
+      </p:nvGrpSpPr>
+      <p:grpSpPr>
+        <a:xfrm>
+          <a:off x="0" y="0"/>
+          <a:ext cx="0" cy="0"/>
+          <a:chOff x="0" y="0"/>
+          <a:chExt cx="0" cy="0"/>
+        </a:xfrm>
+      </p:grpSpPr>
+      <p:sp>
+        <p:nvSpPr>
+          <p:cNvPr id="5" name="Text Placeholder 4"/>
+          <p:cNvSpPr>
+            <a:spLocks noGrp="1"/>
+          </p:cNvSpPr>
+          <p:nvPr>
+            <p:ph type="body" sz="quarter" idx="15"/>
+          </p:nvPr>
+        </p:nvSpPr>
+        <p:spPr>
+          <a:xfrm>
+            <a:off x="4846638" y="1212850"/>
+            <a:ext cx="7315203" cy="4494212"/>
+          </a:xfrm>
+        </p:spPr>
+        <p:txBody>
+          <a:bodyPr anchor="t"/>
+          <a:lstStyle/>
+          <a:p>
+            <a:r>
+              <a:rPr lang="en-US" dirty="0" smtClean="0"/>
+              <a:t>Pew Research</a:t>
+            </a:r>
+            <a:endParaRPr lang="en-US" dirty="0" smtClean="0"/>
+          </a:p>
+          <a:p>
+            <a:endParaRPr lang="en-US" dirty="0" smtClean="0"/>
+          </a:p>
+          <a:p>
+            <a:r>
+              <a:rPr lang="en-US" dirty="0" smtClean="0"/>
+              <a:t>Gallup</a:t>
+            </a:r>
+            <a:endParaRPr lang="en-US" dirty="0" smtClean="0"/>
+          </a:p>
+          <a:p>
+            <a:endParaRPr lang="en-US" dirty="0"/>
+          </a:p>
+          <a:p>
+            <a:r>
+              <a:rPr lang="en-US" dirty="0" smtClean="0"/>
+              <a:t>US Budget </a:t>
+            </a:r>
+            <a:r>
+              <a:rPr lang="en-US" dirty="0" smtClean="0"/>
+              <a:t>Info</a:t>
+            </a:r>
+            <a:endParaRPr lang="en-US" dirty="0" smtClean="0"/>
+          </a:p>
+          <a:p>
+            <a:endParaRPr lang="en-US" dirty="0"/>
+          </a:p>
+          <a:p>
+            <a:endParaRPr lang="en-US" dirty="0" smtClean="0"/>
+          </a:p>
+          <a:p>
+            <a:endParaRPr lang="en-US" dirty="0"/>
+          </a:p>
+        </p:txBody>
+      </p:sp>
+      <p:sp>
+        <p:nvSpPr>
+          <p:cNvPr id="4" name="Title 3"/>
+          <p:cNvSpPr>
+            <a:spLocks noGrp="1"/>
+          </p:cNvSpPr>
+          <p:nvPr>
+            <p:ph type="title"/>
+          </p:nvPr>
+        </p:nvSpPr>
+        <p:spPr/>
+        <p:txBody>
+          <a:bodyPr/>
+          <a:lstStyle/>
+          <a:p>
+            <a:r>
+              <a:rPr lang="en-US" dirty="0" smtClean="0"/>
+              <a:t>Hand-Built Data</a:t>
+            </a:r>
+            <a:endParaRPr lang="en-US" dirty="0"/>
+          </a:p>
+        </p:txBody>
+      </p:sp>
+      <p:pic>
+        <p:nvPicPr>
+          <p:cNvPr id="2" name="Picture 1"/>
+          <p:cNvPicPr>
+            <a:picLocks noChangeAspect="1"/>
+          </p:cNvPicPr>
+          <p:nvPr/>
+        </p:nvPicPr>
+        <p:blipFill>
+          <a:blip r:embed="rId2"/>
+          <a:stretch>
+            <a:fillRect/>
+          </a:stretch>
+        </p:blipFill>
+        <p:spPr>
+          <a:xfrm>
+            <a:off x="579437" y="1363662"/>
+            <a:ext cx="3683189" cy="641383"/>
+          </a:xfrm>
+          <a:prstGeom prst="rect">
+            <a:avLst/>
+          </a:prstGeom>
+        </p:spPr>
+      </p:pic>
+      <p:pic>
+        <p:nvPicPr>
+          <p:cNvPr id="3" name="Picture 2"/>
+          <p:cNvPicPr>
+            <a:picLocks noChangeAspect="1"/>
+          </p:cNvPicPr>
+          <p:nvPr/>
+        </p:nvPicPr>
+        <p:blipFill>
+          <a:blip r:embed="rId3"/>
+          <a:stretch>
+            <a:fillRect/>
+          </a:stretch>
+        </p:blipFill>
+        <p:spPr>
+          <a:xfrm>
+            <a:off x="579437" y="2201862"/>
+            <a:ext cx="3665912" cy="1371600"/>
+          </a:xfrm>
+          <a:prstGeom prst="rect">
+            <a:avLst/>
+          </a:prstGeom>
+        </p:spPr>
+      </p:pic>
+      <p:sp>
+        <p:nvSpPr>
+          <p:cNvPr id="7" name="AutoShape 2" descr="http://img1.wikia.nocookie.net/__cb20100726111457/logopedia/images/5/51/Twitter_logo.svg"/>
+          <p:cNvSpPr>
+            <a:spLocks noChangeAspect="1" noChangeArrowheads="1"/>
+          </p:cNvSpPr>
+          <p:nvPr/>
+        </p:nvSpPr>
+        <p:spPr bwMode="auto">
+          <a:xfrm>
+            <a:off x="155575" y="-144463"/>
+            <a:ext cx="304800" cy="304801"/>
+          </a:xfrm>
+          <a:prstGeom prst="rect">
+            <a:avLst/>
+          </a:prstGeom>
+          <a:noFill/>
+          <a:extLst>
+            <a:ext uri="{909E8E84-426E-40DD-AFC4-6F175D3DCCD1}">
+              <a14:hiddenFill xmlns:a14="http://schemas.microsoft.com/office/drawing/2010/main">
+                <a:solidFill>
+                  <a:srgbClr val="FFFFFF"/>
+                </a:solidFill>
+              </a14:hiddenFill>
+            </a:ext>
+          </a:extLst>
+        </p:spPr>
+        <p:txBody>
+          <a:bodyPr vert="horz" wrap="square" lIns="91440" tIns="45720" rIns="91440" bIns="45720" numCol="1" anchor="t" anchorCtr="0" compatLnSpc="1">
+            <a:prstTxWarp prst="textNoShape">
+              <a:avLst/>
+            </a:prstTxWarp>
+          </a:bodyPr>
+          <a:lstStyle/>
+          <a:p>
+            <a:endParaRPr lang="en-US"/>
+          </a:p>
+        </p:txBody>
+      </p:sp>
+      <p:sp>
+        <p:nvSpPr>
+          <p:cNvPr id="8" name="AutoShape 4" descr="http://img1.wikia.nocookie.net/__cb20100726111457/logopedia/images/5/51/Twitter_logo.svg"/>
+          <p:cNvSpPr>
+            <a:spLocks noChangeAspect="1" noChangeArrowheads="1"/>
+          </p:cNvSpPr>
+          <p:nvPr/>
+        </p:nvSpPr>
+        <p:spPr bwMode="auto">
+          <a:xfrm>
+            <a:off x="307975" y="7937"/>
+            <a:ext cx="304800" cy="304801"/>
+          </a:xfrm>
+          <a:prstGeom prst="rect">
+            <a:avLst/>
+          </a:prstGeom>
+          <a:noFill/>
+          <a:extLst>
+            <a:ext uri="{909E8E84-426E-40DD-AFC4-6F175D3DCCD1}">
+              <a14:hiddenFill xmlns:a14="http://schemas.microsoft.com/office/drawing/2010/main">
+                <a:solidFill>
+                  <a:srgbClr val="FFFFFF"/>
+                </a:solidFill>
+              </a14:hiddenFill>
+            </a:ext>
+          </a:extLst>
+        </p:spPr>
+        <p:txBody>
+          <a:bodyPr vert="horz" wrap="square" lIns="91440" tIns="45720" rIns="91440" bIns="45720" numCol="1" anchor="t" anchorCtr="0" compatLnSpc="1">
+            <a:prstTxWarp prst="textNoShape">
+              <a:avLst/>
+            </a:prstTxWarp>
+          </a:bodyPr>
+          <a:lstStyle/>
+          <a:p>
+            <a:endParaRPr lang="en-US"/>
+          </a:p>
+        </p:txBody>
+      </p:sp>
+      <p:pic>
+        <p:nvPicPr>
+          <p:cNvPr id="9" name="Picture 8"/>
+          <p:cNvPicPr>
+            <a:picLocks noChangeAspect="1"/>
+          </p:cNvPicPr>
+          <p:nvPr/>
+        </p:nvPicPr>
+        <p:blipFill>
+          <a:blip r:embed="rId4"/>
+          <a:stretch>
+            <a:fillRect/>
+          </a:stretch>
+        </p:blipFill>
+        <p:spPr>
+          <a:xfrm>
+            <a:off x="1505900" y="3907109"/>
+            <a:ext cx="3040093" cy="725554"/>
+          </a:xfrm>
+          <a:prstGeom prst="rect">
+            <a:avLst/>
+          </a:prstGeom>
+        </p:spPr>
+      </p:pic>
+      <p:pic>
+        <p:nvPicPr>
+          <p:cNvPr id="12" name="Picture 11"/>
+          <p:cNvPicPr>
+            <a:picLocks noChangeAspect="1"/>
+          </p:cNvPicPr>
+          <p:nvPr/>
+        </p:nvPicPr>
+        <p:blipFill>
+          <a:blip r:embed="rId5"/>
+          <a:stretch>
+            <a:fillRect/>
+          </a:stretch>
+        </p:blipFill>
+        <p:spPr>
+          <a:xfrm>
+            <a:off x="651713" y="3907109"/>
+            <a:ext cx="808763" cy="688735"/>
+          </a:xfrm>
+          <a:prstGeom prst="rect">
+            <a:avLst/>
+          </a:prstGeom>
+        </p:spPr>
+      </p:pic>
+    </p:spTree>
+    <p:extLst>
+      <p:ext uri="{BB962C8B-B14F-4D97-AF65-F5344CB8AC3E}">
+        <p14:creationId xmlns:p14="http://schemas.microsoft.com/office/powerpoint/2010/main" val="3928285750"/>
+      </p:ext>
+    </p:extLst>
+  </p:cSld>
+  <p:clrMapOvr>
+    <a:masterClrMapping/>
+  </p:clrMapOvr>
+  <p:transition>
+    <p:fade/>
+  </p:transition>
+</p:sld>
+</file>
+
+<file path=ppt/slides/slide8.xml><?xml version="1.0" encoding="utf-8"?>
 <p:sld xmlns:a="http://schemas.openxmlformats.org/drawingml/2006/main" xmlns:r="http://schemas.openxmlformats.org/officeDocument/2006/relationships" xmlns:p="http://schemas.openxmlformats.org/presentationml/2006/main">
   <p:cSld>
     <p:spTree>
@@ -24995,7 +26137,7 @@
 </p:sld>
 </file>
 
-<file path=ppt/slides/slide7.xml><?xml version="1.0" encoding="utf-8"?>
+<file path=ppt/slides/slide9.xml><?xml version="1.0" encoding="utf-8"?>
 <p:sld xmlns:a="http://schemas.openxmlformats.org/drawingml/2006/main" xmlns:r="http://schemas.openxmlformats.org/officeDocument/2006/relationships" xmlns:p="http://schemas.openxmlformats.org/presentationml/2006/main">
   <p:cSld>
     <p:spTree>
@@ -25091,7 +26233,6 @@
               <a:rPr lang="en-US" dirty="0" smtClean="0"/>
               <a:t>Elections</a:t>
             </a:r>
-            <a:endParaRPr lang="en-US" dirty="0" smtClean="0"/>
           </a:p>
         </p:txBody>
       </p:sp>
@@ -25122,278 +26263,6 @@
     <p:extLst>
       <p:ext uri="{BB962C8B-B14F-4D97-AF65-F5344CB8AC3E}">
         <p14:creationId xmlns:p14="http://schemas.microsoft.com/office/powerpoint/2010/main" val="779819329"/>
-      </p:ext>
-    </p:extLst>
-  </p:cSld>
-  <p:clrMapOvr>
-    <a:masterClrMapping/>
-  </p:clrMapOvr>
-  <p:transition>
-    <p:fade/>
-  </p:transition>
-</p:sld>
-</file>
-
-<file path=ppt/slides/slide8.xml><?xml version="1.0" encoding="utf-8"?>
-<p:sld xmlns:a="http://schemas.openxmlformats.org/drawingml/2006/main" xmlns:r="http://schemas.openxmlformats.org/officeDocument/2006/relationships" xmlns:p="http://schemas.openxmlformats.org/presentationml/2006/main">
-  <p:cSld>
-    <p:spTree>
-      <p:nvGrpSpPr>
-        <p:cNvPr id="1" name=""/>
-        <p:cNvGrpSpPr/>
-        <p:nvPr/>
-      </p:nvGrpSpPr>
-      <p:grpSpPr>
-        <a:xfrm>
-          <a:off x="0" y="0"/>
-          <a:ext cx="0" cy="0"/>
-          <a:chOff x="0" y="0"/>
-          <a:chExt cx="0" cy="0"/>
-        </a:xfrm>
-      </p:grpSpPr>
-      <p:sp>
-        <p:nvSpPr>
-          <p:cNvPr id="5" name="Text Placeholder 4"/>
-          <p:cNvSpPr>
-            <a:spLocks noGrp="1"/>
-          </p:cNvSpPr>
-          <p:nvPr>
-            <p:ph type="body" sz="quarter" idx="10"/>
-          </p:nvPr>
-        </p:nvSpPr>
-        <p:spPr>
-          <a:xfrm>
-            <a:off x="274639" y="1246605"/>
-            <a:ext cx="5410199" cy="4690515"/>
-          </a:xfrm>
-        </p:spPr>
-        <p:txBody>
-          <a:bodyPr/>
-          <a:lstStyle/>
-          <a:p>
-            <a:pPr marL="0" indent="0">
-              <a:buNone/>
-            </a:pPr>
-            <a:r>
-              <a:rPr lang="en-US" dirty="0" smtClean="0"/>
-              <a:t>Working with existing data will raise questions</a:t>
-            </a:r>
-          </a:p>
-          <a:p>
-            <a:pPr marL="0" indent="0">
-              <a:buNone/>
-            </a:pPr>
-            <a:endParaRPr lang="en-US" dirty="0"/>
-          </a:p>
-          <a:p>
-            <a:pPr marL="0" indent="0">
-              <a:buNone/>
-            </a:pPr>
-            <a:r>
-              <a:rPr lang="en-US" dirty="0" smtClean="0"/>
-              <a:t>You may have to collect the “missing link”</a:t>
-            </a:r>
-          </a:p>
-          <a:p>
-            <a:pPr marL="0" indent="0">
-              <a:buNone/>
-            </a:pPr>
-            <a:endParaRPr lang="en-US" dirty="0"/>
-          </a:p>
-          <a:p>
-            <a:pPr marL="0" indent="0">
-              <a:buNone/>
-            </a:pPr>
-            <a:r>
-              <a:rPr lang="en-US" sz="2400" dirty="0"/>
-              <a:t>http://www.informationisbeautiful.net</a:t>
-            </a:r>
-            <a:r>
-              <a:rPr lang="en-US" sz="2400" dirty="0" smtClean="0"/>
-              <a:t>/</a:t>
-            </a:r>
-          </a:p>
-          <a:p>
-            <a:pPr marL="0" indent="0">
-              <a:buNone/>
-            </a:pPr>
-            <a:r>
-              <a:rPr lang="en-US" sz="2400" dirty="0" smtClean="0"/>
-              <a:t>visualizations/the-</a:t>
-            </a:r>
-            <a:r>
-              <a:rPr lang="en-US" sz="2400" dirty="0" err="1" smtClean="0"/>
-              <a:t>microbescope</a:t>
-            </a:r>
-            <a:r>
-              <a:rPr lang="en-US" sz="2400" dirty="0"/>
-              <a:t>/</a:t>
-            </a:r>
-          </a:p>
-        </p:txBody>
-      </p:sp>
-      <p:sp>
-        <p:nvSpPr>
-          <p:cNvPr id="4" name="Title 3"/>
-          <p:cNvSpPr>
-            <a:spLocks noGrp="1"/>
-          </p:cNvSpPr>
-          <p:nvPr>
-            <p:ph type="title"/>
-          </p:nvPr>
-        </p:nvSpPr>
-        <p:spPr/>
-        <p:txBody>
-          <a:bodyPr/>
-          <a:lstStyle/>
-          <a:p>
-            <a:r>
-              <a:rPr lang="en-US" dirty="0" smtClean="0"/>
-              <a:t>Start With the Data You Can Find</a:t>
-            </a:r>
-            <a:endParaRPr lang="en-US" dirty="0"/>
-          </a:p>
-        </p:txBody>
-      </p:sp>
-      <p:pic>
-        <p:nvPicPr>
-          <p:cNvPr id="2" name="Picture 1"/>
-          <p:cNvPicPr>
-            <a:picLocks noChangeAspect="1"/>
-          </p:cNvPicPr>
-          <p:nvPr/>
-        </p:nvPicPr>
-        <p:blipFill>
-          <a:blip r:embed="rId2"/>
-          <a:stretch>
-            <a:fillRect/>
-          </a:stretch>
-        </p:blipFill>
-        <p:spPr>
-          <a:xfrm>
-            <a:off x="5684837" y="1212849"/>
-            <a:ext cx="9741870" cy="5561013"/>
-          </a:xfrm>
-          <a:prstGeom prst="rect">
-            <a:avLst/>
-          </a:prstGeom>
-        </p:spPr>
-      </p:pic>
-    </p:spTree>
-    <p:extLst>
-      <p:ext uri="{BB962C8B-B14F-4D97-AF65-F5344CB8AC3E}">
-        <p14:creationId xmlns:p14="http://schemas.microsoft.com/office/powerpoint/2010/main" val="2491792190"/>
-      </p:ext>
-    </p:extLst>
-  </p:cSld>
-  <p:clrMapOvr>
-    <a:masterClrMapping/>
-  </p:clrMapOvr>
-  <p:transition>
-    <p:fade/>
-  </p:transition>
-</p:sld>
-</file>
-
-<file path=ppt/slides/slide9.xml><?xml version="1.0" encoding="utf-8"?>
-<p:sld xmlns:a="http://schemas.openxmlformats.org/drawingml/2006/main" xmlns:r="http://schemas.openxmlformats.org/officeDocument/2006/relationships" xmlns:p="http://schemas.openxmlformats.org/presentationml/2006/main">
-  <p:cSld>
-    <p:spTree>
-      <p:nvGrpSpPr>
-        <p:cNvPr id="1" name=""/>
-        <p:cNvGrpSpPr/>
-        <p:nvPr/>
-      </p:nvGrpSpPr>
-      <p:grpSpPr>
-        <a:xfrm>
-          <a:off x="0" y="0"/>
-          <a:ext cx="0" cy="0"/>
-          <a:chOff x="0" y="0"/>
-          <a:chExt cx="0" cy="0"/>
-        </a:xfrm>
-      </p:grpSpPr>
-      <p:sp>
-        <p:nvSpPr>
-          <p:cNvPr id="4" name="Title 3"/>
-          <p:cNvSpPr>
-            <a:spLocks noGrp="1"/>
-          </p:cNvSpPr>
-          <p:nvPr>
-            <p:ph type="title"/>
-          </p:nvPr>
-        </p:nvSpPr>
-        <p:spPr/>
-        <p:txBody>
-          <a:bodyPr/>
-          <a:lstStyle/>
-          <a:p>
-            <a:r>
-              <a:rPr lang="en-US" dirty="0" smtClean="0"/>
-              <a:t>Start With the Data You Can Find</a:t>
-            </a:r>
-            <a:endParaRPr lang="en-US" dirty="0"/>
-          </a:p>
-        </p:txBody>
-      </p:sp>
-      <p:pic>
-        <p:nvPicPr>
-          <p:cNvPr id="2" name="Picture 1"/>
-          <p:cNvPicPr>
-            <a:picLocks noChangeAspect="1"/>
-          </p:cNvPicPr>
-          <p:nvPr/>
-        </p:nvPicPr>
-        <p:blipFill>
-          <a:blip r:embed="rId3"/>
-          <a:stretch>
-            <a:fillRect/>
-          </a:stretch>
-        </p:blipFill>
-        <p:spPr>
-          <a:xfrm>
-            <a:off x="0" y="26698"/>
-            <a:ext cx="12238037" cy="6985916"/>
-          </a:xfrm>
-          <a:prstGeom prst="rect">
-            <a:avLst/>
-          </a:prstGeom>
-        </p:spPr>
-      </p:pic>
-      <p:sp>
-        <p:nvSpPr>
-          <p:cNvPr id="3" name="Text Placeholder 2"/>
-          <p:cNvSpPr>
-            <a:spLocks noGrp="1"/>
-          </p:cNvSpPr>
-          <p:nvPr>
-            <p:ph type="body" sz="quarter" idx="10"/>
-          </p:nvPr>
-        </p:nvSpPr>
-        <p:spPr>
-          <a:xfrm>
-            <a:off x="274638" y="1212850"/>
-            <a:ext cx="11887200" cy="738664"/>
-          </a:xfrm>
-        </p:spPr>
-        <p:txBody>
-          <a:bodyPr/>
-          <a:lstStyle/>
-          <a:p>
-            <a:pPr marL="0" indent="0">
-              <a:buNone/>
-            </a:pPr>
-            <a:r>
-              <a:rPr lang="en-US" dirty="0" smtClean="0"/>
-              <a:t> </a:t>
-            </a:r>
-            <a:endParaRPr lang="en-US" dirty="0"/>
-          </a:p>
-        </p:txBody>
-      </p:sp>
-    </p:spTree>
-    <p:extLst>
-      <p:ext uri="{BB962C8B-B14F-4D97-AF65-F5344CB8AC3E}">
-        <p14:creationId xmlns:p14="http://schemas.microsoft.com/office/powerpoint/2010/main" val="1138816033"/>
       </p:ext>
     </p:extLst>
   </p:cSld>
@@ -26851,100 +27720,6 @@
 </file>
 
 <file path=customXml/item1.xml><?xml version="1.0" encoding="utf-8"?>
-<p:properties xmlns:p="http://schemas.microsoft.com/office/2006/metadata/properties" xmlns:xsi="http://www.w3.org/2001/XMLSchema-instance" xmlns:pc="http://schemas.microsoft.com/office/infopath/2007/PartnerControls">
-  <documentManagement>
-    <h9a868b2ee15488883f623ae5237ecae xmlns="12a172fe-0250-434a-85cf-03b10810c5e5">
-      <Terms xmlns="http://schemas.microsoft.com/office/infopath/2007/PartnerControls">
-        <TermInfo xmlns="http://schemas.microsoft.com/office/infopath/2007/PartnerControls">
-          <TermName xmlns="http://schemas.microsoft.com/office/infopath/2007/PartnerControls">Moscone Center</TermName>
-          <TermId xmlns="http://schemas.microsoft.com/office/infopath/2007/PartnerControls">d4f36a2e-dd0d-4424-990f-7c93b4e9f063</TermId>
-        </TermInfo>
-      </Terms>
-    </h9a868b2ee15488883f623ae5237ecae>
-    <k62f7d35b80b40fb8c27985e50b34fcd xmlns="12a172fe-0250-434a-85cf-03b10810c5e5">
-      <Terms xmlns="http://schemas.microsoft.com/office/infopath/2007/PartnerControls">
-        <TermInfo xmlns="http://schemas.microsoft.com/office/infopath/2007/PartnerControls">
-          <TermName xmlns="http://schemas.microsoft.com/office/infopath/2007/PartnerControls">BUILD</TermName>
-          <TermId xmlns="http://schemas.microsoft.com/office/infopath/2007/PartnerControls">58542b36-5bf5-46a6-a53f-a41fb7a73785</TermId>
-        </TermInfo>
-      </Terms>
-    </k62f7d35b80b40fb8c27985e50b34fcd>
-    <LikesCount xmlns="http://schemas.microsoft.com/sharepoint/v3" xsi:nil="true"/>
-    <pfbfa50075a04958bd8757dc155d3e08 xmlns="12a172fe-0250-434a-85cf-03b10810c5e5">
-      <Terms xmlns="http://schemas.microsoft.com/office/infopath/2007/PartnerControls">
-        <TermInfo xmlns="http://schemas.microsoft.com/office/infopath/2007/PartnerControls">
-          <TermName xmlns="http://schemas.microsoft.com/office/infopath/2007/PartnerControls">San Francisco</TermName>
-          <TermId xmlns="http://schemas.microsoft.com/office/infopath/2007/PartnerControls">84dfcb53-432b-499d-8965-93d483d36b4a</TermId>
-        </TermInfo>
-      </Terms>
-    </pfbfa50075a04958bd8757dc155d3e08>
-    <Presentation_x0020_Date xmlns="12a172fe-0250-434a-85cf-03b10810c5e5">2015-04-29T00:00:00-07:00</Presentation_x0020_Date>
-    <o72fbe6ee5ae4131af0832c08ec51202 xmlns="12a172fe-0250-434a-85cf-03b10810c5e5">
-      <Terms xmlns="http://schemas.microsoft.com/office/infopath/2007/PartnerControls"/>
-    </o72fbe6ee5ae4131af0832c08ec51202>
-    <Event_x0020_Start_x0020_Date xmlns="12a172fe-0250-434a-85cf-03b10810c5e5">2015-04-29T07:00:00+00:00</Event_x0020_Start_x0020_Date>
-    <MS_x0020_Content_x0020_Owner xmlns="12a172fe-0250-434a-85cf-03b10810c5e5">
-      <UserInfo>
-        <DisplayName/>
-        <AccountId xsi:nil="true"/>
-        <AccountType/>
-      </UserInfo>
-    </MS_x0020_Content_x0020_Owner>
-    <MS_x0020_Speaker xmlns="12a172fe-0250-434a-85cf-03b10810c5e5">
-      <UserInfo>
-        <DisplayName/>
-        <AccountId xsi:nil="true"/>
-        <AccountType/>
-      </UserInfo>
-    </MS_x0020_Speaker>
-    <External_x0020_Speaker xmlns="12a172fe-0250-434a-85cf-03b10810c5e5">Chris Anderson, Brett Humphrey</External_x0020_Speaker>
-    <Session_x0020_Code xmlns="12a172fe-0250-434a-85cf-03b10810c5e5">2-612</Session_x0020_Code>
-    <le8386062bd54e24a95c83b32ccbdb34 xmlns="12a172fe-0250-434a-85cf-03b10810c5e5">
-      <Terms xmlns="http://schemas.microsoft.com/office/infopath/2007/PartnerControls"/>
-    </le8386062bd54e24a95c83b32ccbdb34>
-    <j4d4d959795b4220a289a041ed046605 xmlns="12a172fe-0250-434a-85cf-03b10810c5e5">
-      <Terms xmlns="http://schemas.microsoft.com/office/infopath/2007/PartnerControls"/>
-    </j4d4d959795b4220a289a041ed046605>
-    <Event_x0020_End_x0020_Date xmlns="12a172fe-0250-434a-85cf-03b10810c5e5">2015-05-01T07:00:00+00:00</Event_x0020_End_x0020_Date>
-    <TaxKeywordTaxHTField xmlns="230e9df3-be65-4c73-a93b-d1236ebd677e">
-      <Terms xmlns="http://schemas.microsoft.com/office/infopath/2007/PartnerControls">
-        <TermInfo xmlns="http://schemas.microsoft.com/office/infopath/2007/PartnerControls">
-          <TermName xmlns="http://schemas.microsoft.com/office/infopath/2007/PartnerControls">Build 2015</TermName>
-          <TermId xmlns="http://schemas.microsoft.com/office/infopath/2007/PartnerControls">54419920-0a06-43b0-b2df-79127b266d93</TermId>
-        </TermInfo>
-      </Terms>
-    </TaxKeywordTaxHTField>
-    <TaxCatchAll xmlns="230e9df3-be65-4c73-a93b-d1236ebd677e">
-      <Value>173</Value>
-      <Value>172</Value>
-      <Value>171</Value>
-      <Value>170</Value>
-    </TaxCatchAll>
-    <eb9cf3a3af7b473faa5c9c98148a90a4 xmlns="12a172fe-0250-434a-85cf-03b10810c5e5">
-      <Terms xmlns="http://schemas.microsoft.com/office/infopath/2007/PartnerControls"/>
-    </eb9cf3a3af7b473faa5c9c98148a90a4>
-    <SharingHintHash xmlns="12a172fe-0250-434a-85cf-03b10810c5e5">-103767253</SharingHintHash>
-    <SharedWithUsers xmlns="12a172fe-0250-434a-85cf-03b10810c5e5">
-      <UserInfo>
-        <DisplayName/>
-        <AccountId xsi:nil="true"/>
-        <AccountType/>
-      </UserInfo>
-    </SharedWithUsers>
-  </documentManagement>
-</p:properties>
-</file>
-
-<file path=customXml/item2.xml><?xml version="1.0" encoding="utf-8"?>
-<?mso-contentType ?>
-<FormTemplates xmlns="http://schemas.microsoft.com/sharepoint/v3/contenttype/forms">
-  <Display>DocumentLibraryForm</Display>
-  <Edit>DocumentLibraryForm</Edit>
-  <New>DocumentLibraryForm</New>
-</FormTemplates>
-</file>
-
-<file path=customXml/item3.xml><?xml version="1.0" encoding="utf-8"?>
 <ct:contentTypeSchema xmlns:ct="http://schemas.microsoft.com/office/2006/metadata/contentType" xmlns:ma="http://schemas.microsoft.com/office/2006/metadata/properties/metaAttributes" ct:_="" ma:_="" ma:contentTypeName="PresentationsDoc" ma:contentTypeID="0x01010046EBBE4F454C2C47A5E89CD935B1FC7800E83BCD34BAE21044A0567CF64FDFDE54" ma:contentTypeVersion="5" ma:contentTypeDescription="Create a new document." ma:contentTypeScope="" ma:versionID="9f49739d1da212619d044bf1bfa27251">
   <xsd:schema xmlns:xsd="http://www.w3.org/2001/XMLSchema" xmlns:xs="http://www.w3.org/2001/XMLSchema" xmlns:p="http://schemas.microsoft.com/office/2006/metadata/properties" xmlns:ns1="http://schemas.microsoft.com/sharepoint/v3" xmlns:ns2="12a172fe-0250-434a-85cf-03b10810c5e5" xmlns:ns3="230e9df3-be65-4c73-a93b-d1236ebd677e" targetNamespace="http://schemas.microsoft.com/office/2006/metadata/properties" ma:root="true" ma:fieldsID="d1ec06fbcf9feb71c233288b468d8e39" ns1:_="" ns2:_="" ns3:_="">
     <xsd:import namespace="http://schemas.microsoft.com/sharepoint/v3"/>
@@ -27280,33 +28055,101 @@
 </ct:contentTypeSchema>
 </file>
 
-<file path=customXml/itemProps1.xml><?xml version="1.0" encoding="utf-8"?>
-<ds:datastoreItem xmlns:ds="http://schemas.openxmlformats.org/officeDocument/2006/customXml" ds:itemID="{F990F116-B58F-4255-B05B-DA3808E0E5C6}">
-  <ds:schemaRefs>
-    <ds:schemaRef ds:uri="230e9df3-be65-4c73-a93b-d1236ebd677e"/>
-    <ds:schemaRef ds:uri="http://schemas.openxmlformats.org/package/2006/metadata/core-properties"/>
-    <ds:schemaRef ds:uri="http://purl.org/dc/elements/1.1/"/>
-    <ds:schemaRef ds:uri="http://schemas.microsoft.com/office/2006/metadata/properties"/>
-    <ds:schemaRef ds:uri="http://schemas.microsoft.com/office/infopath/2007/PartnerControls"/>
-    <ds:schemaRef ds:uri="http://schemas.microsoft.com/sharepoint/v3"/>
-    <ds:schemaRef ds:uri="http://purl.org/dc/terms/"/>
-    <ds:schemaRef ds:uri="http://schemas.microsoft.com/office/2006/documentManagement/types"/>
-    <ds:schemaRef ds:uri="http://purl.org/dc/dcmitype/"/>
-    <ds:schemaRef ds:uri="12a172fe-0250-434a-85cf-03b10810c5e5"/>
-    <ds:schemaRef ds:uri="http://www.w3.org/XML/1998/namespace"/>
-  </ds:schemaRefs>
-</ds:datastoreItem>
+<file path=customXml/item2.xml><?xml version="1.0" encoding="utf-8"?>
+<?mso-contentType ?>
+<FormTemplates xmlns="http://schemas.microsoft.com/sharepoint/v3/contenttype/forms">
+  <Display>DocumentLibraryForm</Display>
+  <Edit>DocumentLibraryForm</Edit>
+  <New>DocumentLibraryForm</New>
+</FormTemplates>
 </file>
 
-<file path=customXml/itemProps2.xml><?xml version="1.0" encoding="utf-8"?>
-<ds:datastoreItem xmlns:ds="http://schemas.openxmlformats.org/officeDocument/2006/customXml" ds:itemID="{758FDAC0-319D-4A54-8D8E-1D42CB1F8004}">
-  <ds:schemaRefs>
-    <ds:schemaRef ds:uri="http://schemas.microsoft.com/sharepoint/v3/contenttype/forms"/>
-  </ds:schemaRefs>
-</ds:datastoreItem>
+<file path=customXml/item3.xml><?xml version="1.0" encoding="utf-8"?>
+<p:properties xmlns:p="http://schemas.microsoft.com/office/2006/metadata/properties" xmlns:xsi="http://www.w3.org/2001/XMLSchema-instance" xmlns:pc="http://schemas.microsoft.com/office/infopath/2007/PartnerControls">
+  <documentManagement>
+    <h9a868b2ee15488883f623ae5237ecae xmlns="12a172fe-0250-434a-85cf-03b10810c5e5">
+      <Terms xmlns="http://schemas.microsoft.com/office/infopath/2007/PartnerControls">
+        <TermInfo xmlns="http://schemas.microsoft.com/office/infopath/2007/PartnerControls">
+          <TermName xmlns="http://schemas.microsoft.com/office/infopath/2007/PartnerControls">Moscone Center</TermName>
+          <TermId xmlns="http://schemas.microsoft.com/office/infopath/2007/PartnerControls">d4f36a2e-dd0d-4424-990f-7c93b4e9f063</TermId>
+        </TermInfo>
+      </Terms>
+    </h9a868b2ee15488883f623ae5237ecae>
+    <k62f7d35b80b40fb8c27985e50b34fcd xmlns="12a172fe-0250-434a-85cf-03b10810c5e5">
+      <Terms xmlns="http://schemas.microsoft.com/office/infopath/2007/PartnerControls">
+        <TermInfo xmlns="http://schemas.microsoft.com/office/infopath/2007/PartnerControls">
+          <TermName xmlns="http://schemas.microsoft.com/office/infopath/2007/PartnerControls">BUILD</TermName>
+          <TermId xmlns="http://schemas.microsoft.com/office/infopath/2007/PartnerControls">58542b36-5bf5-46a6-a53f-a41fb7a73785</TermId>
+        </TermInfo>
+      </Terms>
+    </k62f7d35b80b40fb8c27985e50b34fcd>
+    <LikesCount xmlns="http://schemas.microsoft.com/sharepoint/v3" xsi:nil="true"/>
+    <pfbfa50075a04958bd8757dc155d3e08 xmlns="12a172fe-0250-434a-85cf-03b10810c5e5">
+      <Terms xmlns="http://schemas.microsoft.com/office/infopath/2007/PartnerControls">
+        <TermInfo xmlns="http://schemas.microsoft.com/office/infopath/2007/PartnerControls">
+          <TermName xmlns="http://schemas.microsoft.com/office/infopath/2007/PartnerControls">San Francisco</TermName>
+          <TermId xmlns="http://schemas.microsoft.com/office/infopath/2007/PartnerControls">84dfcb53-432b-499d-8965-93d483d36b4a</TermId>
+        </TermInfo>
+      </Terms>
+    </pfbfa50075a04958bd8757dc155d3e08>
+    <Presentation_x0020_Date xmlns="12a172fe-0250-434a-85cf-03b10810c5e5">2015-04-29T00:00:00-07:00</Presentation_x0020_Date>
+    <o72fbe6ee5ae4131af0832c08ec51202 xmlns="12a172fe-0250-434a-85cf-03b10810c5e5">
+      <Terms xmlns="http://schemas.microsoft.com/office/infopath/2007/PartnerControls"/>
+    </o72fbe6ee5ae4131af0832c08ec51202>
+    <Event_x0020_Start_x0020_Date xmlns="12a172fe-0250-434a-85cf-03b10810c5e5">2015-04-29T07:00:00+00:00</Event_x0020_Start_x0020_Date>
+    <MS_x0020_Content_x0020_Owner xmlns="12a172fe-0250-434a-85cf-03b10810c5e5">
+      <UserInfo>
+        <DisplayName/>
+        <AccountId xsi:nil="true"/>
+        <AccountType/>
+      </UserInfo>
+    </MS_x0020_Content_x0020_Owner>
+    <MS_x0020_Speaker xmlns="12a172fe-0250-434a-85cf-03b10810c5e5">
+      <UserInfo>
+        <DisplayName/>
+        <AccountId xsi:nil="true"/>
+        <AccountType/>
+      </UserInfo>
+    </MS_x0020_Speaker>
+    <External_x0020_Speaker xmlns="12a172fe-0250-434a-85cf-03b10810c5e5">Chris Anderson, Brett Humphrey</External_x0020_Speaker>
+    <Session_x0020_Code xmlns="12a172fe-0250-434a-85cf-03b10810c5e5">2-612</Session_x0020_Code>
+    <le8386062bd54e24a95c83b32ccbdb34 xmlns="12a172fe-0250-434a-85cf-03b10810c5e5">
+      <Terms xmlns="http://schemas.microsoft.com/office/infopath/2007/PartnerControls"/>
+    </le8386062bd54e24a95c83b32ccbdb34>
+    <j4d4d959795b4220a289a041ed046605 xmlns="12a172fe-0250-434a-85cf-03b10810c5e5">
+      <Terms xmlns="http://schemas.microsoft.com/office/infopath/2007/PartnerControls"/>
+    </j4d4d959795b4220a289a041ed046605>
+    <Event_x0020_End_x0020_Date xmlns="12a172fe-0250-434a-85cf-03b10810c5e5">2015-05-01T07:00:00+00:00</Event_x0020_End_x0020_Date>
+    <TaxKeywordTaxHTField xmlns="230e9df3-be65-4c73-a93b-d1236ebd677e">
+      <Terms xmlns="http://schemas.microsoft.com/office/infopath/2007/PartnerControls">
+        <TermInfo xmlns="http://schemas.microsoft.com/office/infopath/2007/PartnerControls">
+          <TermName xmlns="http://schemas.microsoft.com/office/infopath/2007/PartnerControls">Build 2015</TermName>
+          <TermId xmlns="http://schemas.microsoft.com/office/infopath/2007/PartnerControls">54419920-0a06-43b0-b2df-79127b266d93</TermId>
+        </TermInfo>
+      </Terms>
+    </TaxKeywordTaxHTField>
+    <TaxCatchAll xmlns="230e9df3-be65-4c73-a93b-d1236ebd677e">
+      <Value>173</Value>
+      <Value>172</Value>
+      <Value>171</Value>
+      <Value>170</Value>
+    </TaxCatchAll>
+    <eb9cf3a3af7b473faa5c9c98148a90a4 xmlns="12a172fe-0250-434a-85cf-03b10810c5e5">
+      <Terms xmlns="http://schemas.microsoft.com/office/infopath/2007/PartnerControls"/>
+    </eb9cf3a3af7b473faa5c9c98148a90a4>
+    <SharingHintHash xmlns="12a172fe-0250-434a-85cf-03b10810c5e5">-103767253</SharingHintHash>
+    <SharedWithUsers xmlns="12a172fe-0250-434a-85cf-03b10810c5e5">
+      <UserInfo>
+        <DisplayName/>
+        <AccountId xsi:nil="true"/>
+        <AccountType/>
+      </UserInfo>
+    </SharedWithUsers>
+  </documentManagement>
+</p:properties>
 </file>
 
-<file path=customXml/itemProps3.xml><?xml version="1.0" encoding="utf-8"?>
+<file path=customXml/itemProps1.xml><?xml version="1.0" encoding="utf-8"?>
 <ds:datastoreItem xmlns:ds="http://schemas.openxmlformats.org/officeDocument/2006/customXml" ds:itemID="{99E0065C-627B-42FD-A7AD-D2ABAFAC7E7D}">
   <ds:schemaRefs>
     <ds:schemaRef ds:uri="http://schemas.microsoft.com/office/2006/metadata/contentType"/>
@@ -27325,4 +28168,30 @@
     <ds:schemaRef ds:uri="http://schemas.microsoft.com/internal/obd"/>
   </ds:schemaRefs>
 </ds:datastoreItem>
+</file>
+
+<file path=customXml/itemProps2.xml><?xml version="1.0" encoding="utf-8"?>
+<ds:datastoreItem xmlns:ds="http://schemas.openxmlformats.org/officeDocument/2006/customXml" ds:itemID="{758FDAC0-319D-4A54-8D8E-1D42CB1F8004}">
+  <ds:schemaRefs>
+    <ds:schemaRef ds:uri="http://schemas.microsoft.com/sharepoint/v3/contenttype/forms"/>
+  </ds:schemaRefs>
+</ds:datastoreItem>
+</file>
+
+<file path=customXml/itemProps3.xml><?xml version="1.0" encoding="utf-8"?>
+<ds:datastoreItem xmlns:ds="http://schemas.openxmlformats.org/officeDocument/2006/customXml" ds:itemID="{F990F116-B58F-4255-B05B-DA3808E0E5C6}">
+  <ds:schemaRefs>
+    <ds:schemaRef ds:uri="230e9df3-be65-4c73-a93b-d1236ebd677e"/>
+    <ds:schemaRef ds:uri="http://schemas.openxmlformats.org/package/2006/metadata/core-properties"/>
+    <ds:schemaRef ds:uri="http://purl.org/dc/elements/1.1/"/>
+    <ds:schemaRef ds:uri="http://schemas.microsoft.com/office/2006/metadata/properties"/>
+    <ds:schemaRef ds:uri="http://schemas.microsoft.com/office/infopath/2007/PartnerControls"/>
+    <ds:schemaRef ds:uri="http://schemas.microsoft.com/sharepoint/v3"/>
+    <ds:schemaRef ds:uri="http://purl.org/dc/terms/"/>
+    <ds:schemaRef ds:uri="http://schemas.microsoft.com/office/2006/documentManagement/types"/>
+    <ds:schemaRef ds:uri="http://purl.org/dc/dcmitype/"/>
+    <ds:schemaRef ds:uri="12a172fe-0250-434a-85cf-03b10810c5e5"/>
+    <ds:schemaRef ds:uri="http://www.w3.org/XML/1998/namespace"/>
+  </ds:schemaRefs>
+</ds:datastoreItem>
 </file>
</xml_diff>

<commit_message>
Updates presentations w/ Lauren's info
</commit_message>
<xml_diff>
--- a/Session 2.pptx
+++ b/Session 2.pptx
@@ -317,7 +317,7 @@
               <a:rPr lang="en-US" smtClean="0">
                 <a:latin typeface="Segoe UI" pitchFamily="34" charset="0"/>
               </a:rPr>
-              <a:t>11/5/2015 1:08 PM</a:t>
+              <a:t>11/6/2015 9:26 AM</a:t>
             </a:fld>
             <a:endParaRPr lang="en-US" dirty="0">
               <a:latin typeface="Segoe UI" pitchFamily="34" charset="0"/>
@@ -619,7 +619,7 @@
           <a:p>
             <a:fld id="{38EEC551-8CDA-4EB6-89BB-2A86C9F091C8}" type="datetime8">
               <a:rPr lang="en-US" smtClean="0"/>
-              <a:t>11/5/2015 1:08 PM</a:t>
+              <a:t>11/6/2015 9:26 AM</a:t>
             </a:fld>
             <a:endParaRPr lang="en-US" dirty="0"/>
           </a:p>
@@ -984,7 +984,7 @@
           <a:p>
             <a:fld id="{C6996B83-60CF-42A8-BA06-F99D0BEC30B3}" type="datetime1">
               <a:rPr lang="en-US" smtClean="0"/>
-              <a:t>11/5/2015</a:t>
+              <a:t>11/6/2015</a:t>
             </a:fld>
             <a:endParaRPr lang="en-US" dirty="0"/>
           </a:p>
@@ -1205,7 +1205,7 @@
                 </a:solidFill>
               </a:rPr>
               <a:pPr/>
-              <a:t>11/5/2015</a:t>
+              <a:t>11/6/2015</a:t>
             </a:fld>
             <a:endParaRPr lang="en-US" dirty="0">
               <a:solidFill>
@@ -1415,7 +1415,7 @@
                 </a:solidFill>
               </a:rPr>
               <a:pPr/>
-              <a:t>11/5/2015</a:t>
+              <a:t>11/6/2015</a:t>
             </a:fld>
             <a:endParaRPr lang="en-US" dirty="0">
               <a:solidFill>
@@ -1625,7 +1625,7 @@
                 </a:solidFill>
               </a:rPr>
               <a:pPr/>
-              <a:t>11/5/2015</a:t>
+              <a:t>11/6/2015</a:t>
             </a:fld>
             <a:endParaRPr lang="en-US" dirty="0">
               <a:solidFill>
@@ -1835,7 +1835,7 @@
                 </a:solidFill>
               </a:rPr>
               <a:pPr/>
-              <a:t>11/5/2015</a:t>
+              <a:t>11/6/2015</a:t>
             </a:fld>
             <a:endParaRPr lang="en-US" dirty="0">
               <a:solidFill>
@@ -2045,7 +2045,7 @@
                 </a:solidFill>
               </a:rPr>
               <a:pPr/>
-              <a:t>11/5/2015</a:t>
+              <a:t>11/6/2015</a:t>
             </a:fld>
             <a:endParaRPr lang="en-US" dirty="0">
               <a:solidFill>
@@ -2255,7 +2255,7 @@
                 </a:solidFill>
               </a:rPr>
               <a:pPr/>
-              <a:t>11/5/2015</a:t>
+              <a:t>11/6/2015</a:t>
             </a:fld>
             <a:endParaRPr lang="en-US" dirty="0">
               <a:solidFill>
@@ -2464,7 +2464,7 @@
           <a:p>
             <a:fld id="{38EEC551-8CDA-4EB6-89BB-2A86C9F091C8}" type="datetime8">
               <a:rPr lang="en-US" smtClean="0"/>
-              <a:t>11/5/2015 1:08 PM</a:t>
+              <a:t>11/6/2015 9:26 AM</a:t>
             </a:fld>
             <a:endParaRPr lang="en-US" dirty="0"/>
           </a:p>
@@ -2662,7 +2662,7 @@
                 </a:solidFill>
               </a:rPr>
               <a:pPr/>
-              <a:t>11/5/2015</a:t>
+              <a:t>11/6/2015</a:t>
             </a:fld>
             <a:endParaRPr lang="en-US" dirty="0">
               <a:solidFill>
@@ -2867,7 +2867,7 @@
           <a:p>
             <a:fld id="{38EEC551-8CDA-4EB6-89BB-2A86C9F091C8}" type="datetime8">
               <a:rPr lang="en-US" smtClean="0"/>
-              <a:t>11/5/2015 1:26 PM</a:t>
+              <a:t>11/6/2015 9:26 AM</a:t>
             </a:fld>
             <a:endParaRPr lang="en-US" dirty="0"/>
           </a:p>
@@ -3065,7 +3065,7 @@
                 </a:solidFill>
               </a:rPr>
               <a:pPr/>
-              <a:t>11/5/2015</a:t>
+              <a:t>11/6/2015</a:t>
             </a:fld>
             <a:endParaRPr lang="en-US" dirty="0">
               <a:solidFill>
@@ -17887,7 +17887,7 @@
         <p:spPr>
           <a:xfrm>
             <a:off x="0" y="6316662"/>
-            <a:ext cx="5334000" cy="760208"/>
+            <a:ext cx="5334000" cy="726353"/>
           </a:xfrm>
           <a:prstGeom prst="rect">
             <a:avLst/>
@@ -17900,84 +17900,51 @@
           </a:bodyPr>
           <a:lstStyle/>
           <a:p>
-            <a:pPr>
-              <a:lnSpc>
-                <a:spcPct val="90000"/>
-              </a:lnSpc>
-              <a:spcAft>
-                <a:spcPts val="600"/>
-              </a:spcAft>
-            </a:pPr>
             <a:r>
               <a:rPr lang="en-US" sz="1400" dirty="0" smtClean="0">
-                <a:gradFill>
-                  <a:gsLst>
-                    <a:gs pos="2917">
-                      <a:schemeClr val="tx1"/>
-                    </a:gs>
-                    <a:gs pos="30000">
-                      <a:schemeClr val="tx1"/>
-                    </a:gs>
-                  </a:gsLst>
-                  <a:lin ang="5400000" scaled="0"/>
-                </a:gradFill>
-              </a:rPr>
-              <a:t>matthias.shapiro@outlook.com</a:t>
-            </a:r>
-          </a:p>
-          <a:p>
-            <a:pPr>
-              <a:lnSpc>
-                <a:spcPct val="90000"/>
-              </a:lnSpc>
-              <a:spcAft>
-                <a:spcPts val="600"/>
-              </a:spcAft>
-            </a:pPr>
-            <a:r>
-              <a:rPr lang="en-US" sz="1400" dirty="0" smtClean="0">
-                <a:gradFill>
-                  <a:gsLst>
-                    <a:gs pos="2917">
-                      <a:schemeClr val="tx1"/>
-                    </a:gs>
-                    <a:gs pos="30000">
-                      <a:schemeClr val="tx1"/>
-                    </a:gs>
-                  </a:gsLst>
-                  <a:lin ang="5400000" scaled="0"/>
-                </a:gradFill>
+                <a:solidFill>
+                  <a:schemeClr val="tx1">
+                    <a:lumMod val="75000"/>
+                  </a:schemeClr>
+                </a:solidFill>
               </a:rPr>
               <a:t>@</a:t>
             </a:r>
             <a:r>
               <a:rPr lang="en-US" sz="1400" dirty="0" err="1" smtClean="0">
-                <a:gradFill>
-                  <a:gsLst>
-                    <a:gs pos="2917">
-                      <a:schemeClr val="tx1"/>
-                    </a:gs>
-                    <a:gs pos="30000">
-                      <a:schemeClr val="tx1"/>
-                    </a:gs>
-                  </a:gsLst>
-                  <a:lin ang="5400000" scaled="0"/>
-                </a:gradFill>
+                <a:solidFill>
+                  <a:schemeClr val="tx1">
+                    <a:lumMod val="75000"/>
+                  </a:schemeClr>
+                </a:solidFill>
               </a:rPr>
-              <a:t>politicalmath</a:t>
+              <a:t>LaurenC_Lux</a:t>
             </a:r>
             <a:endParaRPr lang="en-US" sz="1400" dirty="0" smtClean="0">
-              <a:gradFill>
-                <a:gsLst>
-                  <a:gs pos="2917">
-                    <a:schemeClr val="tx1"/>
-                  </a:gs>
-                  <a:gs pos="30000">
-                    <a:schemeClr val="tx1"/>
-                  </a:gs>
-                </a:gsLst>
-                <a:lin ang="5400000" scaled="0"/>
-              </a:gradFill>
+              <a:solidFill>
+                <a:schemeClr val="tx1">
+                  <a:lumMod val="75000"/>
+                </a:schemeClr>
+              </a:solidFill>
+            </a:endParaRPr>
+          </a:p>
+          <a:p>
+            <a:r>
+              <a:rPr lang="en-US" sz="1400" dirty="0" smtClean="0">
+                <a:solidFill>
+                  <a:schemeClr val="tx1">
+                    <a:lumMod val="75000"/>
+                  </a:schemeClr>
+                </a:solidFill>
+              </a:rPr>
+              <a:t>lluxenburg@wparesearch.com</a:t>
+            </a:r>
+            <a:endParaRPr lang="en-US" sz="1400" dirty="0">
+              <a:solidFill>
+                <a:schemeClr val="tx1">
+                  <a:lumMod val="75000"/>
+                </a:schemeClr>
+              </a:solidFill>
             </a:endParaRPr>
           </a:p>
         </p:txBody>
@@ -21623,15 +21590,7 @@
                 <a:ea typeface="Segoe UI Black" panose="020B0A02040204020203" pitchFamily="34" charset="0"/>
                 <a:cs typeface="Segoe UI Black" panose="020B0A02040204020203" pitchFamily="34" charset="0"/>
               </a:rPr>
-              <a:t>  </a:t>
-            </a:r>
-            <a:r>
-              <a:rPr lang="en-US" dirty="0" smtClean="0">
-                <a:latin typeface="+mn-lt"/>
-                <a:ea typeface="Segoe UI Black" panose="020B0A02040204020203" pitchFamily="34" charset="0"/>
-                <a:cs typeface="Segoe UI Black" panose="020B0A02040204020203" pitchFamily="34" charset="0"/>
-              </a:rPr>
-              <a:t>Speaker</a:t>
+              <a:t>  Speaker</a:t>
             </a:r>
             <a:endParaRPr lang="en-US" dirty="0">
               <a:latin typeface="+mn-lt"/>
@@ -21651,13 +21610,13 @@
   <p:clrMapOvr>
     <a:masterClrMapping/>
   </p:clrMapOvr>
-  <mc:AlternateContent xmlns:mc="http://schemas.openxmlformats.org/markup-compatibility/2006">
-    <mc:Choice xmlns:p14="http://schemas.microsoft.com/office/powerpoint/2010/main" Requires="p14">
+  <mc:AlternateContent xmlns:mc="http://schemas.openxmlformats.org/markup-compatibility/2006" xmlns:p14="http://schemas.microsoft.com/office/powerpoint/2010/main">
+    <mc:Choice Requires="p14">
       <p:transition spd="med" p14:dur="700">
         <p:fade/>
       </p:transition>
     </mc:Choice>
-    <mc:Fallback>
+    <mc:Fallback xmlns="">
       <p:transition spd="med">
         <p:fade/>
       </p:transition>
@@ -22246,15 +22205,7 @@
             </a:pPr>
             <a:r>
               <a:rPr lang="en-US" dirty="0" smtClean="0"/>
-              <a:t>=</a:t>
-            </a:r>
-            <a:r>
-              <a:rPr lang="en-US" dirty="0" smtClean="0"/>
-              <a:t>AVERAGE(B1:B12</a:t>
-            </a:r>
-            <a:r>
-              <a:rPr lang="en-US" dirty="0" smtClean="0"/>
-              <a:t>)</a:t>
+              <a:t>=AVERAGE(B1:B12)</a:t>
             </a:r>
           </a:p>
           <a:p>
@@ -22746,15 +22697,7 @@
             </a:pPr>
             <a:r>
               <a:rPr lang="en-US" dirty="0" smtClean="0"/>
-              <a:t>=</a:t>
-            </a:r>
-            <a:r>
-              <a:rPr lang="en-US" dirty="0" smtClean="0"/>
-              <a:t>SUM(B1:B12</a:t>
-            </a:r>
-            <a:r>
-              <a:rPr lang="en-US" dirty="0" smtClean="0"/>
-              <a:t>)</a:t>
+              <a:t>=SUM(B1:B12)</a:t>
             </a:r>
             <a:endParaRPr lang="en-US" dirty="0"/>
           </a:p>
@@ -24258,7 +24201,6 @@
               <a:rPr lang="en-US" dirty="0" smtClean="0"/>
               <a:t>Height or length to show scale</a:t>
             </a:r>
-            <a:endParaRPr lang="en-US" dirty="0" smtClean="0"/>
           </a:p>
         </p:txBody>
       </p:sp>
@@ -25281,11 +25223,7 @@
           <a:p>
             <a:r>
               <a:rPr lang="en-US" dirty="0" smtClean="0"/>
-              <a:t>Specific data, limited to a </a:t>
-            </a:r>
-            <a:r>
-              <a:rPr lang="en-US" dirty="0" smtClean="0"/>
-              <a:t>topic</a:t>
+              <a:t>Specific data, limited to a topic</a:t>
             </a:r>
           </a:p>
           <a:p>
@@ -25510,11 +25448,7 @@
           <a:p>
             <a:r>
               <a:rPr lang="en-US" dirty="0" smtClean="0"/>
-              <a:t>Accessing APIs usually requires some programming </a:t>
-            </a:r>
-            <a:r>
-              <a:rPr lang="en-US" dirty="0" smtClean="0"/>
-              <a:t>experience</a:t>
+              <a:t>Accessing APIs usually requires some programming experience</a:t>
             </a:r>
           </a:p>
           <a:p>
@@ -25782,7 +25716,6 @@
               <a:rPr lang="en-US" dirty="0" smtClean="0"/>
               <a:t>Pew Research</a:t>
             </a:r>
-            <a:endParaRPr lang="en-US" dirty="0" smtClean="0"/>
           </a:p>
           <a:p>
             <a:endParaRPr lang="en-US" dirty="0" smtClean="0"/>
@@ -25792,7 +25725,6 @@
               <a:rPr lang="en-US" dirty="0" smtClean="0"/>
               <a:t>Gallup</a:t>
             </a:r>
-            <a:endParaRPr lang="en-US" dirty="0" smtClean="0"/>
           </a:p>
           <a:p>
             <a:endParaRPr lang="en-US" dirty="0"/>
@@ -25800,13 +25732,8 @@
           <a:p>
             <a:r>
               <a:rPr lang="en-US" dirty="0" smtClean="0"/>
-              <a:t>US Budget </a:t>
-            </a:r>
-            <a:r>
-              <a:rPr lang="en-US" dirty="0" smtClean="0"/>
-              <a:t>Info</a:t>
-            </a:r>
-            <a:endParaRPr lang="en-US" dirty="0" smtClean="0"/>
+              <a:t>US Budget Info</a:t>
+            </a:r>
           </a:p>
           <a:p>
             <a:endParaRPr lang="en-US" dirty="0"/>
@@ -27720,6 +27647,15 @@
 </file>
 
 <file path=customXml/item1.xml><?xml version="1.0" encoding="utf-8"?>
+<?mso-contentType ?>
+<FormTemplates xmlns="http://schemas.microsoft.com/sharepoint/v3/contenttype/forms">
+  <Display>DocumentLibraryForm</Display>
+  <Edit>DocumentLibraryForm</Edit>
+  <New>DocumentLibraryForm</New>
+</FormTemplates>
+</file>
+
+<file path=customXml/item2.xml><?xml version="1.0" encoding="utf-8"?>
 <ct:contentTypeSchema xmlns:ct="http://schemas.microsoft.com/office/2006/metadata/contentType" xmlns:ma="http://schemas.microsoft.com/office/2006/metadata/properties/metaAttributes" ct:_="" ma:_="" ma:contentTypeName="PresentationsDoc" ma:contentTypeID="0x01010046EBBE4F454C2C47A5E89CD935B1FC7800E83BCD34BAE21044A0567CF64FDFDE54" ma:contentTypeVersion="5" ma:contentTypeDescription="Create a new document." ma:contentTypeScope="" ma:versionID="9f49739d1da212619d044bf1bfa27251">
   <xsd:schema xmlns:xsd="http://www.w3.org/2001/XMLSchema" xmlns:xs="http://www.w3.org/2001/XMLSchema" xmlns:p="http://schemas.microsoft.com/office/2006/metadata/properties" xmlns:ns1="http://schemas.microsoft.com/sharepoint/v3" xmlns:ns2="12a172fe-0250-434a-85cf-03b10810c5e5" xmlns:ns3="230e9df3-be65-4c73-a93b-d1236ebd677e" targetNamespace="http://schemas.microsoft.com/office/2006/metadata/properties" ma:root="true" ma:fieldsID="d1ec06fbcf9feb71c233288b468d8e39" ns1:_="" ns2:_="" ns3:_="">
     <xsd:import namespace="http://schemas.microsoft.com/sharepoint/v3"/>
@@ -28055,15 +27991,6 @@
 </ct:contentTypeSchema>
 </file>
 
-<file path=customXml/item2.xml><?xml version="1.0" encoding="utf-8"?>
-<?mso-contentType ?>
-<FormTemplates xmlns="http://schemas.microsoft.com/sharepoint/v3/contenttype/forms">
-  <Display>DocumentLibraryForm</Display>
-  <Edit>DocumentLibraryForm</Edit>
-  <New>DocumentLibraryForm</New>
-</FormTemplates>
-</file>
-
 <file path=customXml/item3.xml><?xml version="1.0" encoding="utf-8"?>
 <p:properties xmlns:p="http://schemas.microsoft.com/office/2006/metadata/properties" xmlns:xsi="http://www.w3.org/2001/XMLSchema-instance" xmlns:pc="http://schemas.microsoft.com/office/infopath/2007/PartnerControls">
   <documentManagement>
@@ -28150,6 +28077,14 @@
 </file>
 
 <file path=customXml/itemProps1.xml><?xml version="1.0" encoding="utf-8"?>
+<ds:datastoreItem xmlns:ds="http://schemas.openxmlformats.org/officeDocument/2006/customXml" ds:itemID="{758FDAC0-319D-4A54-8D8E-1D42CB1F8004}">
+  <ds:schemaRefs>
+    <ds:schemaRef ds:uri="http://schemas.microsoft.com/sharepoint/v3/contenttype/forms"/>
+  </ds:schemaRefs>
+</ds:datastoreItem>
+</file>
+
+<file path=customXml/itemProps2.xml><?xml version="1.0" encoding="utf-8"?>
 <ds:datastoreItem xmlns:ds="http://schemas.openxmlformats.org/officeDocument/2006/customXml" ds:itemID="{99E0065C-627B-42FD-A7AD-D2ABAFAC7E7D}">
   <ds:schemaRefs>
     <ds:schemaRef ds:uri="http://schemas.microsoft.com/office/2006/metadata/contentType"/>
@@ -28166,14 +28101,6 @@
     <ds:schemaRef ds:uri="http://purl.org/dc/elements/1.1/"/>
     <ds:schemaRef ds:uri="http://purl.org/dc/terms/"/>
     <ds:schemaRef ds:uri="http://schemas.microsoft.com/internal/obd"/>
-  </ds:schemaRefs>
-</ds:datastoreItem>
-</file>
-
-<file path=customXml/itemProps2.xml><?xml version="1.0" encoding="utf-8"?>
-<ds:datastoreItem xmlns:ds="http://schemas.openxmlformats.org/officeDocument/2006/customXml" ds:itemID="{758FDAC0-319D-4A54-8D8E-1D42CB1F8004}">
-  <ds:schemaRefs>
-    <ds:schemaRef ds:uri="http://schemas.microsoft.com/sharepoint/v3/contenttype/forms"/>
   </ds:schemaRefs>
 </ds:datastoreItem>
 </file>

</xml_diff>

<commit_message>
Lauren's Changes part 1
</commit_message>
<xml_diff>
--- a/Session 2.pptx
+++ b/Session 2.pptx
@@ -7,10 +7,10 @@
     <p:sldMasterId id="2147484327" r:id="rId6"/>
   </p:sldMasterIdLst>
   <p:notesMasterIdLst>
-    <p:notesMasterId r:id="rId49"/>
+    <p:notesMasterId r:id="rId51"/>
   </p:notesMasterIdLst>
   <p:handoutMasterIdLst>
-    <p:handoutMasterId r:id="rId50"/>
+    <p:handoutMasterId r:id="rId52"/>
   </p:handoutMasterIdLst>
   <p:sldIdLst>
     <p:sldId id="258" r:id="rId7"/>
@@ -53,8 +53,10 @@
     <p:sldId id="429" r:id="rId44"/>
     <p:sldId id="431" r:id="rId45"/>
     <p:sldId id="423" r:id="rId46"/>
-    <p:sldId id="424" r:id="rId47"/>
-    <p:sldId id="432" r:id="rId48"/>
+    <p:sldId id="440" r:id="rId47"/>
+    <p:sldId id="424" r:id="rId48"/>
+    <p:sldId id="441" r:id="rId49"/>
+    <p:sldId id="432" r:id="rId50"/>
   </p:sldIdLst>
   <p:sldSz cx="12436475" cy="6994525"/>
   <p:notesSz cx="6858000" cy="9144000"/>
@@ -198,7 +200,9 @@
             <p14:sldId id="429"/>
             <p14:sldId id="431"/>
             <p14:sldId id="423"/>
+            <p14:sldId id="440"/>
             <p14:sldId id="424"/>
+            <p14:sldId id="441"/>
             <p14:sldId id="432"/>
           </p14:sldIdLst>
         </p14:section>
@@ -317,7 +321,7 @@
               <a:rPr lang="en-US" smtClean="0">
                 <a:latin typeface="Segoe UI" pitchFamily="34" charset="0"/>
               </a:rPr>
-              <a:t>11/6/2015 9:26 AM</a:t>
+              <a:t>11/6/2015 3:08 PM</a:t>
             </a:fld>
             <a:endParaRPr lang="en-US" dirty="0">
               <a:latin typeface="Segoe UI" pitchFamily="34" charset="0"/>
@@ -619,7 +623,7 @@
           <a:p>
             <a:fld id="{38EEC551-8CDA-4EB6-89BB-2A86C9F091C8}" type="datetime8">
               <a:rPr lang="en-US" smtClean="0"/>
-              <a:t>11/6/2015 9:26 AM</a:t>
+              <a:t>11/6/2015 3:08 PM</a:t>
             </a:fld>
             <a:endParaRPr lang="en-US" dirty="0"/>
           </a:p>
@@ -1447,7 +1451,7 @@
                 </a:solidFill>
               </a:rPr>
               <a:pPr/>
-              <a:t>42</a:t>
+              <a:t>44</a:t>
             </a:fld>
             <a:endParaRPr lang="en-US" dirty="0">
               <a:solidFill>
@@ -2464,7 +2468,7 @@
           <a:p>
             <a:fld id="{38EEC551-8CDA-4EB6-89BB-2A86C9F091C8}" type="datetime8">
               <a:rPr lang="en-US" smtClean="0"/>
-              <a:t>11/6/2015 9:26 AM</a:t>
+              <a:t>11/6/2015 3:08 PM</a:t>
             </a:fld>
             <a:endParaRPr lang="en-US" dirty="0"/>
           </a:p>
@@ -2867,7 +2871,7 @@
           <a:p>
             <a:fld id="{38EEC551-8CDA-4EB6-89BB-2A86C9F091C8}" type="datetime8">
               <a:rPr lang="en-US" smtClean="0"/>
-              <a:t>11/6/2015 9:26 AM</a:t>
+              <a:t>11/6/2015 3:08 PM</a:t>
             </a:fld>
             <a:endParaRPr lang="en-US" dirty="0"/>
           </a:p>
@@ -24804,6 +24808,150 @@
           <a:chExt cx="0" cy="0"/>
         </a:xfrm>
       </p:grpSpPr>
+      <p:pic>
+        <p:nvPicPr>
+          <p:cNvPr id="2050" name="Picture 2" descr="Inline image 2"/>
+          <p:cNvPicPr>
+            <a:picLocks noChangeAspect="1" noChangeArrowheads="1"/>
+          </p:cNvPicPr>
+          <p:nvPr/>
+        </p:nvPicPr>
+        <p:blipFill>
+          <a:blip r:embed="rId2">
+            <a:extLst>
+              <a:ext uri="{28A0092B-C50C-407E-A947-70E740481C1C}">
+                <a14:useLocalDpi xmlns:a14="http://schemas.microsoft.com/office/drawing/2010/main" val="0"/>
+              </a:ext>
+            </a:extLst>
+          </a:blip>
+          <a:srcRect/>
+          <a:stretch>
+            <a:fillRect/>
+          </a:stretch>
+        </p:blipFill>
+        <p:spPr bwMode="auto">
+          <a:xfrm>
+            <a:off x="2865437" y="295273"/>
+            <a:ext cx="12400231" cy="6277715"/>
+          </a:xfrm>
+          <a:prstGeom prst="rect">
+            <a:avLst/>
+          </a:prstGeom>
+          <a:noFill/>
+          <a:extLst>
+            <a:ext uri="{909E8E84-426E-40DD-AFC4-6F175D3DCCD1}">
+              <a14:hiddenFill xmlns:a14="http://schemas.microsoft.com/office/drawing/2010/main">
+                <a:solidFill>
+                  <a:srgbClr val="FFFFFF"/>
+                </a:solidFill>
+              </a14:hiddenFill>
+            </a:ext>
+          </a:extLst>
+        </p:spPr>
+      </p:pic>
+      <p:sp>
+        <p:nvSpPr>
+          <p:cNvPr id="5" name="Text Placeholder 4"/>
+          <p:cNvSpPr>
+            <a:spLocks noGrp="1"/>
+          </p:cNvSpPr>
+          <p:nvPr>
+            <p:ph type="body" sz="quarter" idx="10"/>
+          </p:nvPr>
+        </p:nvSpPr>
+        <p:spPr>
+          <a:xfrm>
+            <a:off x="274638" y="1212850"/>
+            <a:ext cx="5181599" cy="3754874"/>
+          </a:xfrm>
+        </p:spPr>
+        <p:txBody>
+          <a:bodyPr/>
+          <a:lstStyle/>
+          <a:p>
+            <a:pPr marL="0" indent="0">
+              <a:buNone/>
+            </a:pPr>
+            <a:r>
+              <a:rPr lang="en-US" dirty="0" smtClean="0"/>
+              <a:t>Permutations of pie charts can be valuable for some data</a:t>
+            </a:r>
+            <a:endParaRPr lang="en-US" dirty="0" smtClean="0"/>
+          </a:p>
+          <a:p>
+            <a:pPr marL="0" indent="0">
+              <a:buNone/>
+            </a:pPr>
+            <a:endParaRPr lang="en-US" dirty="0"/>
+          </a:p>
+          <a:p>
+            <a:pPr marL="0" indent="0">
+              <a:buNone/>
+            </a:pPr>
+            <a:r>
+              <a:rPr lang="en-US" dirty="0" smtClean="0"/>
+              <a:t>Best for data that adds up to 100%</a:t>
+            </a:r>
+            <a:endParaRPr lang="en-US" dirty="0"/>
+          </a:p>
+        </p:txBody>
+      </p:sp>
+      <p:sp>
+        <p:nvSpPr>
+          <p:cNvPr id="4" name="Title 3"/>
+          <p:cNvSpPr>
+            <a:spLocks noGrp="1"/>
+          </p:cNvSpPr>
+          <p:nvPr>
+            <p:ph type="title"/>
+          </p:nvPr>
+        </p:nvSpPr>
+        <p:spPr/>
+        <p:txBody>
+          <a:bodyPr/>
+          <a:lstStyle/>
+          <a:p>
+            <a:r>
+              <a:rPr lang="en-US" dirty="0" smtClean="0"/>
+              <a:t>Pie Charts</a:t>
+            </a:r>
+            <a:endParaRPr lang="en-US" dirty="0"/>
+          </a:p>
+        </p:txBody>
+      </p:sp>
+    </p:spTree>
+    <p:extLst>
+      <p:ext uri="{BB962C8B-B14F-4D97-AF65-F5344CB8AC3E}">
+        <p14:creationId xmlns:p14="http://schemas.microsoft.com/office/powerpoint/2010/main" val="204772100"/>
+      </p:ext>
+    </p:extLst>
+  </p:cSld>
+  <p:clrMapOvr>
+    <a:masterClrMapping/>
+  </p:clrMapOvr>
+  <p:transition>
+    <p:fade/>
+  </p:transition>
+</p:sld>
+</file>
+
+<file path=ppt/slides/slide42.xml><?xml version="1.0" encoding="utf-8"?>
+<p:sld xmlns:a="http://schemas.openxmlformats.org/drawingml/2006/main" xmlns:r="http://schemas.openxmlformats.org/officeDocument/2006/relationships" xmlns:p="http://schemas.openxmlformats.org/presentationml/2006/main">
+  <p:cSld>
+    <p:spTree>
+      <p:nvGrpSpPr>
+        <p:cNvPr id="1" name=""/>
+        <p:cNvGrpSpPr/>
+        <p:nvPr/>
+      </p:nvGrpSpPr>
+      <p:grpSpPr>
+        <a:xfrm>
+          <a:off x="0" y="0"/>
+          <a:ext cx="0" cy="0"/>
+          <a:chOff x="0" y="0"/>
+          <a:chExt cx="0" cy="0"/>
+        </a:xfrm>
+      </p:grpSpPr>
       <mc:AlternateContent xmlns:mc="http://schemas.openxmlformats.org/markup-compatibility/2006" xmlns:a14="http://schemas.microsoft.com/office/drawing/2010/main">
         <mc:Choice Requires="a14">
           <p:sp>
@@ -25002,7 +25150,222 @@
 </p:sld>
 </file>
 
-<file path=ppt/slides/slide42.xml><?xml version="1.0" encoding="utf-8"?>
+<file path=ppt/slides/slide43.xml><?xml version="1.0" encoding="utf-8"?>
+<p:sld xmlns:a="http://schemas.openxmlformats.org/drawingml/2006/main" xmlns:r="http://schemas.openxmlformats.org/officeDocument/2006/relationships" xmlns:p="http://schemas.openxmlformats.org/presentationml/2006/main">
+  <p:cSld>
+    <p:spTree>
+      <p:nvGrpSpPr>
+        <p:cNvPr id="1" name=""/>
+        <p:cNvGrpSpPr/>
+        <p:nvPr/>
+      </p:nvGrpSpPr>
+      <p:grpSpPr>
+        <a:xfrm>
+          <a:off x="0" y="0"/>
+          <a:ext cx="0" cy="0"/>
+          <a:chOff x="0" y="0"/>
+          <a:chExt cx="0" cy="0"/>
+        </a:xfrm>
+      </p:grpSpPr>
+      <mc:AlternateContent xmlns:mc="http://schemas.openxmlformats.org/markup-compatibility/2006" xmlns:a14="http://schemas.microsoft.com/office/drawing/2010/main">
+        <mc:Choice Requires="a14">
+          <p:sp>
+            <p:nvSpPr>
+              <p:cNvPr id="5" name="Text Placeholder 4"/>
+              <p:cNvSpPr>
+                <a:spLocks noGrp="1"/>
+              </p:cNvSpPr>
+              <p:nvPr>
+                <p:ph type="body" sz="quarter" idx="10"/>
+              </p:nvPr>
+            </p:nvSpPr>
+            <p:spPr>
+              <a:xfrm>
+                <a:off x="274638" y="1212850"/>
+                <a:ext cx="5562599" cy="5109091"/>
+              </a:xfrm>
+            </p:spPr>
+            <p:txBody>
+              <a:bodyPr/>
+              <a:lstStyle/>
+              <a:p>
+                <a:pPr marL="0" indent="0">
+                  <a:buNone/>
+                </a:pPr>
+                <a:r>
+                  <a:rPr lang="en-US" dirty="0" smtClean="0"/>
+                  <a:t>Looking for correlation in corresponding values</a:t>
+                </a:r>
+              </a:p>
+              <a:p>
+                <a:pPr marL="0" indent="0">
+                  <a:buNone/>
+                </a:pPr>
+                <a:endParaRPr lang="en-US" dirty="0"/>
+              </a:p>
+              <a:p>
+                <a:pPr marL="0" indent="0">
+                  <a:buNone/>
+                </a:pPr>
+                <a:r>
+                  <a:rPr lang="en-US" dirty="0" smtClean="0"/>
+                  <a:t>Right-click to add a “trend line”</a:t>
+                </a:r>
+              </a:p>
+              <a:p>
+                <a:pPr marL="0" indent="0">
+                  <a:buNone/>
+                </a:pPr>
+                <a:endParaRPr lang="en-US" dirty="0"/>
+              </a:p>
+              <a:p>
+                <a:pPr marL="0" indent="0">
+                  <a:buNone/>
+                </a:pPr>
+                <a14:m>
+                  <m:oMath xmlns:m="http://schemas.openxmlformats.org/officeDocument/2006/math">
+                    <m:sSup>
+                      <m:sSupPr>
+                        <m:ctrlPr>
+                          <a:rPr lang="en-US" i="1" smtClean="0">
+                            <a:latin typeface="Cambria Math" panose="02040503050406030204" pitchFamily="18" charset="0"/>
+                          </a:rPr>
+                        </m:ctrlPr>
+                      </m:sSupPr>
+                      <m:e>
+                        <m:r>
+                          <a:rPr lang="en-US" b="0" i="1" smtClean="0">
+                            <a:latin typeface="Cambria Math" panose="02040503050406030204" pitchFamily="18" charset="0"/>
+                          </a:rPr>
+                          <m:t>𝑅</m:t>
+                        </m:r>
+                      </m:e>
+                      <m:sup>
+                        <m:r>
+                          <a:rPr lang="en-US" i="1" smtClean="0">
+                            <a:latin typeface="Cambria Math" panose="02040503050406030204" pitchFamily="18" charset="0"/>
+                          </a:rPr>
+                          <m:t>2</m:t>
+                        </m:r>
+                      </m:sup>
+                    </m:sSup>
+                  </m:oMath>
+                </a14:m>
+                <a:r>
+                  <a:rPr lang="en-US" dirty="0" smtClean="0"/>
+                  <a:t> is the coefficient </a:t>
+                </a:r>
+                <a:r>
+                  <a:rPr lang="en-US" smtClean="0"/>
+                  <a:t>of determination</a:t>
+                </a:r>
+                <a:endParaRPr lang="en-US" dirty="0"/>
+              </a:p>
+            </p:txBody>
+          </p:sp>
+        </mc:Choice>
+        <mc:Fallback xmlns="">
+          <p:sp>
+            <p:nvSpPr>
+              <p:cNvPr id="5" name="Text Placeholder 4"/>
+              <p:cNvSpPr>
+                <a:spLocks noGrp="1" noRot="1" noChangeAspect="1" noMove="1" noResize="1" noEditPoints="1" noAdjustHandles="1" noChangeArrowheads="1" noChangeShapeType="1" noTextEdit="1"/>
+              </p:cNvSpPr>
+              <p:nvPr>
+                <p:ph type="body" sz="quarter" idx="10"/>
+              </p:nvPr>
+            </p:nvSpPr>
+            <p:spPr>
+              <a:xfrm>
+                <a:off x="274638" y="1212850"/>
+                <a:ext cx="5562599" cy="5109091"/>
+              </a:xfrm>
+              <a:blipFill rotWithShape="0">
+                <a:blip r:embed="rId2"/>
+                <a:stretch>
+                  <a:fillRect/>
+                </a:stretch>
+              </a:blipFill>
+            </p:spPr>
+            <p:txBody>
+              <a:bodyPr/>
+              <a:lstStyle/>
+              <a:p>
+                <a:r>
+                  <a:rPr lang="en-US">
+                    <a:noFill/>
+                  </a:rPr>
+                  <a:t> </a:t>
+                </a:r>
+              </a:p>
+            </p:txBody>
+          </p:sp>
+        </mc:Fallback>
+      </mc:AlternateContent>
+      <p:sp>
+        <p:nvSpPr>
+          <p:cNvPr id="4" name="Title 3"/>
+          <p:cNvSpPr>
+            <a:spLocks noGrp="1"/>
+          </p:cNvSpPr>
+          <p:nvPr>
+            <p:ph type="title"/>
+          </p:nvPr>
+        </p:nvSpPr>
+        <p:spPr/>
+        <p:txBody>
+          <a:bodyPr/>
+          <a:lstStyle/>
+          <a:p>
+            <a:r>
+              <a:rPr lang="en-US" dirty="0" smtClean="0"/>
+              <a:t>Multi Variate Charts</a:t>
+            </a:r>
+            <a:endParaRPr lang="en-US" dirty="0"/>
+          </a:p>
+        </p:txBody>
+      </p:sp>
+      <p:pic>
+        <p:nvPicPr>
+          <p:cNvPr id="2" name="Picture 1"/>
+          <p:cNvPicPr>
+            <a:picLocks noChangeAspect="1"/>
+          </p:cNvPicPr>
+          <p:nvPr/>
+        </p:nvPicPr>
+        <p:blipFill>
+          <a:blip r:embed="rId3"/>
+          <a:stretch>
+            <a:fillRect/>
+          </a:stretch>
+        </p:blipFill>
+        <p:spPr>
+          <a:xfrm>
+            <a:off x="5837237" y="2354262"/>
+            <a:ext cx="6238157" cy="3962400"/>
+          </a:xfrm>
+          <a:prstGeom prst="rect">
+            <a:avLst/>
+          </a:prstGeom>
+        </p:spPr>
+      </p:pic>
+    </p:spTree>
+    <p:extLst>
+      <p:ext uri="{BB962C8B-B14F-4D97-AF65-F5344CB8AC3E}">
+        <p14:creationId xmlns:p14="http://schemas.microsoft.com/office/powerpoint/2010/main" val="2169312282"/>
+      </p:ext>
+    </p:extLst>
+  </p:cSld>
+  <p:clrMapOvr>
+    <a:masterClrMapping/>
+  </p:clrMapOvr>
+  <p:transition>
+    <p:fade/>
+  </p:transition>
+</p:sld>
+</file>
+
+<file path=ppt/slides/slide44.xml><?xml version="1.0" encoding="utf-8"?>
 <p:sld xmlns:a="http://schemas.openxmlformats.org/drawingml/2006/main" xmlns:r="http://schemas.openxmlformats.org/officeDocument/2006/relationships" xmlns:p="http://schemas.openxmlformats.org/presentationml/2006/main">
   <p:cSld>
     <p:spTree>
@@ -25704,7 +26067,7 @@
         </p:nvSpPr>
         <p:spPr>
           <a:xfrm>
-            <a:off x="4846638" y="1212850"/>
+            <a:off x="4849000" y="1440733"/>
             <a:ext cx="7315203" cy="4494212"/>
           </a:xfrm>
         </p:spPr>
@@ -25714,26 +26077,19 @@
           <a:p>
             <a:r>
               <a:rPr lang="en-US" dirty="0" smtClean="0"/>
-              <a:t>Pew Research</a:t>
-            </a:r>
-          </a:p>
-          <a:p>
+              <a:t>Data in PDF or white papers</a:t>
+            </a:r>
             <a:endParaRPr lang="en-US" dirty="0" smtClean="0"/>
           </a:p>
           <a:p>
+            <a:endParaRPr lang="en-US" dirty="0" smtClean="0"/>
+          </a:p>
+          <a:p>
             <a:r>
               <a:rPr lang="en-US" dirty="0" smtClean="0"/>
-              <a:t>Gallup</a:t>
-            </a:r>
-          </a:p>
-          <a:p>
-            <a:endParaRPr lang="en-US" dirty="0"/>
-          </a:p>
-          <a:p>
-            <a:r>
-              <a:rPr lang="en-US" dirty="0" smtClean="0"/>
-              <a:t>US Budget Info</a:t>
-            </a:r>
+              <a:t>Requires moving the data by hand to a spreadsheet program</a:t>
+            </a:r>
+            <a:endParaRPr lang="en-US" dirty="0" smtClean="0"/>
           </a:p>
           <a:p>
             <a:endParaRPr lang="en-US" dirty="0"/>
@@ -25769,54 +26125,6 @@
           </a:p>
         </p:txBody>
       </p:sp>
-      <p:pic>
-        <p:nvPicPr>
-          <p:cNvPr id="2" name="Picture 1"/>
-          <p:cNvPicPr>
-            <a:picLocks noChangeAspect="1"/>
-          </p:cNvPicPr>
-          <p:nvPr/>
-        </p:nvPicPr>
-        <p:blipFill>
-          <a:blip r:embed="rId2"/>
-          <a:stretch>
-            <a:fillRect/>
-          </a:stretch>
-        </p:blipFill>
-        <p:spPr>
-          <a:xfrm>
-            <a:off x="579437" y="1363662"/>
-            <a:ext cx="3683189" cy="641383"/>
-          </a:xfrm>
-          <a:prstGeom prst="rect">
-            <a:avLst/>
-          </a:prstGeom>
-        </p:spPr>
-      </p:pic>
-      <p:pic>
-        <p:nvPicPr>
-          <p:cNvPr id="3" name="Picture 2"/>
-          <p:cNvPicPr>
-            <a:picLocks noChangeAspect="1"/>
-          </p:cNvPicPr>
-          <p:nvPr/>
-        </p:nvPicPr>
-        <p:blipFill>
-          <a:blip r:embed="rId3"/>
-          <a:stretch>
-            <a:fillRect/>
-          </a:stretch>
-        </p:blipFill>
-        <p:spPr>
-          <a:xfrm>
-            <a:off x="579437" y="2201862"/>
-            <a:ext cx="3665912" cy="1371600"/>
-          </a:xfrm>
-          <a:prstGeom prst="rect">
-            <a:avLst/>
-          </a:prstGeom>
-        </p:spPr>
-      </p:pic>
       <p:sp>
         <p:nvSpPr>
           <p:cNvPr id="7" name="AutoShape 2" descr="http://img1.wikia.nocookie.net/__cb20100726111457/logopedia/images/5/51/Twitter_logo.svg"/>
@@ -25895,24 +26203,69 @@
           </a:p>
         </p:txBody>
       </p:sp>
+      <p:sp>
+        <p:nvSpPr>
+          <p:cNvPr id="6" name="AutoShape 2" descr="Click for Options"/>
+          <p:cNvSpPr>
+            <a:spLocks noChangeAspect="1" noChangeArrowheads="1"/>
+          </p:cNvSpPr>
+          <p:nvPr/>
+        </p:nvSpPr>
+        <p:spPr bwMode="auto">
+          <a:xfrm>
+            <a:off x="460375" y="160337"/>
+            <a:ext cx="304800" cy="304801"/>
+          </a:xfrm>
+          <a:prstGeom prst="rect">
+            <a:avLst/>
+          </a:prstGeom>
+          <a:noFill/>
+          <a:extLst>
+            <a:ext uri="{909E8E84-426E-40DD-AFC4-6F175D3DCCD1}">
+              <a14:hiddenFill xmlns:a14="http://schemas.microsoft.com/office/drawing/2010/main">
+                <a:solidFill>
+                  <a:srgbClr val="FFFFFF"/>
+                </a:solidFill>
+              </a14:hiddenFill>
+            </a:ext>
+          </a:extLst>
+        </p:spPr>
+        <p:txBody>
+          <a:bodyPr vert="horz" wrap="square" lIns="91440" tIns="45720" rIns="91440" bIns="45720" numCol="1" anchor="t" anchorCtr="0" compatLnSpc="1">
+            <a:prstTxWarp prst="textNoShape">
+              <a:avLst/>
+            </a:prstTxWarp>
+          </a:bodyPr>
+          <a:lstStyle/>
+          <a:p>
+            <a:endParaRPr lang="en-US"/>
+          </a:p>
+        </p:txBody>
+      </p:sp>
       <p:pic>
         <p:nvPicPr>
-          <p:cNvPr id="9" name="Picture 8"/>
+          <p:cNvPr id="11" name="Picture 10"/>
           <p:cNvPicPr>
             <a:picLocks noChangeAspect="1"/>
           </p:cNvPicPr>
           <p:nvPr/>
         </p:nvPicPr>
         <p:blipFill>
-          <a:blip r:embed="rId4"/>
+          <a:blip r:embed="rId2">
+            <a:extLst>
+              <a:ext uri="{28A0092B-C50C-407E-A947-70E740481C1C}">
+                <a14:useLocalDpi xmlns:a14="http://schemas.microsoft.com/office/drawing/2010/main" val="0"/>
+              </a:ext>
+            </a:extLst>
+          </a:blip>
           <a:stretch>
             <a:fillRect/>
           </a:stretch>
         </p:blipFill>
         <p:spPr>
           <a:xfrm>
-            <a:off x="1505900" y="3907109"/>
-            <a:ext cx="3040093" cy="725554"/>
+            <a:off x="460375" y="2963862"/>
+            <a:ext cx="2938462" cy="1152338"/>
           </a:xfrm>
           <a:prstGeom prst="rect">
             <a:avLst/>
@@ -25921,22 +26274,58 @@
       </p:pic>
       <p:pic>
         <p:nvPicPr>
-          <p:cNvPr id="12" name="Picture 11"/>
+          <p:cNvPr id="13" name="Picture 12"/>
           <p:cNvPicPr>
             <a:picLocks noChangeAspect="1"/>
           </p:cNvPicPr>
           <p:nvPr/>
         </p:nvPicPr>
         <p:blipFill>
-          <a:blip r:embed="rId5"/>
+          <a:blip r:embed="rId3">
+            <a:extLst>
+              <a:ext uri="{28A0092B-C50C-407E-A947-70E740481C1C}">
+                <a14:useLocalDpi xmlns:a14="http://schemas.microsoft.com/office/drawing/2010/main" val="0"/>
+              </a:ext>
+            </a:extLst>
+          </a:blip>
           <a:stretch>
             <a:fillRect/>
           </a:stretch>
         </p:blipFill>
         <p:spPr>
           <a:xfrm>
-            <a:off x="651713" y="3907109"/>
-            <a:ext cx="808763" cy="688735"/>
+            <a:off x="460375" y="1401076"/>
+            <a:ext cx="4081462" cy="1047575"/>
+          </a:xfrm>
+          <a:prstGeom prst="rect">
+            <a:avLst/>
+          </a:prstGeom>
+        </p:spPr>
+      </p:pic>
+      <p:pic>
+        <p:nvPicPr>
+          <p:cNvPr id="14" name="Picture 13"/>
+          <p:cNvPicPr>
+            <a:picLocks noChangeAspect="1"/>
+          </p:cNvPicPr>
+          <p:nvPr/>
+        </p:nvPicPr>
+        <p:blipFill>
+          <a:blip r:embed="rId4">
+            <a:extLst>
+              <a:ext uri="{28A0092B-C50C-407E-A947-70E740481C1C}">
+                <a14:useLocalDpi xmlns:a14="http://schemas.microsoft.com/office/drawing/2010/main" val="0"/>
+              </a:ext>
+            </a:extLst>
+          </a:blip>
+          <a:stretch>
+            <a:fillRect/>
+          </a:stretch>
+        </p:blipFill>
+        <p:spPr>
+          <a:xfrm>
+            <a:off x="460374" y="4487862"/>
+            <a:ext cx="4212275" cy="838200"/>
           </a:xfrm>
           <a:prstGeom prst="rect">
             <a:avLst/>
@@ -27647,15 +28036,6 @@
 </file>
 
 <file path=customXml/item1.xml><?xml version="1.0" encoding="utf-8"?>
-<?mso-contentType ?>
-<FormTemplates xmlns="http://schemas.microsoft.com/sharepoint/v3/contenttype/forms">
-  <Display>DocumentLibraryForm</Display>
-  <Edit>DocumentLibraryForm</Edit>
-  <New>DocumentLibraryForm</New>
-</FormTemplates>
-</file>
-
-<file path=customXml/item2.xml><?xml version="1.0" encoding="utf-8"?>
 <ct:contentTypeSchema xmlns:ct="http://schemas.microsoft.com/office/2006/metadata/contentType" xmlns:ma="http://schemas.microsoft.com/office/2006/metadata/properties/metaAttributes" ct:_="" ma:_="" ma:contentTypeName="PresentationsDoc" ma:contentTypeID="0x01010046EBBE4F454C2C47A5E89CD935B1FC7800E83BCD34BAE21044A0567CF64FDFDE54" ma:contentTypeVersion="5" ma:contentTypeDescription="Create a new document." ma:contentTypeScope="" ma:versionID="9f49739d1da212619d044bf1bfa27251">
   <xsd:schema xmlns:xsd="http://www.w3.org/2001/XMLSchema" xmlns:xs="http://www.w3.org/2001/XMLSchema" xmlns:p="http://schemas.microsoft.com/office/2006/metadata/properties" xmlns:ns1="http://schemas.microsoft.com/sharepoint/v3" xmlns:ns2="12a172fe-0250-434a-85cf-03b10810c5e5" xmlns:ns3="230e9df3-be65-4c73-a93b-d1236ebd677e" targetNamespace="http://schemas.microsoft.com/office/2006/metadata/properties" ma:root="true" ma:fieldsID="d1ec06fbcf9feb71c233288b468d8e39" ns1:_="" ns2:_="" ns3:_="">
     <xsd:import namespace="http://schemas.microsoft.com/sharepoint/v3"/>
@@ -27991,6 +28371,15 @@
 </ct:contentTypeSchema>
 </file>
 
+<file path=customXml/item2.xml><?xml version="1.0" encoding="utf-8"?>
+<?mso-contentType ?>
+<FormTemplates xmlns="http://schemas.microsoft.com/sharepoint/v3/contenttype/forms">
+  <Display>DocumentLibraryForm</Display>
+  <Edit>DocumentLibraryForm</Edit>
+  <New>DocumentLibraryForm</New>
+</FormTemplates>
+</file>
+
 <file path=customXml/item3.xml><?xml version="1.0" encoding="utf-8"?>
 <p:properties xmlns:p="http://schemas.microsoft.com/office/2006/metadata/properties" xmlns:xsi="http://www.w3.org/2001/XMLSchema-instance" xmlns:pc="http://schemas.microsoft.com/office/infopath/2007/PartnerControls">
   <documentManagement>
@@ -28077,14 +28466,6 @@
 </file>
 
 <file path=customXml/itemProps1.xml><?xml version="1.0" encoding="utf-8"?>
-<ds:datastoreItem xmlns:ds="http://schemas.openxmlformats.org/officeDocument/2006/customXml" ds:itemID="{758FDAC0-319D-4A54-8D8E-1D42CB1F8004}">
-  <ds:schemaRefs>
-    <ds:schemaRef ds:uri="http://schemas.microsoft.com/sharepoint/v3/contenttype/forms"/>
-  </ds:schemaRefs>
-</ds:datastoreItem>
-</file>
-
-<file path=customXml/itemProps2.xml><?xml version="1.0" encoding="utf-8"?>
 <ds:datastoreItem xmlns:ds="http://schemas.openxmlformats.org/officeDocument/2006/customXml" ds:itemID="{99E0065C-627B-42FD-A7AD-D2ABAFAC7E7D}">
   <ds:schemaRefs>
     <ds:schemaRef ds:uri="http://schemas.microsoft.com/office/2006/metadata/contentType"/>
@@ -28101,6 +28482,14 @@
     <ds:schemaRef ds:uri="http://purl.org/dc/elements/1.1/"/>
     <ds:schemaRef ds:uri="http://purl.org/dc/terms/"/>
     <ds:schemaRef ds:uri="http://schemas.microsoft.com/internal/obd"/>
+  </ds:schemaRefs>
+</ds:datastoreItem>
+</file>
+
+<file path=customXml/itemProps2.xml><?xml version="1.0" encoding="utf-8"?>
+<ds:datastoreItem xmlns:ds="http://schemas.openxmlformats.org/officeDocument/2006/customXml" ds:itemID="{758FDAC0-319D-4A54-8D8E-1D42CB1F8004}">
+  <ds:schemaRefs>
+    <ds:schemaRef ds:uri="http://schemas.microsoft.com/sharepoint/v3/contenttype/forms"/>
   </ds:schemaRefs>
 </ds:datastoreItem>
 </file>

</xml_diff>